<commit_message>
Created new diagram for current concept
</commit_message>
<xml_diff>
--- a/Konzept_Diagramme/Diagramme.pptx
+++ b/Konzept_Diagramme/Diagramme.pptx
@@ -7,6 +7,7 @@
   <p:sldIdLst>
     <p:sldId id="256" r:id="rId2"/>
     <p:sldId id="257" r:id="rId3"/>
+    <p:sldId id="258" r:id="rId4"/>
   </p:sldIdLst>
   <p:sldSz cx="12192000" cy="6858000"/>
   <p:notesSz cx="6858000" cy="9144000"/>
@@ -127,7 +128,7 @@
 <file path=ppt/revisionInfo.xml><?xml version="1.0" encoding="utf-8"?>
 <p1510:revInfo xmlns:a="http://schemas.openxmlformats.org/drawingml/2006/main" xmlns:r="http://schemas.openxmlformats.org/officeDocument/2006/relationships" xmlns:p1510="http://schemas.microsoft.com/office/powerpoint/2015/10/main">
   <p1510:revLst>
-    <p1510:client id="{10BBE1F0-7463-48C6-86DF-5387D97B13FC}" v="34" dt="2022-10-13T16:13:52.003"/>
+    <p1510:client id="{10BBE1F0-7463-48C6-86DF-5387D97B13FC}" v="58" dt="2022-11-06T11:13:22.032"/>
   </p1510:revLst>
 </p1510:revInfo>
 </file>
@@ -137,7 +138,7 @@
   <pc:docChgLst>
     <pc:chgData name="Felix Gervasi" userId="af4e32ee5822202e" providerId="LiveId" clId="{10BBE1F0-7463-48C6-86DF-5387D97B13FC}"/>
     <pc:docChg chg="undo custSel addSld modSld">
-      <pc:chgData name="Felix Gervasi" userId="af4e32ee5822202e" providerId="LiveId" clId="{10BBE1F0-7463-48C6-86DF-5387D97B13FC}" dt="2022-10-13T16:20:33.402" v="1939" actId="20577"/>
+      <pc:chgData name="Felix Gervasi" userId="af4e32ee5822202e" providerId="LiveId" clId="{10BBE1F0-7463-48C6-86DF-5387D97B13FC}" dt="2022-11-06T11:13:22.031" v="2256" actId="1076"/>
       <pc:docMkLst>
         <pc:docMk/>
       </pc:docMkLst>
@@ -688,6 +689,189 @@
             <pc:docMk/>
             <pc:sldMk cId="174949731" sldId="257"/>
             <ac:cxnSpMk id="23" creationId="{FCC1D33E-70EE-5BA3-DB0A-FF2DCFEF636A}"/>
+          </ac:cxnSpMkLst>
+        </pc:cxnChg>
+      </pc:sldChg>
+      <pc:sldChg chg="addSp delSp modSp new mod">
+        <pc:chgData name="Felix Gervasi" userId="af4e32ee5822202e" providerId="LiveId" clId="{10BBE1F0-7463-48C6-86DF-5387D97B13FC}" dt="2022-11-06T11:13:22.031" v="2256" actId="1076"/>
+        <pc:sldMkLst>
+          <pc:docMk/>
+          <pc:sldMk cId="3586954352" sldId="258"/>
+        </pc:sldMkLst>
+        <pc:spChg chg="del">
+          <ac:chgData name="Felix Gervasi" userId="af4e32ee5822202e" providerId="LiveId" clId="{10BBE1F0-7463-48C6-86DF-5387D97B13FC}" dt="2022-11-06T11:00:38.317" v="1941" actId="478"/>
+          <ac:spMkLst>
+            <pc:docMk/>
+            <pc:sldMk cId="3586954352" sldId="258"/>
+            <ac:spMk id="2" creationId="{93AE5F7B-AD07-F285-6E3D-9B96C6892FC8}"/>
+          </ac:spMkLst>
+        </pc:spChg>
+        <pc:spChg chg="del">
+          <ac:chgData name="Felix Gervasi" userId="af4e32ee5822202e" providerId="LiveId" clId="{10BBE1F0-7463-48C6-86DF-5387D97B13FC}" dt="2022-11-06T11:00:39.508" v="1942" actId="478"/>
+          <ac:spMkLst>
+            <pc:docMk/>
+            <pc:sldMk cId="3586954352" sldId="258"/>
+            <ac:spMk id="3" creationId="{E5F509EE-7001-8A4B-6585-486D18AD6B7B}"/>
+          </ac:spMkLst>
+        </pc:spChg>
+        <pc:spChg chg="add mod">
+          <ac:chgData name="Felix Gervasi" userId="af4e32ee5822202e" providerId="LiveId" clId="{10BBE1F0-7463-48C6-86DF-5387D97B13FC}" dt="2022-11-06T11:13:22.031" v="2256" actId="1076"/>
+          <ac:spMkLst>
+            <pc:docMk/>
+            <pc:sldMk cId="3586954352" sldId="258"/>
+            <ac:spMk id="8" creationId="{3A0C8ACB-5BEE-9C6F-1AEE-51C0451E49B7}"/>
+          </ac:spMkLst>
+        </pc:spChg>
+        <pc:spChg chg="add mod">
+          <ac:chgData name="Felix Gervasi" userId="af4e32ee5822202e" providerId="LiveId" clId="{10BBE1F0-7463-48C6-86DF-5387D97B13FC}" dt="2022-11-06T11:13:22.031" v="2256" actId="1076"/>
+          <ac:spMkLst>
+            <pc:docMk/>
+            <pc:sldMk cId="3586954352" sldId="258"/>
+            <ac:spMk id="10" creationId="{29CCF273-BE3B-0043-E5E7-0C4F0205FAA6}"/>
+          </ac:spMkLst>
+        </pc:spChg>
+        <pc:spChg chg="add mod">
+          <ac:chgData name="Felix Gervasi" userId="af4e32ee5822202e" providerId="LiveId" clId="{10BBE1F0-7463-48C6-86DF-5387D97B13FC}" dt="2022-11-06T11:13:22.031" v="2256" actId="1076"/>
+          <ac:spMkLst>
+            <pc:docMk/>
+            <pc:sldMk cId="3586954352" sldId="258"/>
+            <ac:spMk id="23" creationId="{33BBB8B2-3E97-9886-D7C0-745AD2C396D6}"/>
+          </ac:spMkLst>
+        </pc:spChg>
+        <pc:spChg chg="add mod">
+          <ac:chgData name="Felix Gervasi" userId="af4e32ee5822202e" providerId="LiveId" clId="{10BBE1F0-7463-48C6-86DF-5387D97B13FC}" dt="2022-11-06T11:13:22.031" v="2256" actId="1076"/>
+          <ac:spMkLst>
+            <pc:docMk/>
+            <pc:sldMk cId="3586954352" sldId="258"/>
+            <ac:spMk id="28" creationId="{925298E6-B1E7-4636-E9DE-A7ECE7E211DD}"/>
+          </ac:spMkLst>
+        </pc:spChg>
+        <pc:spChg chg="add mod">
+          <ac:chgData name="Felix Gervasi" userId="af4e32ee5822202e" providerId="LiveId" clId="{10BBE1F0-7463-48C6-86DF-5387D97B13FC}" dt="2022-11-06T11:13:22.031" v="2256" actId="1076"/>
+          <ac:spMkLst>
+            <pc:docMk/>
+            <pc:sldMk cId="3586954352" sldId="258"/>
+            <ac:spMk id="31" creationId="{D4DCCB53-668D-ED6F-B552-D3689D8AD12B}"/>
+          </ac:spMkLst>
+        </pc:spChg>
+        <pc:spChg chg="add mod">
+          <ac:chgData name="Felix Gervasi" userId="af4e32ee5822202e" providerId="LiveId" clId="{10BBE1F0-7463-48C6-86DF-5387D97B13FC}" dt="2022-11-06T11:13:22.031" v="2256" actId="1076"/>
+          <ac:spMkLst>
+            <pc:docMk/>
+            <pc:sldMk cId="3586954352" sldId="258"/>
+            <ac:spMk id="34" creationId="{5089041E-A5E7-0973-B5EA-237EA36E54D5}"/>
+          </ac:spMkLst>
+        </pc:spChg>
+        <pc:spChg chg="add mod">
+          <ac:chgData name="Felix Gervasi" userId="af4e32ee5822202e" providerId="LiveId" clId="{10BBE1F0-7463-48C6-86DF-5387D97B13FC}" dt="2022-11-06T11:13:22.031" v="2256" actId="1076"/>
+          <ac:spMkLst>
+            <pc:docMk/>
+            <pc:sldMk cId="3586954352" sldId="258"/>
+            <ac:spMk id="36" creationId="{3ED3E273-5F3D-6C02-91F4-9759F58DA3AF}"/>
+          </ac:spMkLst>
+        </pc:spChg>
+        <pc:grpChg chg="add mod">
+          <ac:chgData name="Felix Gervasi" userId="af4e32ee5822202e" providerId="LiveId" clId="{10BBE1F0-7463-48C6-86DF-5387D97B13FC}" dt="2022-11-06T11:13:22.031" v="2256" actId="1076"/>
+          <ac:grpSpMkLst>
+            <pc:docMk/>
+            <pc:sldMk cId="3586954352" sldId="258"/>
+            <ac:grpSpMk id="37" creationId="{EC7150B6-C9EA-F700-2219-2D7E0BC4F7E8}"/>
+          </ac:grpSpMkLst>
+        </pc:grpChg>
+        <pc:picChg chg="add mod">
+          <ac:chgData name="Felix Gervasi" userId="af4e32ee5822202e" providerId="LiveId" clId="{10BBE1F0-7463-48C6-86DF-5387D97B13FC}" dt="2022-11-06T11:13:22.031" v="2256" actId="1076"/>
+          <ac:picMkLst>
+            <pc:docMk/>
+            <pc:sldMk cId="3586954352" sldId="258"/>
+            <ac:picMk id="5" creationId="{50A9D62F-93FE-3747-2A97-B7FBD83365DE}"/>
+          </ac:picMkLst>
+        </pc:picChg>
+        <pc:picChg chg="add mod">
+          <ac:chgData name="Felix Gervasi" userId="af4e32ee5822202e" providerId="LiveId" clId="{10BBE1F0-7463-48C6-86DF-5387D97B13FC}" dt="2022-11-06T11:13:22.031" v="2256" actId="1076"/>
+          <ac:picMkLst>
+            <pc:docMk/>
+            <pc:sldMk cId="3586954352" sldId="258"/>
+            <ac:picMk id="7" creationId="{B0D137FC-20D0-E132-9432-2804C8B4696E}"/>
+          </ac:picMkLst>
+        </pc:picChg>
+        <pc:picChg chg="add mod">
+          <ac:chgData name="Felix Gervasi" userId="af4e32ee5822202e" providerId="LiveId" clId="{10BBE1F0-7463-48C6-86DF-5387D97B13FC}" dt="2022-11-06T11:13:22.031" v="2256" actId="1076"/>
+          <ac:picMkLst>
+            <pc:docMk/>
+            <pc:sldMk cId="3586954352" sldId="258"/>
+            <ac:picMk id="9" creationId="{C48EC655-362A-889B-88CA-748125A91E87}"/>
+          </ac:picMkLst>
+        </pc:picChg>
+        <pc:picChg chg="add mod">
+          <ac:chgData name="Felix Gervasi" userId="af4e32ee5822202e" providerId="LiveId" clId="{10BBE1F0-7463-48C6-86DF-5387D97B13FC}" dt="2022-11-06T11:13:22.031" v="2256" actId="1076"/>
+          <ac:picMkLst>
+            <pc:docMk/>
+            <pc:sldMk cId="3586954352" sldId="258"/>
+            <ac:picMk id="12" creationId="{897E5105-D153-3C33-A63A-76FA52071BC2}"/>
+          </ac:picMkLst>
+        </pc:picChg>
+        <pc:picChg chg="add mod">
+          <ac:chgData name="Felix Gervasi" userId="af4e32ee5822202e" providerId="LiveId" clId="{10BBE1F0-7463-48C6-86DF-5387D97B13FC}" dt="2022-11-06T11:13:22.031" v="2256" actId="1076"/>
+          <ac:picMkLst>
+            <pc:docMk/>
+            <pc:sldMk cId="3586954352" sldId="258"/>
+            <ac:picMk id="14" creationId="{4BCC6B7B-CC7D-B1B8-1CFC-6BE87B6B2C30}"/>
+          </ac:picMkLst>
+        </pc:picChg>
+        <pc:picChg chg="add del mod">
+          <ac:chgData name="Felix Gervasi" userId="af4e32ee5822202e" providerId="LiveId" clId="{10BBE1F0-7463-48C6-86DF-5387D97B13FC}" dt="2022-11-06T11:06:11.918" v="2012" actId="478"/>
+          <ac:picMkLst>
+            <pc:docMk/>
+            <pc:sldMk cId="3586954352" sldId="258"/>
+            <ac:picMk id="16" creationId="{11B73D1A-22DB-18A3-E25D-44F8EFBB8471}"/>
+          </ac:picMkLst>
+        </pc:picChg>
+        <pc:picChg chg="add mod">
+          <ac:chgData name="Felix Gervasi" userId="af4e32ee5822202e" providerId="LiveId" clId="{10BBE1F0-7463-48C6-86DF-5387D97B13FC}" dt="2022-11-06T11:13:22.031" v="2256" actId="1076"/>
+          <ac:picMkLst>
+            <pc:docMk/>
+            <pc:sldMk cId="3586954352" sldId="258"/>
+            <ac:picMk id="30" creationId="{33DC94F3-A4A8-3C18-5B5B-BA58D8FC2145}"/>
+          </ac:picMkLst>
+        </pc:picChg>
+        <pc:picChg chg="add mod">
+          <ac:chgData name="Felix Gervasi" userId="af4e32ee5822202e" providerId="LiveId" clId="{10BBE1F0-7463-48C6-86DF-5387D97B13FC}" dt="2022-11-06T11:13:22.031" v="2256" actId="1076"/>
+          <ac:picMkLst>
+            <pc:docMk/>
+            <pc:sldMk cId="3586954352" sldId="258"/>
+            <ac:picMk id="35" creationId="{193ACE0E-6F33-29F8-8FB9-9FA6EC93030D}"/>
+          </ac:picMkLst>
+        </pc:picChg>
+        <pc:picChg chg="add mod">
+          <ac:chgData name="Felix Gervasi" userId="af4e32ee5822202e" providerId="LiveId" clId="{10BBE1F0-7463-48C6-86DF-5387D97B13FC}" dt="2022-11-06T11:13:22.031" v="2256" actId="1076"/>
+          <ac:picMkLst>
+            <pc:docMk/>
+            <pc:sldMk cId="3586954352" sldId="258"/>
+            <ac:picMk id="1026" creationId="{59102240-E4FF-CBD5-11EF-43836FD2B407}"/>
+          </ac:picMkLst>
+        </pc:picChg>
+        <pc:cxnChg chg="add mod">
+          <ac:chgData name="Felix Gervasi" userId="af4e32ee5822202e" providerId="LiveId" clId="{10BBE1F0-7463-48C6-86DF-5387D97B13FC}" dt="2022-11-06T11:13:22.031" v="2256" actId="1076"/>
+          <ac:cxnSpMkLst>
+            <pc:docMk/>
+            <pc:sldMk cId="3586954352" sldId="258"/>
+            <ac:cxnSpMk id="18" creationId="{1483D867-9E99-3984-C733-EA5E12223752}"/>
+          </ac:cxnSpMkLst>
+        </pc:cxnChg>
+        <pc:cxnChg chg="add mod">
+          <ac:chgData name="Felix Gervasi" userId="af4e32ee5822202e" providerId="LiveId" clId="{10BBE1F0-7463-48C6-86DF-5387D97B13FC}" dt="2022-11-06T11:13:22.031" v="2256" actId="1076"/>
+          <ac:cxnSpMkLst>
+            <pc:docMk/>
+            <pc:sldMk cId="3586954352" sldId="258"/>
+            <ac:cxnSpMk id="24" creationId="{E7507C6D-BE63-6798-91C1-2A237583A8C0}"/>
+          </ac:cxnSpMkLst>
+        </pc:cxnChg>
+        <pc:cxnChg chg="add mod">
+          <ac:chgData name="Felix Gervasi" userId="af4e32ee5822202e" providerId="LiveId" clId="{10BBE1F0-7463-48C6-86DF-5387D97B13FC}" dt="2022-11-06T11:13:22.031" v="2256" actId="1076"/>
+          <ac:cxnSpMkLst>
+            <pc:docMk/>
+            <pc:sldMk cId="3586954352" sldId="258"/>
+            <ac:cxnSpMk id="32" creationId="{8BEE0669-0EF2-8BC1-8FA4-74E62B936C65}"/>
           </ac:cxnSpMkLst>
         </pc:cxnChg>
       </pc:sldChg>
@@ -843,7 +1027,7 @@
           <a:p>
             <a:fld id="{DED31D0E-D858-474B-B44B-3BC714FC9DF3}" type="datetimeFigureOut">
               <a:rPr lang="de-DE" smtClean="0"/>
-              <a:t>13.10.2022</a:t>
+              <a:t>06.11.2022</a:t>
             </a:fld>
             <a:endParaRPr lang="de-DE"/>
           </a:p>
@@ -1041,7 +1225,7 @@
           <a:p>
             <a:fld id="{DED31D0E-D858-474B-B44B-3BC714FC9DF3}" type="datetimeFigureOut">
               <a:rPr lang="de-DE" smtClean="0"/>
-              <a:t>13.10.2022</a:t>
+              <a:t>06.11.2022</a:t>
             </a:fld>
             <a:endParaRPr lang="de-DE"/>
           </a:p>
@@ -1249,7 +1433,7 @@
           <a:p>
             <a:fld id="{DED31D0E-D858-474B-B44B-3BC714FC9DF3}" type="datetimeFigureOut">
               <a:rPr lang="de-DE" smtClean="0"/>
-              <a:t>13.10.2022</a:t>
+              <a:t>06.11.2022</a:t>
             </a:fld>
             <a:endParaRPr lang="de-DE"/>
           </a:p>
@@ -1447,7 +1631,7 @@
           <a:p>
             <a:fld id="{DED31D0E-D858-474B-B44B-3BC714FC9DF3}" type="datetimeFigureOut">
               <a:rPr lang="de-DE" smtClean="0"/>
-              <a:t>13.10.2022</a:t>
+              <a:t>06.11.2022</a:t>
             </a:fld>
             <a:endParaRPr lang="de-DE"/>
           </a:p>
@@ -1722,7 +1906,7 @@
           <a:p>
             <a:fld id="{DED31D0E-D858-474B-B44B-3BC714FC9DF3}" type="datetimeFigureOut">
               <a:rPr lang="de-DE" smtClean="0"/>
-              <a:t>13.10.2022</a:t>
+              <a:t>06.11.2022</a:t>
             </a:fld>
             <a:endParaRPr lang="de-DE"/>
           </a:p>
@@ -1987,7 +2171,7 @@
           <a:p>
             <a:fld id="{DED31D0E-D858-474B-B44B-3BC714FC9DF3}" type="datetimeFigureOut">
               <a:rPr lang="de-DE" smtClean="0"/>
-              <a:t>13.10.2022</a:t>
+              <a:t>06.11.2022</a:t>
             </a:fld>
             <a:endParaRPr lang="de-DE"/>
           </a:p>
@@ -2399,7 +2583,7 @@
           <a:p>
             <a:fld id="{DED31D0E-D858-474B-B44B-3BC714FC9DF3}" type="datetimeFigureOut">
               <a:rPr lang="de-DE" smtClean="0"/>
-              <a:t>13.10.2022</a:t>
+              <a:t>06.11.2022</a:t>
             </a:fld>
             <a:endParaRPr lang="de-DE"/>
           </a:p>
@@ -2540,7 +2724,7 @@
           <a:p>
             <a:fld id="{DED31D0E-D858-474B-B44B-3BC714FC9DF3}" type="datetimeFigureOut">
               <a:rPr lang="de-DE" smtClean="0"/>
-              <a:t>13.10.2022</a:t>
+              <a:t>06.11.2022</a:t>
             </a:fld>
             <a:endParaRPr lang="de-DE"/>
           </a:p>
@@ -2653,7 +2837,7 @@
           <a:p>
             <a:fld id="{DED31D0E-D858-474B-B44B-3BC714FC9DF3}" type="datetimeFigureOut">
               <a:rPr lang="de-DE" smtClean="0"/>
-              <a:t>13.10.2022</a:t>
+              <a:t>06.11.2022</a:t>
             </a:fld>
             <a:endParaRPr lang="de-DE"/>
           </a:p>
@@ -2964,7 +3148,7 @@
           <a:p>
             <a:fld id="{DED31D0E-D858-474B-B44B-3BC714FC9DF3}" type="datetimeFigureOut">
               <a:rPr lang="de-DE" smtClean="0"/>
-              <a:t>13.10.2022</a:t>
+              <a:t>06.11.2022</a:t>
             </a:fld>
             <a:endParaRPr lang="de-DE"/>
           </a:p>
@@ -3252,7 +3436,7 @@
           <a:p>
             <a:fld id="{DED31D0E-D858-474B-B44B-3BC714FC9DF3}" type="datetimeFigureOut">
               <a:rPr lang="de-DE" smtClean="0"/>
-              <a:t>13.10.2022</a:t>
+              <a:t>06.11.2022</a:t>
             </a:fld>
             <a:endParaRPr lang="de-DE"/>
           </a:p>
@@ -3493,7 +3677,7 @@
           <a:p>
             <a:fld id="{DED31D0E-D858-474B-B44B-3BC714FC9DF3}" type="datetimeFigureOut">
               <a:rPr lang="de-DE" smtClean="0"/>
-              <a:t>13.10.2022</a:t>
+              <a:t>06.11.2022</a:t>
             </a:fld>
             <a:endParaRPr lang="de-DE"/>
           </a:p>
@@ -5953,6 +6137,751 @@
 </p:sld>
 </file>
 
+<file path=ppt/slides/slide3.xml><?xml version="1.0" encoding="utf-8"?>
+<p:sld xmlns:a="http://schemas.openxmlformats.org/drawingml/2006/main" xmlns:r="http://schemas.openxmlformats.org/officeDocument/2006/relationships" xmlns:p="http://schemas.openxmlformats.org/presentationml/2006/main">
+  <p:cSld>
+    <p:spTree>
+      <p:nvGrpSpPr>
+        <p:cNvPr id="1" name=""/>
+        <p:cNvGrpSpPr/>
+        <p:nvPr/>
+      </p:nvGrpSpPr>
+      <p:grpSpPr>
+        <a:xfrm>
+          <a:off x="0" y="0"/>
+          <a:ext cx="0" cy="0"/>
+          <a:chOff x="0" y="0"/>
+          <a:chExt cx="0" cy="0"/>
+        </a:xfrm>
+      </p:grpSpPr>
+      <p:grpSp>
+        <p:nvGrpSpPr>
+          <p:cNvPr id="37" name="Gruppieren 36">
+            <a:extLst>
+              <a:ext uri="{FF2B5EF4-FFF2-40B4-BE49-F238E27FC236}">
+                <a16:creationId xmlns:a16="http://schemas.microsoft.com/office/drawing/2014/main" id="{EC7150B6-C9EA-F700-2219-2D7E0BC4F7E8}"/>
+              </a:ext>
+            </a:extLst>
+          </p:cNvPr>
+          <p:cNvGrpSpPr/>
+          <p:nvPr/>
+        </p:nvGrpSpPr>
+        <p:grpSpPr>
+          <a:xfrm>
+            <a:off x="2123861" y="790676"/>
+            <a:ext cx="7796858" cy="5276647"/>
+            <a:chOff x="2461791" y="1372104"/>
+            <a:chExt cx="7796858" cy="5276647"/>
+          </a:xfrm>
+        </p:grpSpPr>
+        <p:pic>
+          <p:nvPicPr>
+            <p:cNvPr id="5" name="Grafik 4" descr="Mann mit einfarbiger Füllung">
+              <a:extLst>
+                <a:ext uri="{FF2B5EF4-FFF2-40B4-BE49-F238E27FC236}">
+                  <a16:creationId xmlns:a16="http://schemas.microsoft.com/office/drawing/2014/main" id="{50A9D62F-93FE-3747-2A97-B7FBD83365DE}"/>
+                </a:ext>
+              </a:extLst>
+            </p:cNvPr>
+            <p:cNvPicPr>
+              <a:picLocks noChangeAspect="1"/>
+            </p:cNvPicPr>
+            <p:nvPr/>
+          </p:nvPicPr>
+          <p:blipFill>
+            <a:blip r:embed="rId2">
+              <a:extLst>
+                <a:ext uri="{28A0092B-C50C-407E-A947-70E740481C1C}">
+                  <a14:useLocalDpi xmlns:a14="http://schemas.microsoft.com/office/drawing/2010/main" val="0"/>
+                </a:ext>
+                <a:ext uri="{96DAC541-7B7A-43D3-8B79-37D633B846F1}">
+                  <asvg:svgBlip xmlns:asvg="http://schemas.microsoft.com/office/drawing/2016/SVG/main" r:embed="rId3"/>
+                </a:ext>
+              </a:extLst>
+            </a:blip>
+            <a:stretch>
+              <a:fillRect/>
+            </a:stretch>
+          </p:blipFill>
+          <p:spPr>
+            <a:xfrm>
+              <a:off x="2501548" y="2276496"/>
+              <a:ext cx="914400" cy="914400"/>
+            </a:xfrm>
+            <a:prstGeom prst="rect">
+              <a:avLst/>
+            </a:prstGeom>
+          </p:spPr>
+        </p:pic>
+        <p:pic>
+          <p:nvPicPr>
+            <p:cNvPr id="7" name="Grafik 6" descr="Megafon1 mit einfarbiger Füllung">
+              <a:extLst>
+                <a:ext uri="{FF2B5EF4-FFF2-40B4-BE49-F238E27FC236}">
+                  <a16:creationId xmlns:a16="http://schemas.microsoft.com/office/drawing/2014/main" id="{B0D137FC-20D0-E132-9432-2804C8B4696E}"/>
+                </a:ext>
+              </a:extLst>
+            </p:cNvPr>
+            <p:cNvPicPr>
+              <a:picLocks noChangeAspect="1"/>
+            </p:cNvPicPr>
+            <p:nvPr/>
+          </p:nvPicPr>
+          <p:blipFill>
+            <a:blip r:embed="rId4">
+              <a:extLst>
+                <a:ext uri="{28A0092B-C50C-407E-A947-70E740481C1C}">
+                  <a14:useLocalDpi xmlns:a14="http://schemas.microsoft.com/office/drawing/2010/main" val="0"/>
+                </a:ext>
+                <a:ext uri="{96DAC541-7B7A-43D3-8B79-37D633B846F1}">
+                  <asvg:svgBlip xmlns:asvg="http://schemas.microsoft.com/office/drawing/2016/SVG/main" r:embed="rId5"/>
+                </a:ext>
+              </a:extLst>
+            </a:blip>
+            <a:stretch>
+              <a:fillRect/>
+            </a:stretch>
+          </p:blipFill>
+          <p:spPr>
+            <a:xfrm rot="1338871">
+              <a:off x="3070267" y="1990241"/>
+              <a:ext cx="731744" cy="731744"/>
+            </a:xfrm>
+            <a:prstGeom prst="rect">
+              <a:avLst/>
+            </a:prstGeom>
+          </p:spPr>
+        </p:pic>
+        <p:sp>
+          <p:nvSpPr>
+            <p:cNvPr id="8" name="Textfeld 7">
+              <a:extLst>
+                <a:ext uri="{FF2B5EF4-FFF2-40B4-BE49-F238E27FC236}">
+                  <a16:creationId xmlns:a16="http://schemas.microsoft.com/office/drawing/2014/main" id="{3A0C8ACB-5BEE-9C6F-1AEE-51C0451E49B7}"/>
+                </a:ext>
+              </a:extLst>
+            </p:cNvPr>
+            <p:cNvSpPr txBox="1"/>
+            <p:nvPr/>
+          </p:nvSpPr>
+          <p:spPr>
+            <a:xfrm>
+              <a:off x="2461791" y="1834205"/>
+              <a:ext cx="1085022" cy="369332"/>
+            </a:xfrm>
+            <a:prstGeom prst="rect">
+              <a:avLst/>
+            </a:prstGeom>
+            <a:noFill/>
+          </p:spPr>
+          <p:txBody>
+            <a:bodyPr wrap="square" rtlCol="0">
+              <a:spAutoFit/>
+            </a:bodyPr>
+            <a:lstStyle/>
+            <a:p>
+              <a:pPr algn="ctr"/>
+              <a:r>
+                <a:rPr lang="de-DE" dirty="0"/>
+                <a:t>Benutzer</a:t>
+              </a:r>
+            </a:p>
+          </p:txBody>
+        </p:sp>
+        <p:pic>
+          <p:nvPicPr>
+            <p:cNvPr id="9" name="Grafik 8">
+              <a:extLst>
+                <a:ext uri="{FF2B5EF4-FFF2-40B4-BE49-F238E27FC236}">
+                  <a16:creationId xmlns:a16="http://schemas.microsoft.com/office/drawing/2014/main" id="{C48EC655-362A-889B-88CA-748125A91E87}"/>
+                </a:ext>
+              </a:extLst>
+            </p:cNvPr>
+            <p:cNvPicPr>
+              <a:picLocks noChangeAspect="1"/>
+            </p:cNvPicPr>
+            <p:nvPr/>
+          </p:nvPicPr>
+          <p:blipFill>
+            <a:blip r:embed="rId6"/>
+            <a:stretch>
+              <a:fillRect/>
+            </a:stretch>
+          </p:blipFill>
+          <p:spPr>
+            <a:xfrm>
+              <a:off x="6485284" y="2057189"/>
+              <a:ext cx="2802834" cy="1649850"/>
+            </a:xfrm>
+            <a:prstGeom prst="rect">
+              <a:avLst/>
+            </a:prstGeom>
+          </p:spPr>
+        </p:pic>
+        <p:sp>
+          <p:nvSpPr>
+            <p:cNvPr id="10" name="Textfeld 9">
+              <a:extLst>
+                <a:ext uri="{FF2B5EF4-FFF2-40B4-BE49-F238E27FC236}">
+                  <a16:creationId xmlns:a16="http://schemas.microsoft.com/office/drawing/2014/main" id="{29CCF273-BE3B-0043-E5E7-0C4F0205FAA6}"/>
+                </a:ext>
+              </a:extLst>
+            </p:cNvPr>
+            <p:cNvSpPr txBox="1"/>
+            <p:nvPr/>
+          </p:nvSpPr>
+          <p:spPr>
+            <a:xfrm>
+              <a:off x="7190962" y="1372104"/>
+              <a:ext cx="1391478" cy="646331"/>
+            </a:xfrm>
+            <a:prstGeom prst="rect">
+              <a:avLst/>
+            </a:prstGeom>
+            <a:noFill/>
+          </p:spPr>
+          <p:txBody>
+            <a:bodyPr wrap="square" rtlCol="0">
+              <a:spAutoFit/>
+            </a:bodyPr>
+            <a:lstStyle/>
+            <a:p>
+              <a:pPr algn="ctr"/>
+              <a:r>
+                <a:rPr lang="de-DE" dirty="0"/>
+                <a:t>Raspberry PI 4/3B/3B+</a:t>
+              </a:r>
+            </a:p>
+          </p:txBody>
+        </p:sp>
+        <p:pic>
+          <p:nvPicPr>
+            <p:cNvPr id="12" name="Grafik 11" descr="Mikrofon mit einfarbiger Füllung">
+              <a:extLst>
+                <a:ext uri="{FF2B5EF4-FFF2-40B4-BE49-F238E27FC236}">
+                  <a16:creationId xmlns:a16="http://schemas.microsoft.com/office/drawing/2014/main" id="{897E5105-D153-3C33-A63A-76FA52071BC2}"/>
+                </a:ext>
+              </a:extLst>
+            </p:cNvPr>
+            <p:cNvPicPr>
+              <a:picLocks noChangeAspect="1"/>
+            </p:cNvPicPr>
+            <p:nvPr/>
+          </p:nvPicPr>
+          <p:blipFill>
+            <a:blip r:embed="rId7">
+              <a:extLst>
+                <a:ext uri="{28A0092B-C50C-407E-A947-70E740481C1C}">
+                  <a14:useLocalDpi xmlns:a14="http://schemas.microsoft.com/office/drawing/2010/main" val="0"/>
+                </a:ext>
+                <a:ext uri="{96DAC541-7B7A-43D3-8B79-37D633B846F1}">
+                  <asvg:svgBlip xmlns:asvg="http://schemas.microsoft.com/office/drawing/2016/SVG/main" r:embed="rId8"/>
+                </a:ext>
+              </a:extLst>
+            </a:blip>
+            <a:stretch>
+              <a:fillRect/>
+            </a:stretch>
+          </p:blipFill>
+          <p:spPr>
+            <a:xfrm>
+              <a:off x="5699419" y="1695269"/>
+              <a:ext cx="914400" cy="914400"/>
+            </a:xfrm>
+            <a:prstGeom prst="rect">
+              <a:avLst/>
+            </a:prstGeom>
+          </p:spPr>
+        </p:pic>
+        <p:pic>
+          <p:nvPicPr>
+            <p:cNvPr id="14" name="Grafik 13" descr="Volumen mit einfarbiger Füllung">
+              <a:extLst>
+                <a:ext uri="{FF2B5EF4-FFF2-40B4-BE49-F238E27FC236}">
+                  <a16:creationId xmlns:a16="http://schemas.microsoft.com/office/drawing/2014/main" id="{4BCC6B7B-CC7D-B1B8-1CFC-6BE87B6B2C30}"/>
+                </a:ext>
+              </a:extLst>
+            </p:cNvPr>
+            <p:cNvPicPr>
+              <a:picLocks noChangeAspect="1"/>
+            </p:cNvPicPr>
+            <p:nvPr/>
+          </p:nvPicPr>
+          <p:blipFill>
+            <a:blip r:embed="rId9">
+              <a:extLst>
+                <a:ext uri="{28A0092B-C50C-407E-A947-70E740481C1C}">
+                  <a14:useLocalDpi xmlns:a14="http://schemas.microsoft.com/office/drawing/2010/main" val="0"/>
+                </a:ext>
+                <a:ext uri="{96DAC541-7B7A-43D3-8B79-37D633B846F1}">
+                  <asvg:svgBlip xmlns:asvg="http://schemas.microsoft.com/office/drawing/2016/SVG/main" r:embed="rId10"/>
+                </a:ext>
+              </a:extLst>
+            </a:blip>
+            <a:stretch>
+              <a:fillRect/>
+            </a:stretch>
+          </p:blipFill>
+          <p:spPr>
+            <a:xfrm rot="10800000">
+              <a:off x="5616126" y="2593901"/>
+              <a:ext cx="914400" cy="914400"/>
+            </a:xfrm>
+            <a:prstGeom prst="rect">
+              <a:avLst/>
+            </a:prstGeom>
+          </p:spPr>
+        </p:pic>
+        <p:cxnSp>
+          <p:nvCxnSpPr>
+            <p:cNvPr id="18" name="Gerade Verbindung mit Pfeil 17">
+              <a:extLst>
+                <a:ext uri="{FF2B5EF4-FFF2-40B4-BE49-F238E27FC236}">
+                  <a16:creationId xmlns:a16="http://schemas.microsoft.com/office/drawing/2014/main" id="{1483D867-9E99-3984-C733-EA5E12223752}"/>
+                </a:ext>
+              </a:extLst>
+            </p:cNvPr>
+            <p:cNvCxnSpPr>
+              <a:cxnSpLocks/>
+            </p:cNvCxnSpPr>
+            <p:nvPr/>
+          </p:nvCxnSpPr>
+          <p:spPr>
+            <a:xfrm>
+              <a:off x="3930452" y="2276496"/>
+              <a:ext cx="1462710" cy="0"/>
+            </a:xfrm>
+            <a:prstGeom prst="straightConnector1">
+              <a:avLst/>
+            </a:prstGeom>
+            <a:ln w="25400">
+              <a:solidFill>
+                <a:schemeClr val="tx1"/>
+              </a:solidFill>
+              <a:tailEnd type="triangle"/>
+            </a:ln>
+          </p:spPr>
+          <p:style>
+            <a:lnRef idx="1">
+              <a:schemeClr val="accent1"/>
+            </a:lnRef>
+            <a:fillRef idx="0">
+              <a:schemeClr val="accent1"/>
+            </a:fillRef>
+            <a:effectRef idx="0">
+              <a:schemeClr val="accent1"/>
+            </a:effectRef>
+            <a:fontRef idx="minor">
+              <a:schemeClr val="tx1"/>
+            </a:fontRef>
+          </p:style>
+        </p:cxnSp>
+        <p:sp>
+          <p:nvSpPr>
+            <p:cNvPr id="23" name="Textfeld 22">
+              <a:extLst>
+                <a:ext uri="{FF2B5EF4-FFF2-40B4-BE49-F238E27FC236}">
+                  <a16:creationId xmlns:a16="http://schemas.microsoft.com/office/drawing/2014/main" id="{33BBB8B2-3E97-9886-D7C0-745AD2C396D6}"/>
+                </a:ext>
+              </a:extLst>
+            </p:cNvPr>
+            <p:cNvSpPr txBox="1"/>
+            <p:nvPr/>
+          </p:nvSpPr>
+          <p:spPr>
+            <a:xfrm>
+              <a:off x="3882414" y="1695269"/>
+              <a:ext cx="1558786" cy="369332"/>
+            </a:xfrm>
+            <a:prstGeom prst="rect">
+              <a:avLst/>
+            </a:prstGeom>
+            <a:noFill/>
+          </p:spPr>
+          <p:txBody>
+            <a:bodyPr wrap="square" rtlCol="0">
+              <a:spAutoFit/>
+            </a:bodyPr>
+            <a:lstStyle/>
+            <a:p>
+              <a:pPr algn="ctr"/>
+              <a:r>
+                <a:rPr lang="de-DE" dirty="0"/>
+                <a:t>Spracheingabe</a:t>
+              </a:r>
+            </a:p>
+          </p:txBody>
+        </p:sp>
+        <p:cxnSp>
+          <p:nvCxnSpPr>
+            <p:cNvPr id="24" name="Gerade Verbindung mit Pfeil 23">
+              <a:extLst>
+                <a:ext uri="{FF2B5EF4-FFF2-40B4-BE49-F238E27FC236}">
+                  <a16:creationId xmlns:a16="http://schemas.microsoft.com/office/drawing/2014/main" id="{E7507C6D-BE63-6798-91C1-2A237583A8C0}"/>
+                </a:ext>
+              </a:extLst>
+            </p:cNvPr>
+            <p:cNvCxnSpPr>
+              <a:cxnSpLocks/>
+            </p:cNvCxnSpPr>
+            <p:nvPr/>
+          </p:nvCxnSpPr>
+          <p:spPr>
+            <a:xfrm flipH="1">
+              <a:off x="3913530" y="3051101"/>
+              <a:ext cx="1462710" cy="0"/>
+            </a:xfrm>
+            <a:prstGeom prst="straightConnector1">
+              <a:avLst/>
+            </a:prstGeom>
+            <a:ln w="25400">
+              <a:solidFill>
+                <a:schemeClr val="tx1"/>
+              </a:solidFill>
+              <a:tailEnd type="triangle"/>
+            </a:ln>
+          </p:spPr>
+          <p:style>
+            <a:lnRef idx="1">
+              <a:schemeClr val="accent1"/>
+            </a:lnRef>
+            <a:fillRef idx="0">
+              <a:schemeClr val="accent1"/>
+            </a:fillRef>
+            <a:effectRef idx="0">
+              <a:schemeClr val="accent1"/>
+            </a:effectRef>
+            <a:fontRef idx="minor">
+              <a:schemeClr val="tx1"/>
+            </a:fontRef>
+          </p:style>
+        </p:cxnSp>
+        <p:sp>
+          <p:nvSpPr>
+            <p:cNvPr id="28" name="Textfeld 27">
+              <a:extLst>
+                <a:ext uri="{FF2B5EF4-FFF2-40B4-BE49-F238E27FC236}">
+                  <a16:creationId xmlns:a16="http://schemas.microsoft.com/office/drawing/2014/main" id="{925298E6-B1E7-4636-E9DE-A7ECE7E211DD}"/>
+                </a:ext>
+              </a:extLst>
+            </p:cNvPr>
+            <p:cNvSpPr txBox="1"/>
+            <p:nvPr/>
+          </p:nvSpPr>
+          <p:spPr>
+            <a:xfrm>
+              <a:off x="3928549" y="2652744"/>
+              <a:ext cx="1402449" cy="369332"/>
+            </a:xfrm>
+            <a:prstGeom prst="rect">
+              <a:avLst/>
+            </a:prstGeom>
+            <a:noFill/>
+          </p:spPr>
+          <p:txBody>
+            <a:bodyPr wrap="square" rtlCol="0">
+              <a:spAutoFit/>
+            </a:bodyPr>
+            <a:lstStyle/>
+            <a:p>
+              <a:pPr algn="ctr"/>
+              <a:r>
+                <a:rPr lang="de-DE" dirty="0"/>
+                <a:t>Tonausgabe</a:t>
+              </a:r>
+            </a:p>
+          </p:txBody>
+        </p:sp>
+        <p:pic>
+          <p:nvPicPr>
+            <p:cNvPr id="1026" name="Picture 2" descr="Arduino Uno SMD Rev3 | Elektor">
+              <a:extLst>
+                <a:ext uri="{FF2B5EF4-FFF2-40B4-BE49-F238E27FC236}">
+                  <a16:creationId xmlns:a16="http://schemas.microsoft.com/office/drawing/2014/main" id="{59102240-E4FF-CBD5-11EF-43836FD2B407}"/>
+                </a:ext>
+              </a:extLst>
+            </p:cNvPr>
+            <p:cNvPicPr>
+              <a:picLocks noChangeAspect="1" noChangeArrowheads="1"/>
+            </p:cNvPicPr>
+            <p:nvPr/>
+          </p:nvPicPr>
+          <p:blipFill>
+            <a:blip r:embed="rId11">
+              <a:extLst>
+                <a:ext uri="{28A0092B-C50C-407E-A947-70E740481C1C}">
+                  <a14:useLocalDpi xmlns:a14="http://schemas.microsoft.com/office/drawing/2010/main" val="0"/>
+                </a:ext>
+              </a:extLst>
+            </a:blip>
+            <a:srcRect/>
+            <a:stretch>
+              <a:fillRect/>
+            </a:stretch>
+          </p:blipFill>
+          <p:spPr bwMode="auto">
+            <a:xfrm>
+              <a:off x="7141289" y="4998901"/>
+              <a:ext cx="1649850" cy="1649850"/>
+            </a:xfrm>
+            <a:prstGeom prst="rect">
+              <a:avLst/>
+            </a:prstGeom>
+            <a:noFill/>
+            <a:extLst>
+              <a:ext uri="{909E8E84-426E-40DD-AFC4-6F175D3DCCD1}">
+                <a14:hiddenFill xmlns:a14="http://schemas.microsoft.com/office/drawing/2010/main">
+                  <a:solidFill>
+                    <a:srgbClr val="FFFFFF"/>
+                  </a:solidFill>
+                </a14:hiddenFill>
+              </a:ext>
+            </a:extLst>
+          </p:spPr>
+        </p:pic>
+        <p:pic>
+          <p:nvPicPr>
+            <p:cNvPr id="30" name="Grafik 29" descr="Pfeil mit einer Linie: Nach links drehen mit einfarbiger Füllung">
+              <a:extLst>
+                <a:ext uri="{FF2B5EF4-FFF2-40B4-BE49-F238E27FC236}">
+                  <a16:creationId xmlns:a16="http://schemas.microsoft.com/office/drawing/2014/main" id="{33DC94F3-A4A8-3C18-5B5B-BA58D8FC2145}"/>
+                </a:ext>
+              </a:extLst>
+            </p:cNvPr>
+            <p:cNvPicPr>
+              <a:picLocks noChangeAspect="1"/>
+            </p:cNvPicPr>
+            <p:nvPr/>
+          </p:nvPicPr>
+          <p:blipFill>
+            <a:blip r:embed="rId12">
+              <a:extLst>
+                <a:ext uri="{28A0092B-C50C-407E-A947-70E740481C1C}">
+                  <a14:useLocalDpi xmlns:a14="http://schemas.microsoft.com/office/drawing/2010/main" val="0"/>
+                </a:ext>
+                <a:ext uri="{96DAC541-7B7A-43D3-8B79-37D633B846F1}">
+                  <asvg:svgBlip xmlns:asvg="http://schemas.microsoft.com/office/drawing/2016/SVG/main" r:embed="rId13"/>
+                </a:ext>
+              </a:extLst>
+            </a:blip>
+            <a:stretch>
+              <a:fillRect/>
+            </a:stretch>
+          </p:blipFill>
+          <p:spPr>
+            <a:xfrm rot="5400000">
+              <a:off x="9179461" y="2593900"/>
+              <a:ext cx="784517" cy="784517"/>
+            </a:xfrm>
+            <a:prstGeom prst="rect">
+              <a:avLst/>
+            </a:prstGeom>
+          </p:spPr>
+        </p:pic>
+        <p:sp>
+          <p:nvSpPr>
+            <p:cNvPr id="31" name="Textfeld 30">
+              <a:extLst>
+                <a:ext uri="{FF2B5EF4-FFF2-40B4-BE49-F238E27FC236}">
+                  <a16:creationId xmlns:a16="http://schemas.microsoft.com/office/drawing/2014/main" id="{D4DCCB53-668D-ED6F-B552-D3689D8AD12B}"/>
+                </a:ext>
+              </a:extLst>
+            </p:cNvPr>
+            <p:cNvSpPr txBox="1"/>
+            <p:nvPr/>
+          </p:nvSpPr>
+          <p:spPr>
+            <a:xfrm rot="5400000">
+              <a:off x="9050252" y="2903666"/>
+              <a:ext cx="2047461" cy="369332"/>
+            </a:xfrm>
+            <a:prstGeom prst="rect">
+              <a:avLst/>
+            </a:prstGeom>
+            <a:noFill/>
+          </p:spPr>
+          <p:txBody>
+            <a:bodyPr wrap="square" rtlCol="0">
+              <a:spAutoFit/>
+            </a:bodyPr>
+            <a:lstStyle/>
+            <a:p>
+              <a:r>
+                <a:rPr lang="de-DE" dirty="0"/>
+                <a:t>Sprachverarbeitung</a:t>
+              </a:r>
+            </a:p>
+          </p:txBody>
+        </p:sp>
+        <p:cxnSp>
+          <p:nvCxnSpPr>
+            <p:cNvPr id="32" name="Gerade Verbindung mit Pfeil 31">
+              <a:extLst>
+                <a:ext uri="{FF2B5EF4-FFF2-40B4-BE49-F238E27FC236}">
+                  <a16:creationId xmlns:a16="http://schemas.microsoft.com/office/drawing/2014/main" id="{8BEE0669-0EF2-8BC1-8FA4-74E62B936C65}"/>
+                </a:ext>
+              </a:extLst>
+            </p:cNvPr>
+            <p:cNvCxnSpPr>
+              <a:cxnSpLocks/>
+            </p:cNvCxnSpPr>
+            <p:nvPr/>
+          </p:nvCxnSpPr>
+          <p:spPr>
+            <a:xfrm>
+              <a:off x="8013579" y="3945578"/>
+              <a:ext cx="0" cy="1188947"/>
+            </a:xfrm>
+            <a:prstGeom prst="straightConnector1">
+              <a:avLst/>
+            </a:prstGeom>
+            <a:ln w="25400">
+              <a:solidFill>
+                <a:schemeClr val="tx1"/>
+              </a:solidFill>
+              <a:tailEnd type="triangle"/>
+            </a:ln>
+          </p:spPr>
+          <p:style>
+            <a:lnRef idx="1">
+              <a:schemeClr val="accent1"/>
+            </a:lnRef>
+            <a:fillRef idx="0">
+              <a:schemeClr val="accent1"/>
+            </a:fillRef>
+            <a:effectRef idx="0">
+              <a:schemeClr val="accent1"/>
+            </a:effectRef>
+            <a:fontRef idx="minor">
+              <a:schemeClr val="tx1"/>
+            </a:fontRef>
+          </p:style>
+        </p:cxnSp>
+        <p:sp>
+          <p:nvSpPr>
+            <p:cNvPr id="34" name="Textfeld 33">
+              <a:extLst>
+                <a:ext uri="{FF2B5EF4-FFF2-40B4-BE49-F238E27FC236}">
+                  <a16:creationId xmlns:a16="http://schemas.microsoft.com/office/drawing/2014/main" id="{5089041E-A5E7-0973-B5EA-237EA36E54D5}"/>
+                </a:ext>
+              </a:extLst>
+            </p:cNvPr>
+            <p:cNvSpPr txBox="1"/>
+            <p:nvPr/>
+          </p:nvSpPr>
+          <p:spPr>
+            <a:xfrm>
+              <a:off x="6045632" y="3818451"/>
+              <a:ext cx="1967947" cy="1200329"/>
+            </a:xfrm>
+            <a:prstGeom prst="rect">
+              <a:avLst/>
+            </a:prstGeom>
+            <a:noFill/>
+          </p:spPr>
+          <p:txBody>
+            <a:bodyPr wrap="square" rtlCol="0">
+              <a:spAutoFit/>
+            </a:bodyPr>
+            <a:lstStyle/>
+            <a:p>
+              <a:pPr algn="ctr"/>
+              <a:r>
+                <a:rPr lang="de-DE" dirty="0"/>
+                <a:t>Aktion für Mischmaschine über serielle Schnittstelle</a:t>
+              </a:r>
+            </a:p>
+          </p:txBody>
+        </p:sp>
+        <p:pic>
+          <p:nvPicPr>
+            <p:cNvPr id="35" name="Grafik 34" descr="Pfeil mit einer Linie: Nach links drehen mit einfarbiger Füllung">
+              <a:extLst>
+                <a:ext uri="{FF2B5EF4-FFF2-40B4-BE49-F238E27FC236}">
+                  <a16:creationId xmlns:a16="http://schemas.microsoft.com/office/drawing/2014/main" id="{193ACE0E-6F33-29F8-8FB9-9FA6EC93030D}"/>
+                </a:ext>
+              </a:extLst>
+            </p:cNvPr>
+            <p:cNvPicPr>
+              <a:picLocks noChangeAspect="1"/>
+            </p:cNvPicPr>
+            <p:nvPr/>
+          </p:nvPicPr>
+          <p:blipFill>
+            <a:blip r:embed="rId12">
+              <a:extLst>
+                <a:ext uri="{28A0092B-C50C-407E-A947-70E740481C1C}">
+                  <a14:useLocalDpi xmlns:a14="http://schemas.microsoft.com/office/drawing/2010/main" val="0"/>
+                </a:ext>
+                <a:ext uri="{96DAC541-7B7A-43D3-8B79-37D633B846F1}">
+                  <asvg:svgBlip xmlns:asvg="http://schemas.microsoft.com/office/drawing/2016/SVG/main" r:embed="rId13"/>
+                </a:ext>
+              </a:extLst>
+            </a:blip>
+            <a:stretch>
+              <a:fillRect/>
+            </a:stretch>
+          </p:blipFill>
+          <p:spPr>
+            <a:xfrm rot="16200000">
+              <a:off x="6485284" y="5441507"/>
+              <a:ext cx="784517" cy="784517"/>
+            </a:xfrm>
+            <a:prstGeom prst="rect">
+              <a:avLst/>
+            </a:prstGeom>
+          </p:spPr>
+        </p:pic>
+        <p:sp>
+          <p:nvSpPr>
+            <p:cNvPr id="36" name="Textfeld 35">
+              <a:extLst>
+                <a:ext uri="{FF2B5EF4-FFF2-40B4-BE49-F238E27FC236}">
+                  <a16:creationId xmlns:a16="http://schemas.microsoft.com/office/drawing/2014/main" id="{3ED3E273-5F3D-6C02-91F4-9759F58DA3AF}"/>
+                </a:ext>
+              </a:extLst>
+            </p:cNvPr>
+            <p:cNvSpPr txBox="1"/>
+            <p:nvPr/>
+          </p:nvSpPr>
+          <p:spPr>
+            <a:xfrm>
+              <a:off x="4943611" y="5500660"/>
+              <a:ext cx="1649850" cy="646331"/>
+            </a:xfrm>
+            <a:prstGeom prst="rect">
+              <a:avLst/>
+            </a:prstGeom>
+            <a:noFill/>
+          </p:spPr>
+          <p:txBody>
+            <a:bodyPr wrap="square" rtlCol="0">
+              <a:spAutoFit/>
+            </a:bodyPr>
+            <a:lstStyle/>
+            <a:p>
+              <a:pPr algn="ctr"/>
+              <a:r>
+                <a:rPr lang="de-DE" dirty="0"/>
+                <a:t>Steuert Mischmaschine</a:t>
+              </a:r>
+            </a:p>
+          </p:txBody>
+        </p:sp>
+      </p:grpSp>
+    </p:spTree>
+    <p:extLst>
+      <p:ext uri="{BB962C8B-B14F-4D97-AF65-F5344CB8AC3E}">
+        <p14:creationId xmlns:p14="http://schemas.microsoft.com/office/powerpoint/2010/main" val="3586954352"/>
+      </p:ext>
+    </p:extLst>
+  </p:cSld>
+  <p:clrMapOvr>
+    <a:masterClrMapping/>
+  </p:clrMapOvr>
+</p:sld>
+</file>
+
 <file path=ppt/theme/theme1.xml><?xml version="1.0" encoding="utf-8"?>
 <a:theme xmlns:a="http://schemas.openxmlformats.org/drawingml/2006/main" name="Office">
   <a:themeElements>

</xml_diff>

<commit_message>
Started writing 'Stand der Technik'
</commit_message>
<xml_diff>
--- a/Konzept_Diagramme/Diagramme.pptx
+++ b/Konzept_Diagramme/Diagramme.pptx
@@ -6,8 +6,10 @@
   </p:sldMasterIdLst>
   <p:sldIdLst>
     <p:sldId id="256" r:id="rId2"/>
-    <p:sldId id="257" r:id="rId3"/>
-    <p:sldId id="258" r:id="rId4"/>
+    <p:sldId id="259" r:id="rId3"/>
+    <p:sldId id="257" r:id="rId4"/>
+    <p:sldId id="260" r:id="rId5"/>
+    <p:sldId id="258" r:id="rId6"/>
   </p:sldIdLst>
   <p:sldSz cx="12192000" cy="6858000"/>
   <p:notesSz cx="6858000" cy="9144000"/>
@@ -128,7 +130,7 @@
 <file path=ppt/revisionInfo.xml><?xml version="1.0" encoding="utf-8"?>
 <p1510:revInfo xmlns:a="http://schemas.openxmlformats.org/drawingml/2006/main" xmlns:r="http://schemas.openxmlformats.org/officeDocument/2006/relationships" xmlns:p1510="http://schemas.microsoft.com/office/powerpoint/2015/10/main">
   <p1510:revLst>
-    <p1510:client id="{10BBE1F0-7463-48C6-86DF-5387D97B13FC}" v="58" dt="2022-11-06T11:13:22.032"/>
+    <p1510:client id="{10BBE1F0-7463-48C6-86DF-5387D97B13FC}" v="60" dt="2022-11-11T14:01:54.833"/>
   </p1510:revLst>
 </p1510:revInfo>
 </file>
@@ -138,7 +140,7 @@
   <pc:docChgLst>
     <pc:chgData name="Felix Gervasi" userId="af4e32ee5822202e" providerId="LiveId" clId="{10BBE1F0-7463-48C6-86DF-5387D97B13FC}"/>
     <pc:docChg chg="undo custSel addSld modSld">
-      <pc:chgData name="Felix Gervasi" userId="af4e32ee5822202e" providerId="LiveId" clId="{10BBE1F0-7463-48C6-86DF-5387D97B13FC}" dt="2022-11-06T11:13:22.031" v="2256" actId="1076"/>
+      <pc:chgData name="Felix Gervasi" userId="af4e32ee5822202e" providerId="LiveId" clId="{10BBE1F0-7463-48C6-86DF-5387D97B13FC}" dt="2022-11-11T14:02:21.306" v="2266" actId="1076"/>
       <pc:docMkLst>
         <pc:docMk/>
       </pc:docMkLst>
@@ -872,6 +874,444 @@
             <pc:docMk/>
             <pc:sldMk cId="3586954352" sldId="258"/>
             <ac:cxnSpMk id="32" creationId="{8BEE0669-0EF2-8BC1-8FA4-74E62B936C65}"/>
+          </ac:cxnSpMkLst>
+        </pc:cxnChg>
+      </pc:sldChg>
+      <pc:sldChg chg="addSp delSp modSp new mod">
+        <pc:chgData name="Felix Gervasi" userId="af4e32ee5822202e" providerId="LiveId" clId="{10BBE1F0-7463-48C6-86DF-5387D97B13FC}" dt="2022-11-11T13:57:59.914" v="2261" actId="1076"/>
+        <pc:sldMkLst>
+          <pc:docMk/>
+          <pc:sldMk cId="158093668" sldId="259"/>
+        </pc:sldMkLst>
+        <pc:spChg chg="del">
+          <ac:chgData name="Felix Gervasi" userId="af4e32ee5822202e" providerId="LiveId" clId="{10BBE1F0-7463-48C6-86DF-5387D97B13FC}" dt="2022-11-11T13:57:51.531" v="2258" actId="478"/>
+          <ac:spMkLst>
+            <pc:docMk/>
+            <pc:sldMk cId="158093668" sldId="259"/>
+            <ac:spMk id="2" creationId="{EB12ADBF-8C05-5CFC-C689-F39DF8FB95DF}"/>
+          </ac:spMkLst>
+        </pc:spChg>
+        <pc:spChg chg="del">
+          <ac:chgData name="Felix Gervasi" userId="af4e32ee5822202e" providerId="LiveId" clId="{10BBE1F0-7463-48C6-86DF-5387D97B13FC}" dt="2022-11-11T13:57:52.489" v="2259" actId="478"/>
+          <ac:spMkLst>
+            <pc:docMk/>
+            <pc:sldMk cId="158093668" sldId="259"/>
+            <ac:spMk id="3" creationId="{F76B335F-AE7D-EC0F-7053-DCD0265B6D95}"/>
+          </ac:spMkLst>
+        </pc:spChg>
+        <pc:spChg chg="mod">
+          <ac:chgData name="Felix Gervasi" userId="af4e32ee5822202e" providerId="LiveId" clId="{10BBE1F0-7463-48C6-86DF-5387D97B13FC}" dt="2022-11-11T13:57:53.479" v="2260"/>
+          <ac:spMkLst>
+            <pc:docMk/>
+            <pc:sldMk cId="158093668" sldId="259"/>
+            <ac:spMk id="10" creationId="{DBA1125D-FA2C-C589-3C7A-CE1D90A0F107}"/>
+          </ac:spMkLst>
+        </pc:spChg>
+        <pc:spChg chg="mod">
+          <ac:chgData name="Felix Gervasi" userId="af4e32ee5822202e" providerId="LiveId" clId="{10BBE1F0-7463-48C6-86DF-5387D97B13FC}" dt="2022-11-11T13:57:53.479" v="2260"/>
+          <ac:spMkLst>
+            <pc:docMk/>
+            <pc:sldMk cId="158093668" sldId="259"/>
+            <ac:spMk id="11" creationId="{F4661640-A5BF-3639-5A79-78DC02DEC2B9}"/>
+          </ac:spMkLst>
+        </pc:spChg>
+        <pc:spChg chg="mod">
+          <ac:chgData name="Felix Gervasi" userId="af4e32ee5822202e" providerId="LiveId" clId="{10BBE1F0-7463-48C6-86DF-5387D97B13FC}" dt="2022-11-11T13:57:53.479" v="2260"/>
+          <ac:spMkLst>
+            <pc:docMk/>
+            <pc:sldMk cId="158093668" sldId="259"/>
+            <ac:spMk id="13" creationId="{ABB1C764-12F7-C192-946E-A2B09A749510}"/>
+          </ac:spMkLst>
+        </pc:spChg>
+        <pc:spChg chg="mod">
+          <ac:chgData name="Felix Gervasi" userId="af4e32ee5822202e" providerId="LiveId" clId="{10BBE1F0-7463-48C6-86DF-5387D97B13FC}" dt="2022-11-11T13:57:53.479" v="2260"/>
+          <ac:spMkLst>
+            <pc:docMk/>
+            <pc:sldMk cId="158093668" sldId="259"/>
+            <ac:spMk id="15" creationId="{7FB4C3D2-09CA-DBA0-9FD3-48CD82871F64}"/>
+          </ac:spMkLst>
+        </pc:spChg>
+        <pc:spChg chg="mod">
+          <ac:chgData name="Felix Gervasi" userId="af4e32ee5822202e" providerId="LiveId" clId="{10BBE1F0-7463-48C6-86DF-5387D97B13FC}" dt="2022-11-11T13:57:53.479" v="2260"/>
+          <ac:spMkLst>
+            <pc:docMk/>
+            <pc:sldMk cId="158093668" sldId="259"/>
+            <ac:spMk id="17" creationId="{A16F08F9-5985-6981-BF70-8C20C8054404}"/>
+          </ac:spMkLst>
+        </pc:spChg>
+        <pc:spChg chg="mod">
+          <ac:chgData name="Felix Gervasi" userId="af4e32ee5822202e" providerId="LiveId" clId="{10BBE1F0-7463-48C6-86DF-5387D97B13FC}" dt="2022-11-11T13:57:53.479" v="2260"/>
+          <ac:spMkLst>
+            <pc:docMk/>
+            <pc:sldMk cId="158093668" sldId="259"/>
+            <ac:spMk id="21" creationId="{7A91938F-772D-A3E1-7FE7-5556C8FA7D29}"/>
+          </ac:spMkLst>
+        </pc:spChg>
+        <pc:spChg chg="mod">
+          <ac:chgData name="Felix Gervasi" userId="af4e32ee5822202e" providerId="LiveId" clId="{10BBE1F0-7463-48C6-86DF-5387D97B13FC}" dt="2022-11-11T13:57:53.479" v="2260"/>
+          <ac:spMkLst>
+            <pc:docMk/>
+            <pc:sldMk cId="158093668" sldId="259"/>
+            <ac:spMk id="23" creationId="{6B680194-A658-BA0A-321F-2B2B81A386B8}"/>
+          </ac:spMkLst>
+        </pc:spChg>
+        <pc:spChg chg="mod">
+          <ac:chgData name="Felix Gervasi" userId="af4e32ee5822202e" providerId="LiveId" clId="{10BBE1F0-7463-48C6-86DF-5387D97B13FC}" dt="2022-11-11T13:57:53.479" v="2260"/>
+          <ac:spMkLst>
+            <pc:docMk/>
+            <pc:sldMk cId="158093668" sldId="259"/>
+            <ac:spMk id="25" creationId="{21607E5F-3CB1-0738-038A-0C387A115A0E}"/>
+          </ac:spMkLst>
+        </pc:spChg>
+        <pc:spChg chg="mod">
+          <ac:chgData name="Felix Gervasi" userId="af4e32ee5822202e" providerId="LiveId" clId="{10BBE1F0-7463-48C6-86DF-5387D97B13FC}" dt="2022-11-11T13:57:53.479" v="2260"/>
+          <ac:spMkLst>
+            <pc:docMk/>
+            <pc:sldMk cId="158093668" sldId="259"/>
+            <ac:spMk id="28" creationId="{6A1D04C4-E2CD-E7BF-BAA0-9CCD9B0C747F}"/>
+          </ac:spMkLst>
+        </pc:spChg>
+        <pc:spChg chg="mod">
+          <ac:chgData name="Felix Gervasi" userId="af4e32ee5822202e" providerId="LiveId" clId="{10BBE1F0-7463-48C6-86DF-5387D97B13FC}" dt="2022-11-11T13:57:53.479" v="2260"/>
+          <ac:spMkLst>
+            <pc:docMk/>
+            <pc:sldMk cId="158093668" sldId="259"/>
+            <ac:spMk id="30" creationId="{792585DF-67F3-B601-F4DF-C6D55E6520C6}"/>
+          </ac:spMkLst>
+        </pc:spChg>
+        <pc:grpChg chg="add mod">
+          <ac:chgData name="Felix Gervasi" userId="af4e32ee5822202e" providerId="LiveId" clId="{10BBE1F0-7463-48C6-86DF-5387D97B13FC}" dt="2022-11-11T13:57:59.914" v="2261" actId="1076"/>
+          <ac:grpSpMkLst>
+            <pc:docMk/>
+            <pc:sldMk cId="158093668" sldId="259"/>
+            <ac:grpSpMk id="4" creationId="{DA8A29E3-205C-DE07-156F-248BD26E544F}"/>
+          </ac:grpSpMkLst>
+        </pc:grpChg>
+        <pc:grpChg chg="mod">
+          <ac:chgData name="Felix Gervasi" userId="af4e32ee5822202e" providerId="LiveId" clId="{10BBE1F0-7463-48C6-86DF-5387D97B13FC}" dt="2022-11-11T13:57:53.479" v="2260"/>
+          <ac:grpSpMkLst>
+            <pc:docMk/>
+            <pc:sldMk cId="158093668" sldId="259"/>
+            <ac:grpSpMk id="5" creationId="{B23C19DB-DDCB-F124-A8A1-73824DA07CD8}"/>
+          </ac:grpSpMkLst>
+        </pc:grpChg>
+        <pc:grpChg chg="mod">
+          <ac:chgData name="Felix Gervasi" userId="af4e32ee5822202e" providerId="LiveId" clId="{10BBE1F0-7463-48C6-86DF-5387D97B13FC}" dt="2022-11-11T13:57:53.479" v="2260"/>
+          <ac:grpSpMkLst>
+            <pc:docMk/>
+            <pc:sldMk cId="158093668" sldId="259"/>
+            <ac:grpSpMk id="6" creationId="{E9C3A834-D3D6-4C6C-A871-21CB19300590}"/>
+          </ac:grpSpMkLst>
+        </pc:grpChg>
+        <pc:grpChg chg="mod">
+          <ac:chgData name="Felix Gervasi" userId="af4e32ee5822202e" providerId="LiveId" clId="{10BBE1F0-7463-48C6-86DF-5387D97B13FC}" dt="2022-11-11T13:57:53.479" v="2260"/>
+          <ac:grpSpMkLst>
+            <pc:docMk/>
+            <pc:sldMk cId="158093668" sldId="259"/>
+            <ac:grpSpMk id="7" creationId="{983ECC27-F410-C99F-C339-E10F62547358}"/>
+          </ac:grpSpMkLst>
+        </pc:grpChg>
+        <pc:grpChg chg="mod">
+          <ac:chgData name="Felix Gervasi" userId="af4e32ee5822202e" providerId="LiveId" clId="{10BBE1F0-7463-48C6-86DF-5387D97B13FC}" dt="2022-11-11T13:57:53.479" v="2260"/>
+          <ac:grpSpMkLst>
+            <pc:docMk/>
+            <pc:sldMk cId="158093668" sldId="259"/>
+            <ac:grpSpMk id="18" creationId="{8BCA8B7B-EF70-B4C1-B829-593ADF2DC241}"/>
+          </ac:grpSpMkLst>
+        </pc:grpChg>
+        <pc:grpChg chg="mod">
+          <ac:chgData name="Felix Gervasi" userId="af4e32ee5822202e" providerId="LiveId" clId="{10BBE1F0-7463-48C6-86DF-5387D97B13FC}" dt="2022-11-11T13:57:53.479" v="2260"/>
+          <ac:grpSpMkLst>
+            <pc:docMk/>
+            <pc:sldMk cId="158093668" sldId="259"/>
+            <ac:grpSpMk id="19" creationId="{EC3A8728-EF93-E18C-EDE0-060FA12FE800}"/>
+          </ac:grpSpMkLst>
+        </pc:grpChg>
+        <pc:picChg chg="mod">
+          <ac:chgData name="Felix Gervasi" userId="af4e32ee5822202e" providerId="LiveId" clId="{10BBE1F0-7463-48C6-86DF-5387D97B13FC}" dt="2022-11-11T13:57:53.479" v="2260"/>
+          <ac:picMkLst>
+            <pc:docMk/>
+            <pc:sldMk cId="158093668" sldId="259"/>
+            <ac:picMk id="14" creationId="{0B39A55C-B874-8A47-2B2A-6007DE8D078C}"/>
+          </ac:picMkLst>
+        </pc:picChg>
+        <pc:picChg chg="mod">
+          <ac:chgData name="Felix Gervasi" userId="af4e32ee5822202e" providerId="LiveId" clId="{10BBE1F0-7463-48C6-86DF-5387D97B13FC}" dt="2022-11-11T13:57:53.479" v="2260"/>
+          <ac:picMkLst>
+            <pc:docMk/>
+            <pc:sldMk cId="158093668" sldId="259"/>
+            <ac:picMk id="16" creationId="{922C2278-5124-0252-446B-5ACB8CB1E8F1}"/>
+          </ac:picMkLst>
+        </pc:picChg>
+        <pc:picChg chg="mod">
+          <ac:chgData name="Felix Gervasi" userId="af4e32ee5822202e" providerId="LiveId" clId="{10BBE1F0-7463-48C6-86DF-5387D97B13FC}" dt="2022-11-11T13:57:53.479" v="2260"/>
+          <ac:picMkLst>
+            <pc:docMk/>
+            <pc:sldMk cId="158093668" sldId="259"/>
+            <ac:picMk id="24" creationId="{9661906E-9AC6-2DDF-FE4C-37476F31B83B}"/>
+          </ac:picMkLst>
+        </pc:picChg>
+        <pc:picChg chg="mod">
+          <ac:chgData name="Felix Gervasi" userId="af4e32ee5822202e" providerId="LiveId" clId="{10BBE1F0-7463-48C6-86DF-5387D97B13FC}" dt="2022-11-11T13:57:53.479" v="2260"/>
+          <ac:picMkLst>
+            <pc:docMk/>
+            <pc:sldMk cId="158093668" sldId="259"/>
+            <ac:picMk id="26" creationId="{B2FD4635-CF40-83C1-5B5F-CFCDC02776A9}"/>
+          </ac:picMkLst>
+        </pc:picChg>
+        <pc:picChg chg="mod">
+          <ac:chgData name="Felix Gervasi" userId="af4e32ee5822202e" providerId="LiveId" clId="{10BBE1F0-7463-48C6-86DF-5387D97B13FC}" dt="2022-11-11T13:57:53.479" v="2260"/>
+          <ac:picMkLst>
+            <pc:docMk/>
+            <pc:sldMk cId="158093668" sldId="259"/>
+            <ac:picMk id="27" creationId="{41F971F7-10DE-F0CD-CE01-535E2804C188}"/>
+          </ac:picMkLst>
+        </pc:picChg>
+        <pc:picChg chg="mod">
+          <ac:chgData name="Felix Gervasi" userId="af4e32ee5822202e" providerId="LiveId" clId="{10BBE1F0-7463-48C6-86DF-5387D97B13FC}" dt="2022-11-11T13:57:53.479" v="2260"/>
+          <ac:picMkLst>
+            <pc:docMk/>
+            <pc:sldMk cId="158093668" sldId="259"/>
+            <ac:picMk id="29" creationId="{0B9AAB74-4762-1A34-E297-DC26F1B8EF06}"/>
+          </ac:picMkLst>
+        </pc:picChg>
+        <pc:cxnChg chg="mod">
+          <ac:chgData name="Felix Gervasi" userId="af4e32ee5822202e" providerId="LiveId" clId="{10BBE1F0-7463-48C6-86DF-5387D97B13FC}" dt="2022-11-11T13:57:53.479" v="2260"/>
+          <ac:cxnSpMkLst>
+            <pc:docMk/>
+            <pc:sldMk cId="158093668" sldId="259"/>
+            <ac:cxnSpMk id="8" creationId="{A094279F-516F-48CA-B540-4471106A7F9E}"/>
+          </ac:cxnSpMkLst>
+        </pc:cxnChg>
+        <pc:cxnChg chg="mod">
+          <ac:chgData name="Felix Gervasi" userId="af4e32ee5822202e" providerId="LiveId" clId="{10BBE1F0-7463-48C6-86DF-5387D97B13FC}" dt="2022-11-11T13:57:53.479" v="2260"/>
+          <ac:cxnSpMkLst>
+            <pc:docMk/>
+            <pc:sldMk cId="158093668" sldId="259"/>
+            <ac:cxnSpMk id="9" creationId="{72F07A30-F564-C953-7560-0CA08627029B}"/>
+          </ac:cxnSpMkLst>
+        </pc:cxnChg>
+        <pc:cxnChg chg="mod">
+          <ac:chgData name="Felix Gervasi" userId="af4e32ee5822202e" providerId="LiveId" clId="{10BBE1F0-7463-48C6-86DF-5387D97B13FC}" dt="2022-11-11T13:57:53.479" v="2260"/>
+          <ac:cxnSpMkLst>
+            <pc:docMk/>
+            <pc:sldMk cId="158093668" sldId="259"/>
+            <ac:cxnSpMk id="12" creationId="{C1A71EEF-C467-2EA7-7D46-C8F56BD64A8A}"/>
+          </ac:cxnSpMkLst>
+        </pc:cxnChg>
+        <pc:cxnChg chg="mod">
+          <ac:chgData name="Felix Gervasi" userId="af4e32ee5822202e" providerId="LiveId" clId="{10BBE1F0-7463-48C6-86DF-5387D97B13FC}" dt="2022-11-11T13:57:53.479" v="2260"/>
+          <ac:cxnSpMkLst>
+            <pc:docMk/>
+            <pc:sldMk cId="158093668" sldId="259"/>
+            <ac:cxnSpMk id="20" creationId="{902CE141-B01E-08FA-C1DE-4BEE5EB0B9E6}"/>
+          </ac:cxnSpMkLst>
+        </pc:cxnChg>
+        <pc:cxnChg chg="mod">
+          <ac:chgData name="Felix Gervasi" userId="af4e32ee5822202e" providerId="LiveId" clId="{10BBE1F0-7463-48C6-86DF-5387D97B13FC}" dt="2022-11-11T13:57:53.479" v="2260"/>
+          <ac:cxnSpMkLst>
+            <pc:docMk/>
+            <pc:sldMk cId="158093668" sldId="259"/>
+            <ac:cxnSpMk id="22" creationId="{40A37462-CD3A-6DAE-99E7-FAB17499CC7A}"/>
+          </ac:cxnSpMkLst>
+        </pc:cxnChg>
+      </pc:sldChg>
+      <pc:sldChg chg="addSp delSp modSp new mod">
+        <pc:chgData name="Felix Gervasi" userId="af4e32ee5822202e" providerId="LiveId" clId="{10BBE1F0-7463-48C6-86DF-5387D97B13FC}" dt="2022-11-11T14:02:21.306" v="2266" actId="1076"/>
+        <pc:sldMkLst>
+          <pc:docMk/>
+          <pc:sldMk cId="4116696478" sldId="260"/>
+        </pc:sldMkLst>
+        <pc:spChg chg="del">
+          <ac:chgData name="Felix Gervasi" userId="af4e32ee5822202e" providerId="LiveId" clId="{10BBE1F0-7463-48C6-86DF-5387D97B13FC}" dt="2022-11-11T14:01:52.114" v="2263" actId="478"/>
+          <ac:spMkLst>
+            <pc:docMk/>
+            <pc:sldMk cId="4116696478" sldId="260"/>
+            <ac:spMk id="2" creationId="{F2035418-B9DE-B407-8A5A-EA8B4F9A9FDE}"/>
+          </ac:spMkLst>
+        </pc:spChg>
+        <pc:spChg chg="del">
+          <ac:chgData name="Felix Gervasi" userId="af4e32ee5822202e" providerId="LiveId" clId="{10BBE1F0-7463-48C6-86DF-5387D97B13FC}" dt="2022-11-11T14:01:53.943" v="2264" actId="478"/>
+          <ac:spMkLst>
+            <pc:docMk/>
+            <pc:sldMk cId="4116696478" sldId="260"/>
+            <ac:spMk id="3" creationId="{FADDD7FC-D830-7022-7BAD-1AE49BAFB6A8}"/>
+          </ac:spMkLst>
+        </pc:spChg>
+        <pc:spChg chg="mod">
+          <ac:chgData name="Felix Gervasi" userId="af4e32ee5822202e" providerId="LiveId" clId="{10BBE1F0-7463-48C6-86DF-5387D97B13FC}" dt="2022-11-11T14:01:54.833" v="2265"/>
+          <ac:spMkLst>
+            <pc:docMk/>
+            <pc:sldMk cId="4116696478" sldId="260"/>
+            <ac:spMk id="9" creationId="{216D5236-1637-37AD-EBBD-CB3136F794CC}"/>
+          </ac:spMkLst>
+        </pc:spChg>
+        <pc:spChg chg="mod">
+          <ac:chgData name="Felix Gervasi" userId="af4e32ee5822202e" providerId="LiveId" clId="{10BBE1F0-7463-48C6-86DF-5387D97B13FC}" dt="2022-11-11T14:01:54.833" v="2265"/>
+          <ac:spMkLst>
+            <pc:docMk/>
+            <pc:sldMk cId="4116696478" sldId="260"/>
+            <ac:spMk id="10" creationId="{FFD704B3-295B-15C2-EBCC-EAE0A477EC61}"/>
+          </ac:spMkLst>
+        </pc:spChg>
+        <pc:spChg chg="mod">
+          <ac:chgData name="Felix Gervasi" userId="af4e32ee5822202e" providerId="LiveId" clId="{10BBE1F0-7463-48C6-86DF-5387D97B13FC}" dt="2022-11-11T14:01:54.833" v="2265"/>
+          <ac:spMkLst>
+            <pc:docMk/>
+            <pc:sldMk cId="4116696478" sldId="260"/>
+            <ac:spMk id="12" creationId="{05AD9881-CF75-2D59-9B82-6FE068B35A46}"/>
+          </ac:spMkLst>
+        </pc:spChg>
+        <pc:spChg chg="mod">
+          <ac:chgData name="Felix Gervasi" userId="af4e32ee5822202e" providerId="LiveId" clId="{10BBE1F0-7463-48C6-86DF-5387D97B13FC}" dt="2022-11-11T14:01:54.833" v="2265"/>
+          <ac:spMkLst>
+            <pc:docMk/>
+            <pc:sldMk cId="4116696478" sldId="260"/>
+            <ac:spMk id="14" creationId="{3B3435DA-3C09-C3CA-0F1F-7733D1B584E2}"/>
+          </ac:spMkLst>
+        </pc:spChg>
+        <pc:spChg chg="mod">
+          <ac:chgData name="Felix Gervasi" userId="af4e32ee5822202e" providerId="LiveId" clId="{10BBE1F0-7463-48C6-86DF-5387D97B13FC}" dt="2022-11-11T14:01:54.833" v="2265"/>
+          <ac:spMkLst>
+            <pc:docMk/>
+            <pc:sldMk cId="4116696478" sldId="260"/>
+            <ac:spMk id="18" creationId="{7D30009B-68A3-B976-83A3-7DCA1B7CAE1E}"/>
+          </ac:spMkLst>
+        </pc:spChg>
+        <pc:spChg chg="mod">
+          <ac:chgData name="Felix Gervasi" userId="af4e32ee5822202e" providerId="LiveId" clId="{10BBE1F0-7463-48C6-86DF-5387D97B13FC}" dt="2022-11-11T14:01:54.833" v="2265"/>
+          <ac:spMkLst>
+            <pc:docMk/>
+            <pc:sldMk cId="4116696478" sldId="260"/>
+            <ac:spMk id="20" creationId="{8B2E280D-94D7-E4C3-EEF4-0EAB00E3D45C}"/>
+          </ac:spMkLst>
+        </pc:spChg>
+        <pc:spChg chg="mod">
+          <ac:chgData name="Felix Gervasi" userId="af4e32ee5822202e" providerId="LiveId" clId="{10BBE1F0-7463-48C6-86DF-5387D97B13FC}" dt="2022-11-11T14:01:54.833" v="2265"/>
+          <ac:spMkLst>
+            <pc:docMk/>
+            <pc:sldMk cId="4116696478" sldId="260"/>
+            <ac:spMk id="22" creationId="{49CB7039-50AE-3469-CF98-F41C76EDBF94}"/>
+          </ac:spMkLst>
+        </pc:spChg>
+        <pc:spChg chg="mod">
+          <ac:chgData name="Felix Gervasi" userId="af4e32ee5822202e" providerId="LiveId" clId="{10BBE1F0-7463-48C6-86DF-5387D97B13FC}" dt="2022-11-11T14:01:54.833" v="2265"/>
+          <ac:spMkLst>
+            <pc:docMk/>
+            <pc:sldMk cId="4116696478" sldId="260"/>
+            <ac:spMk id="25" creationId="{0221C428-6396-A7AB-C369-FFDAF53D67EF}"/>
+          </ac:spMkLst>
+        </pc:spChg>
+        <pc:grpChg chg="add mod">
+          <ac:chgData name="Felix Gervasi" userId="af4e32ee5822202e" providerId="LiveId" clId="{10BBE1F0-7463-48C6-86DF-5387D97B13FC}" dt="2022-11-11T14:02:21.306" v="2266" actId="1076"/>
+          <ac:grpSpMkLst>
+            <pc:docMk/>
+            <pc:sldMk cId="4116696478" sldId="260"/>
+            <ac:grpSpMk id="4" creationId="{1006BB4F-8B4C-A09A-A36A-9F473CA27420}"/>
+          </ac:grpSpMkLst>
+        </pc:grpChg>
+        <pc:grpChg chg="mod">
+          <ac:chgData name="Felix Gervasi" userId="af4e32ee5822202e" providerId="LiveId" clId="{10BBE1F0-7463-48C6-86DF-5387D97B13FC}" dt="2022-11-11T14:01:54.833" v="2265"/>
+          <ac:grpSpMkLst>
+            <pc:docMk/>
+            <pc:sldMk cId="4116696478" sldId="260"/>
+            <ac:grpSpMk id="5" creationId="{11C3D27A-31B4-B4D2-DDD1-B30F32BB0C75}"/>
+          </ac:grpSpMkLst>
+        </pc:grpChg>
+        <pc:grpChg chg="mod">
+          <ac:chgData name="Felix Gervasi" userId="af4e32ee5822202e" providerId="LiveId" clId="{10BBE1F0-7463-48C6-86DF-5387D97B13FC}" dt="2022-11-11T14:01:54.833" v="2265"/>
+          <ac:grpSpMkLst>
+            <pc:docMk/>
+            <pc:sldMk cId="4116696478" sldId="260"/>
+            <ac:grpSpMk id="6" creationId="{4F25E25F-8410-B7F4-3386-7FA20AEBCDC8}"/>
+          </ac:grpSpMkLst>
+        </pc:grpChg>
+        <pc:grpChg chg="mod">
+          <ac:chgData name="Felix Gervasi" userId="af4e32ee5822202e" providerId="LiveId" clId="{10BBE1F0-7463-48C6-86DF-5387D97B13FC}" dt="2022-11-11T14:01:54.833" v="2265"/>
+          <ac:grpSpMkLst>
+            <pc:docMk/>
+            <pc:sldMk cId="4116696478" sldId="260"/>
+            <ac:grpSpMk id="15" creationId="{E0080489-3902-7830-69B0-8F7170C00B75}"/>
+          </ac:grpSpMkLst>
+        </pc:grpChg>
+        <pc:grpChg chg="mod">
+          <ac:chgData name="Felix Gervasi" userId="af4e32ee5822202e" providerId="LiveId" clId="{10BBE1F0-7463-48C6-86DF-5387D97B13FC}" dt="2022-11-11T14:01:54.833" v="2265"/>
+          <ac:grpSpMkLst>
+            <pc:docMk/>
+            <pc:sldMk cId="4116696478" sldId="260"/>
+            <ac:grpSpMk id="16" creationId="{B1C75005-B2D4-4254-8FB9-BBB7654FF558}"/>
+          </ac:grpSpMkLst>
+        </pc:grpChg>
+        <pc:picChg chg="mod">
+          <ac:chgData name="Felix Gervasi" userId="af4e32ee5822202e" providerId="LiveId" clId="{10BBE1F0-7463-48C6-86DF-5387D97B13FC}" dt="2022-11-11T14:01:54.833" v="2265"/>
+          <ac:picMkLst>
+            <pc:docMk/>
+            <pc:sldMk cId="4116696478" sldId="260"/>
+            <ac:picMk id="11" creationId="{561E0AB9-C8ED-821E-B1EF-93D8962DC15E}"/>
+          </ac:picMkLst>
+        </pc:picChg>
+        <pc:picChg chg="mod">
+          <ac:chgData name="Felix Gervasi" userId="af4e32ee5822202e" providerId="LiveId" clId="{10BBE1F0-7463-48C6-86DF-5387D97B13FC}" dt="2022-11-11T14:01:54.833" v="2265"/>
+          <ac:picMkLst>
+            <pc:docMk/>
+            <pc:sldMk cId="4116696478" sldId="260"/>
+            <ac:picMk id="13" creationId="{FA73789C-4BBF-6B7B-5671-66C1802F8EAF}"/>
+          </ac:picMkLst>
+        </pc:picChg>
+        <pc:picChg chg="mod">
+          <ac:chgData name="Felix Gervasi" userId="af4e32ee5822202e" providerId="LiveId" clId="{10BBE1F0-7463-48C6-86DF-5387D97B13FC}" dt="2022-11-11T14:01:54.833" v="2265"/>
+          <ac:picMkLst>
+            <pc:docMk/>
+            <pc:sldMk cId="4116696478" sldId="260"/>
+            <ac:picMk id="21" creationId="{02DBBF83-CFC2-69B1-5EB2-DD86ECBFD0BF}"/>
+          </ac:picMkLst>
+        </pc:picChg>
+        <pc:picChg chg="mod">
+          <ac:chgData name="Felix Gervasi" userId="af4e32ee5822202e" providerId="LiveId" clId="{10BBE1F0-7463-48C6-86DF-5387D97B13FC}" dt="2022-11-11T14:01:54.833" v="2265"/>
+          <ac:picMkLst>
+            <pc:docMk/>
+            <pc:sldMk cId="4116696478" sldId="260"/>
+            <ac:picMk id="23" creationId="{E05192E8-43F3-E7F4-2928-0A2526EB3A1C}"/>
+          </ac:picMkLst>
+        </pc:picChg>
+        <pc:picChg chg="mod">
+          <ac:chgData name="Felix Gervasi" userId="af4e32ee5822202e" providerId="LiveId" clId="{10BBE1F0-7463-48C6-86DF-5387D97B13FC}" dt="2022-11-11T14:01:54.833" v="2265"/>
+          <ac:picMkLst>
+            <pc:docMk/>
+            <pc:sldMk cId="4116696478" sldId="260"/>
+            <ac:picMk id="24" creationId="{5A8BEC4E-0B2D-95F1-42D2-4B02C931DA5C}"/>
+          </ac:picMkLst>
+        </pc:picChg>
+        <pc:cxnChg chg="mod">
+          <ac:chgData name="Felix Gervasi" userId="af4e32ee5822202e" providerId="LiveId" clId="{10BBE1F0-7463-48C6-86DF-5387D97B13FC}" dt="2022-11-11T14:01:54.833" v="2265"/>
+          <ac:cxnSpMkLst>
+            <pc:docMk/>
+            <pc:sldMk cId="4116696478" sldId="260"/>
+            <ac:cxnSpMk id="7" creationId="{B1C063EC-998F-5A93-8A57-7E8265391B79}"/>
+          </ac:cxnSpMkLst>
+        </pc:cxnChg>
+        <pc:cxnChg chg="mod">
+          <ac:chgData name="Felix Gervasi" userId="af4e32ee5822202e" providerId="LiveId" clId="{10BBE1F0-7463-48C6-86DF-5387D97B13FC}" dt="2022-11-11T14:01:54.833" v="2265"/>
+          <ac:cxnSpMkLst>
+            <pc:docMk/>
+            <pc:sldMk cId="4116696478" sldId="260"/>
+            <ac:cxnSpMk id="8" creationId="{ADA21AB6-5BB7-C520-0746-1E95A71DDAC6}"/>
+          </ac:cxnSpMkLst>
+        </pc:cxnChg>
+        <pc:cxnChg chg="mod">
+          <ac:chgData name="Felix Gervasi" userId="af4e32ee5822202e" providerId="LiveId" clId="{10BBE1F0-7463-48C6-86DF-5387D97B13FC}" dt="2022-11-11T14:01:54.833" v="2265"/>
+          <ac:cxnSpMkLst>
+            <pc:docMk/>
+            <pc:sldMk cId="4116696478" sldId="260"/>
+            <ac:cxnSpMk id="17" creationId="{B82620B8-A8C6-70E5-48A5-15F1A63E9F31}"/>
+          </ac:cxnSpMkLst>
+        </pc:cxnChg>
+        <pc:cxnChg chg="mod">
+          <ac:chgData name="Felix Gervasi" userId="af4e32ee5822202e" providerId="LiveId" clId="{10BBE1F0-7463-48C6-86DF-5387D97B13FC}" dt="2022-11-11T14:01:54.833" v="2265"/>
+          <ac:cxnSpMkLst>
+            <pc:docMk/>
+            <pc:sldMk cId="4116696478" sldId="260"/>
+            <ac:cxnSpMk id="19" creationId="{6F4987C5-AA83-57CE-372A-73B4B2DA41FC}"/>
           </ac:cxnSpMkLst>
         </pc:cxnChg>
       </pc:sldChg>
@@ -1027,7 +1467,7 @@
           <a:p>
             <a:fld id="{DED31D0E-D858-474B-B44B-3BC714FC9DF3}" type="datetimeFigureOut">
               <a:rPr lang="de-DE" smtClean="0"/>
-              <a:t>06.11.2022</a:t>
+              <a:t>11.11.2022</a:t>
             </a:fld>
             <a:endParaRPr lang="de-DE"/>
           </a:p>
@@ -1225,7 +1665,7 @@
           <a:p>
             <a:fld id="{DED31D0E-D858-474B-B44B-3BC714FC9DF3}" type="datetimeFigureOut">
               <a:rPr lang="de-DE" smtClean="0"/>
-              <a:t>06.11.2022</a:t>
+              <a:t>11.11.2022</a:t>
             </a:fld>
             <a:endParaRPr lang="de-DE"/>
           </a:p>
@@ -1433,7 +1873,7 @@
           <a:p>
             <a:fld id="{DED31D0E-D858-474B-B44B-3BC714FC9DF3}" type="datetimeFigureOut">
               <a:rPr lang="de-DE" smtClean="0"/>
-              <a:t>06.11.2022</a:t>
+              <a:t>11.11.2022</a:t>
             </a:fld>
             <a:endParaRPr lang="de-DE"/>
           </a:p>
@@ -1631,7 +2071,7 @@
           <a:p>
             <a:fld id="{DED31D0E-D858-474B-B44B-3BC714FC9DF3}" type="datetimeFigureOut">
               <a:rPr lang="de-DE" smtClean="0"/>
-              <a:t>06.11.2022</a:t>
+              <a:t>11.11.2022</a:t>
             </a:fld>
             <a:endParaRPr lang="de-DE"/>
           </a:p>
@@ -1906,7 +2346,7 @@
           <a:p>
             <a:fld id="{DED31D0E-D858-474B-B44B-3BC714FC9DF3}" type="datetimeFigureOut">
               <a:rPr lang="de-DE" smtClean="0"/>
-              <a:t>06.11.2022</a:t>
+              <a:t>11.11.2022</a:t>
             </a:fld>
             <a:endParaRPr lang="de-DE"/>
           </a:p>
@@ -2171,7 +2611,7 @@
           <a:p>
             <a:fld id="{DED31D0E-D858-474B-B44B-3BC714FC9DF3}" type="datetimeFigureOut">
               <a:rPr lang="de-DE" smtClean="0"/>
-              <a:t>06.11.2022</a:t>
+              <a:t>11.11.2022</a:t>
             </a:fld>
             <a:endParaRPr lang="de-DE"/>
           </a:p>
@@ -2583,7 +3023,7 @@
           <a:p>
             <a:fld id="{DED31D0E-D858-474B-B44B-3BC714FC9DF3}" type="datetimeFigureOut">
               <a:rPr lang="de-DE" smtClean="0"/>
-              <a:t>06.11.2022</a:t>
+              <a:t>11.11.2022</a:t>
             </a:fld>
             <a:endParaRPr lang="de-DE"/>
           </a:p>
@@ -2724,7 +3164,7 @@
           <a:p>
             <a:fld id="{DED31D0E-D858-474B-B44B-3BC714FC9DF3}" type="datetimeFigureOut">
               <a:rPr lang="de-DE" smtClean="0"/>
-              <a:t>06.11.2022</a:t>
+              <a:t>11.11.2022</a:t>
             </a:fld>
             <a:endParaRPr lang="de-DE"/>
           </a:p>
@@ -2837,7 +3277,7 @@
           <a:p>
             <a:fld id="{DED31D0E-D858-474B-B44B-3BC714FC9DF3}" type="datetimeFigureOut">
               <a:rPr lang="de-DE" smtClean="0"/>
-              <a:t>06.11.2022</a:t>
+              <a:t>11.11.2022</a:t>
             </a:fld>
             <a:endParaRPr lang="de-DE"/>
           </a:p>
@@ -3148,7 +3588,7 @@
           <a:p>
             <a:fld id="{DED31D0E-D858-474B-B44B-3BC714FC9DF3}" type="datetimeFigureOut">
               <a:rPr lang="de-DE" smtClean="0"/>
-              <a:t>06.11.2022</a:t>
+              <a:t>11.11.2022</a:t>
             </a:fld>
             <a:endParaRPr lang="de-DE"/>
           </a:p>
@@ -3436,7 +3876,7 @@
           <a:p>
             <a:fld id="{DED31D0E-D858-474B-B44B-3BC714FC9DF3}" type="datetimeFigureOut">
               <a:rPr lang="de-DE" smtClean="0"/>
-              <a:t>06.11.2022</a:t>
+              <a:t>11.11.2022</a:t>
             </a:fld>
             <a:endParaRPr lang="de-DE"/>
           </a:p>
@@ -3677,7 +4117,7 @@
           <a:p>
             <a:fld id="{DED31D0E-D858-474B-B44B-3BC714FC9DF3}" type="datetimeFigureOut">
               <a:rPr lang="de-DE" smtClean="0"/>
-              <a:t>06.11.2022</a:t>
+              <a:t>11.11.2022</a:t>
             </a:fld>
             <a:endParaRPr lang="de-DE"/>
           </a:p>
@@ -5188,6 +5628,966 @@
           <a:chExt cx="0" cy="0"/>
         </a:xfrm>
       </p:grpSpPr>
+      <p:grpSp>
+        <p:nvGrpSpPr>
+          <p:cNvPr id="4" name="Gruppieren 3">
+            <a:extLst>
+              <a:ext uri="{FF2B5EF4-FFF2-40B4-BE49-F238E27FC236}">
+                <a16:creationId xmlns:a16="http://schemas.microsoft.com/office/drawing/2014/main" id="{DA8A29E3-205C-DE07-156F-248BD26E544F}"/>
+              </a:ext>
+            </a:extLst>
+          </p:cNvPr>
+          <p:cNvGrpSpPr/>
+          <p:nvPr/>
+        </p:nvGrpSpPr>
+        <p:grpSpPr>
+          <a:xfrm>
+            <a:off x="1787694" y="1175802"/>
+            <a:ext cx="8616611" cy="4506396"/>
+            <a:chOff x="1874594" y="301632"/>
+            <a:chExt cx="8616611" cy="4506396"/>
+          </a:xfrm>
+        </p:grpSpPr>
+        <p:grpSp>
+          <p:nvGrpSpPr>
+            <p:cNvPr id="5" name="Gruppieren 4">
+              <a:extLst>
+                <a:ext uri="{FF2B5EF4-FFF2-40B4-BE49-F238E27FC236}">
+                  <a16:creationId xmlns:a16="http://schemas.microsoft.com/office/drawing/2014/main" id="{B23C19DB-DDCB-F124-A8A1-73824DA07CD8}"/>
+                </a:ext>
+              </a:extLst>
+            </p:cNvPr>
+            <p:cNvGrpSpPr/>
+            <p:nvPr/>
+          </p:nvGrpSpPr>
+          <p:grpSpPr>
+            <a:xfrm>
+              <a:off x="4499853" y="3039297"/>
+              <a:ext cx="1172456" cy="1422413"/>
+              <a:chOff x="2129544" y="1657350"/>
+              <a:chExt cx="1172456" cy="1422413"/>
+            </a:xfrm>
+          </p:grpSpPr>
+          <p:pic>
+            <p:nvPicPr>
+              <p:cNvPr id="29" name="Grafik 28" descr="Smartphone mit einfarbiger Füllung">
+                <a:extLst>
+                  <a:ext uri="{FF2B5EF4-FFF2-40B4-BE49-F238E27FC236}">
+                    <a16:creationId xmlns:a16="http://schemas.microsoft.com/office/drawing/2014/main" id="{0B9AAB74-4762-1A34-E297-DC26F1B8EF06}"/>
+                  </a:ext>
+                </a:extLst>
+              </p:cNvPr>
+              <p:cNvPicPr>
+                <a:picLocks noChangeAspect="1"/>
+              </p:cNvPicPr>
+              <p:nvPr/>
+            </p:nvPicPr>
+            <p:blipFill>
+              <a:blip r:embed="rId2">
+                <a:extLst>
+                  <a:ext uri="{28A0092B-C50C-407E-A947-70E740481C1C}">
+                    <a14:useLocalDpi xmlns:a14="http://schemas.microsoft.com/office/drawing/2010/main" val="0"/>
+                  </a:ext>
+                  <a:ext uri="{96DAC541-7B7A-43D3-8B79-37D633B846F1}">
+                    <asvg:svgBlip xmlns:asvg="http://schemas.microsoft.com/office/drawing/2016/SVG/main" r:embed="rId3"/>
+                  </a:ext>
+                </a:extLst>
+              </a:blip>
+              <a:stretch>
+                <a:fillRect/>
+              </a:stretch>
+            </p:blipFill>
+            <p:spPr>
+              <a:xfrm>
+                <a:off x="2258572" y="2165363"/>
+                <a:ext cx="914400" cy="914400"/>
+              </a:xfrm>
+              <a:prstGeom prst="rect">
+                <a:avLst/>
+              </a:prstGeom>
+            </p:spPr>
+          </p:pic>
+          <p:sp>
+            <p:nvSpPr>
+              <p:cNvPr id="30" name="Textfeld 29">
+                <a:extLst>
+                  <a:ext uri="{FF2B5EF4-FFF2-40B4-BE49-F238E27FC236}">
+                    <a16:creationId xmlns:a16="http://schemas.microsoft.com/office/drawing/2014/main" id="{792585DF-67F3-B601-F4DF-C6D55E6520C6}"/>
+                  </a:ext>
+                </a:extLst>
+              </p:cNvPr>
+              <p:cNvSpPr txBox="1"/>
+              <p:nvPr/>
+            </p:nvSpPr>
+            <p:spPr>
+              <a:xfrm>
+                <a:off x="2129544" y="1657350"/>
+                <a:ext cx="1172456" cy="461665"/>
+              </a:xfrm>
+              <a:prstGeom prst="rect">
+                <a:avLst/>
+              </a:prstGeom>
+              <a:noFill/>
+            </p:spPr>
+            <p:txBody>
+              <a:bodyPr wrap="square" rtlCol="0">
+                <a:spAutoFit/>
+              </a:bodyPr>
+              <a:lstStyle/>
+              <a:p>
+                <a:pPr algn="ctr"/>
+                <a:r>
+                  <a:rPr lang="de-DE" sz="1200" dirty="0"/>
+                  <a:t>Mischmaschine-App</a:t>
+                </a:r>
+              </a:p>
+            </p:txBody>
+          </p:sp>
+        </p:grpSp>
+        <p:grpSp>
+          <p:nvGrpSpPr>
+            <p:cNvPr id="6" name="Gruppieren 5">
+              <a:extLst>
+                <a:ext uri="{FF2B5EF4-FFF2-40B4-BE49-F238E27FC236}">
+                  <a16:creationId xmlns:a16="http://schemas.microsoft.com/office/drawing/2014/main" id="{E9C3A834-D3D6-4C6C-A871-21CB19300590}"/>
+                </a:ext>
+              </a:extLst>
+            </p:cNvPr>
+            <p:cNvGrpSpPr/>
+            <p:nvPr/>
+          </p:nvGrpSpPr>
+          <p:grpSpPr>
+            <a:xfrm>
+              <a:off x="1874594" y="3162256"/>
+              <a:ext cx="1248429" cy="1299454"/>
+              <a:chOff x="899137" y="4079009"/>
+              <a:chExt cx="1248429" cy="1299454"/>
+            </a:xfrm>
+          </p:grpSpPr>
+          <p:pic>
+            <p:nvPicPr>
+              <p:cNvPr id="26" name="Grafik 25" descr="Mann mit einfarbiger Füllung">
+                <a:extLst>
+                  <a:ext uri="{FF2B5EF4-FFF2-40B4-BE49-F238E27FC236}">
+                    <a16:creationId xmlns:a16="http://schemas.microsoft.com/office/drawing/2014/main" id="{B2FD4635-CF40-83C1-5B5F-CFCDC02776A9}"/>
+                  </a:ext>
+                </a:extLst>
+              </p:cNvPr>
+              <p:cNvPicPr>
+                <a:picLocks noChangeAspect="1"/>
+              </p:cNvPicPr>
+              <p:nvPr/>
+            </p:nvPicPr>
+            <p:blipFill>
+              <a:blip r:embed="rId4">
+                <a:extLst>
+                  <a:ext uri="{28A0092B-C50C-407E-A947-70E740481C1C}">
+                    <a14:useLocalDpi xmlns:a14="http://schemas.microsoft.com/office/drawing/2010/main" val="0"/>
+                  </a:ext>
+                  <a:ext uri="{96DAC541-7B7A-43D3-8B79-37D633B846F1}">
+                    <asvg:svgBlip xmlns:asvg="http://schemas.microsoft.com/office/drawing/2016/SVG/main" r:embed="rId5"/>
+                  </a:ext>
+                </a:extLst>
+              </a:blip>
+              <a:stretch>
+                <a:fillRect/>
+              </a:stretch>
+            </p:blipFill>
+            <p:spPr>
+              <a:xfrm>
+                <a:off x="899137" y="4464063"/>
+                <a:ext cx="914400" cy="914400"/>
+              </a:xfrm>
+              <a:prstGeom prst="rect">
+                <a:avLst/>
+              </a:prstGeom>
+            </p:spPr>
+          </p:pic>
+          <p:pic>
+            <p:nvPicPr>
+              <p:cNvPr id="27" name="Grafik 26" descr="Megafon1 mit einfarbiger Füllung">
+                <a:extLst>
+                  <a:ext uri="{FF2B5EF4-FFF2-40B4-BE49-F238E27FC236}">
+                    <a16:creationId xmlns:a16="http://schemas.microsoft.com/office/drawing/2014/main" id="{41F971F7-10DE-F0CD-CE01-535E2804C188}"/>
+                  </a:ext>
+                </a:extLst>
+              </p:cNvPr>
+              <p:cNvPicPr>
+                <a:picLocks noChangeAspect="1"/>
+              </p:cNvPicPr>
+              <p:nvPr/>
+            </p:nvPicPr>
+            <p:blipFill>
+              <a:blip r:embed="rId6">
+                <a:extLst>
+                  <a:ext uri="{28A0092B-C50C-407E-A947-70E740481C1C}">
+                    <a14:useLocalDpi xmlns:a14="http://schemas.microsoft.com/office/drawing/2010/main" val="0"/>
+                  </a:ext>
+                  <a:ext uri="{96DAC541-7B7A-43D3-8B79-37D633B846F1}">
+                    <asvg:svgBlip xmlns:asvg="http://schemas.microsoft.com/office/drawing/2016/SVG/main" r:embed="rId7"/>
+                  </a:ext>
+                </a:extLst>
+              </a:blip>
+              <a:stretch>
+                <a:fillRect/>
+              </a:stretch>
+            </p:blipFill>
+            <p:spPr>
+              <a:xfrm rot="1715347">
+                <a:off x="1479505" y="4206233"/>
+                <a:ext cx="668061" cy="668061"/>
+              </a:xfrm>
+              <a:prstGeom prst="rect">
+                <a:avLst/>
+              </a:prstGeom>
+            </p:spPr>
+          </p:pic>
+          <p:sp>
+            <p:nvSpPr>
+              <p:cNvPr id="28" name="Textfeld 27">
+                <a:extLst>
+                  <a:ext uri="{FF2B5EF4-FFF2-40B4-BE49-F238E27FC236}">
+                    <a16:creationId xmlns:a16="http://schemas.microsoft.com/office/drawing/2014/main" id="{6A1D04C4-E2CD-E7BF-BAA0-9CCD9B0C747F}"/>
+                  </a:ext>
+                </a:extLst>
+              </p:cNvPr>
+              <p:cNvSpPr txBox="1"/>
+              <p:nvPr/>
+            </p:nvSpPr>
+            <p:spPr>
+              <a:xfrm>
+                <a:off x="930887" y="4079009"/>
+                <a:ext cx="850900" cy="276999"/>
+              </a:xfrm>
+              <a:prstGeom prst="rect">
+                <a:avLst/>
+              </a:prstGeom>
+              <a:noFill/>
+            </p:spPr>
+            <p:txBody>
+              <a:bodyPr wrap="square" rtlCol="0">
+                <a:spAutoFit/>
+              </a:bodyPr>
+              <a:lstStyle/>
+              <a:p>
+                <a:pPr algn="ctr"/>
+                <a:r>
+                  <a:rPr lang="de-DE" sz="1200" dirty="0"/>
+                  <a:t>Benutzer</a:t>
+                </a:r>
+              </a:p>
+            </p:txBody>
+          </p:sp>
+        </p:grpSp>
+        <p:grpSp>
+          <p:nvGrpSpPr>
+            <p:cNvPr id="7" name="Gruppieren 6">
+              <a:extLst>
+                <a:ext uri="{FF2B5EF4-FFF2-40B4-BE49-F238E27FC236}">
+                  <a16:creationId xmlns:a16="http://schemas.microsoft.com/office/drawing/2014/main" id="{983ECC27-F410-C99F-C339-E10F62547358}"/>
+                </a:ext>
+              </a:extLst>
+            </p:cNvPr>
+            <p:cNvGrpSpPr/>
+            <p:nvPr/>
+          </p:nvGrpSpPr>
+          <p:grpSpPr>
+            <a:xfrm>
+              <a:off x="7287918" y="2946991"/>
+              <a:ext cx="1840609" cy="1861037"/>
+              <a:chOff x="3968257" y="1565694"/>
+              <a:chExt cx="1840609" cy="1861037"/>
+            </a:xfrm>
+          </p:grpSpPr>
+          <p:pic>
+            <p:nvPicPr>
+              <p:cNvPr id="24" name="Grafik 23">
+                <a:extLst>
+                  <a:ext uri="{FF2B5EF4-FFF2-40B4-BE49-F238E27FC236}">
+                    <a16:creationId xmlns:a16="http://schemas.microsoft.com/office/drawing/2014/main" id="{9661906E-9AC6-2DDF-FE4C-37476F31B83B}"/>
+                  </a:ext>
+                </a:extLst>
+              </p:cNvPr>
+              <p:cNvPicPr>
+                <a:picLocks noChangeAspect="1"/>
+              </p:cNvPicPr>
+              <p:nvPr/>
+            </p:nvPicPr>
+            <p:blipFill>
+              <a:blip r:embed="rId8"/>
+              <a:stretch>
+                <a:fillRect/>
+              </a:stretch>
+            </p:blipFill>
+            <p:spPr>
+              <a:xfrm>
+                <a:off x="3968257" y="2080531"/>
+                <a:ext cx="1840609" cy="1346200"/>
+              </a:xfrm>
+              <a:prstGeom prst="rect">
+                <a:avLst/>
+              </a:prstGeom>
+            </p:spPr>
+          </p:pic>
+          <p:sp>
+            <p:nvSpPr>
+              <p:cNvPr id="25" name="Textfeld 24">
+                <a:extLst>
+                  <a:ext uri="{FF2B5EF4-FFF2-40B4-BE49-F238E27FC236}">
+                    <a16:creationId xmlns:a16="http://schemas.microsoft.com/office/drawing/2014/main" id="{21607E5F-3CB1-0738-038A-0C387A115A0E}"/>
+                  </a:ext>
+                </a:extLst>
+              </p:cNvPr>
+              <p:cNvSpPr txBox="1"/>
+              <p:nvPr/>
+            </p:nvSpPr>
+            <p:spPr>
+              <a:xfrm>
+                <a:off x="4348811" y="1565694"/>
+                <a:ext cx="1079500" cy="461665"/>
+              </a:xfrm>
+              <a:prstGeom prst="rect">
+                <a:avLst/>
+              </a:prstGeom>
+              <a:noFill/>
+            </p:spPr>
+            <p:txBody>
+              <a:bodyPr wrap="square" rtlCol="0">
+                <a:spAutoFit/>
+              </a:bodyPr>
+              <a:lstStyle/>
+              <a:p>
+                <a:pPr algn="ctr"/>
+                <a:r>
+                  <a:rPr lang="de-DE" sz="1200" dirty="0"/>
+                  <a:t>Arduino mit WLAN-Modul</a:t>
+                </a:r>
+              </a:p>
+            </p:txBody>
+          </p:sp>
+        </p:grpSp>
+        <p:cxnSp>
+          <p:nvCxnSpPr>
+            <p:cNvPr id="8" name="Gerade Verbindung mit Pfeil 7">
+              <a:extLst>
+                <a:ext uri="{FF2B5EF4-FFF2-40B4-BE49-F238E27FC236}">
+                  <a16:creationId xmlns:a16="http://schemas.microsoft.com/office/drawing/2014/main" id="{A094279F-516F-48CA-B540-4471106A7F9E}"/>
+                </a:ext>
+              </a:extLst>
+            </p:cNvPr>
+            <p:cNvCxnSpPr>
+              <a:cxnSpLocks/>
+            </p:cNvCxnSpPr>
+            <p:nvPr/>
+          </p:nvCxnSpPr>
+          <p:spPr>
+            <a:xfrm>
+              <a:off x="3311853" y="3877510"/>
+              <a:ext cx="1188000" cy="0"/>
+            </a:xfrm>
+            <a:prstGeom prst="straightConnector1">
+              <a:avLst/>
+            </a:prstGeom>
+            <a:ln w="25400">
+              <a:solidFill>
+                <a:schemeClr val="tx1"/>
+              </a:solidFill>
+              <a:tailEnd type="triangle"/>
+            </a:ln>
+          </p:spPr>
+          <p:style>
+            <a:lnRef idx="1">
+              <a:schemeClr val="accent1"/>
+            </a:lnRef>
+            <a:fillRef idx="0">
+              <a:schemeClr val="accent1"/>
+            </a:fillRef>
+            <a:effectRef idx="0">
+              <a:schemeClr val="accent1"/>
+            </a:effectRef>
+            <a:fontRef idx="minor">
+              <a:schemeClr val="tx1"/>
+            </a:fontRef>
+          </p:style>
+        </p:cxnSp>
+        <p:cxnSp>
+          <p:nvCxnSpPr>
+            <p:cNvPr id="9" name="Gerade Verbindung mit Pfeil 8">
+              <a:extLst>
+                <a:ext uri="{FF2B5EF4-FFF2-40B4-BE49-F238E27FC236}">
+                  <a16:creationId xmlns:a16="http://schemas.microsoft.com/office/drawing/2014/main" id="{72F07A30-F564-C953-7560-0CA08627029B}"/>
+                </a:ext>
+              </a:extLst>
+            </p:cNvPr>
+            <p:cNvCxnSpPr>
+              <a:cxnSpLocks/>
+            </p:cNvCxnSpPr>
+            <p:nvPr/>
+          </p:nvCxnSpPr>
+          <p:spPr>
+            <a:xfrm flipH="1">
+              <a:off x="3311853" y="4169610"/>
+              <a:ext cx="1188000" cy="0"/>
+            </a:xfrm>
+            <a:prstGeom prst="straightConnector1">
+              <a:avLst/>
+            </a:prstGeom>
+            <a:ln w="25400">
+              <a:solidFill>
+                <a:schemeClr val="tx1"/>
+              </a:solidFill>
+              <a:tailEnd type="triangle"/>
+            </a:ln>
+          </p:spPr>
+          <p:style>
+            <a:lnRef idx="1">
+              <a:schemeClr val="accent1"/>
+            </a:lnRef>
+            <a:fillRef idx="0">
+              <a:schemeClr val="accent1"/>
+            </a:fillRef>
+            <a:effectRef idx="0">
+              <a:schemeClr val="accent1"/>
+            </a:effectRef>
+            <a:fontRef idx="minor">
+              <a:schemeClr val="tx1"/>
+            </a:fontRef>
+          </p:style>
+        </p:cxnSp>
+        <p:sp>
+          <p:nvSpPr>
+            <p:cNvPr id="10" name="Textfeld 9">
+              <a:extLst>
+                <a:ext uri="{FF2B5EF4-FFF2-40B4-BE49-F238E27FC236}">
+                  <a16:creationId xmlns:a16="http://schemas.microsoft.com/office/drawing/2014/main" id="{DBA1125D-FA2C-C589-3C7A-CE1D90A0F107}"/>
+                </a:ext>
+              </a:extLst>
+            </p:cNvPr>
+            <p:cNvSpPr txBox="1"/>
+            <p:nvPr/>
+          </p:nvSpPr>
+          <p:spPr>
+            <a:xfrm>
+              <a:off x="3356645" y="3500962"/>
+              <a:ext cx="1028700" cy="276999"/>
+            </a:xfrm>
+            <a:prstGeom prst="rect">
+              <a:avLst/>
+            </a:prstGeom>
+            <a:noFill/>
+          </p:spPr>
+          <p:txBody>
+            <a:bodyPr wrap="square" rtlCol="0">
+              <a:spAutoFit/>
+            </a:bodyPr>
+            <a:lstStyle/>
+            <a:p>
+              <a:pPr algn="ctr"/>
+              <a:r>
+                <a:rPr lang="de-DE" sz="1200" dirty="0"/>
+                <a:t>Sprachbefehl</a:t>
+              </a:r>
+            </a:p>
+          </p:txBody>
+        </p:sp>
+        <p:sp>
+          <p:nvSpPr>
+            <p:cNvPr id="11" name="Textfeld 10">
+              <a:extLst>
+                <a:ext uri="{FF2B5EF4-FFF2-40B4-BE49-F238E27FC236}">
+                  <a16:creationId xmlns:a16="http://schemas.microsoft.com/office/drawing/2014/main" id="{F4661640-A5BF-3639-5A79-78DC02DEC2B9}"/>
+                </a:ext>
+              </a:extLst>
+            </p:cNvPr>
+            <p:cNvSpPr txBox="1"/>
+            <p:nvPr/>
+          </p:nvSpPr>
+          <p:spPr>
+            <a:xfrm>
+              <a:off x="3328050" y="4279414"/>
+              <a:ext cx="1143207" cy="276999"/>
+            </a:xfrm>
+            <a:prstGeom prst="rect">
+              <a:avLst/>
+            </a:prstGeom>
+            <a:noFill/>
+          </p:spPr>
+          <p:txBody>
+            <a:bodyPr wrap="square" rtlCol="0">
+              <a:spAutoFit/>
+            </a:bodyPr>
+            <a:lstStyle/>
+            <a:p>
+              <a:pPr algn="ctr"/>
+              <a:r>
+                <a:rPr lang="de-DE" sz="1200" dirty="0"/>
+                <a:t>Sprachantwort</a:t>
+              </a:r>
+            </a:p>
+          </p:txBody>
+        </p:sp>
+        <p:cxnSp>
+          <p:nvCxnSpPr>
+            <p:cNvPr id="12" name="Gerade Verbindung mit Pfeil 11">
+              <a:extLst>
+                <a:ext uri="{FF2B5EF4-FFF2-40B4-BE49-F238E27FC236}">
+                  <a16:creationId xmlns:a16="http://schemas.microsoft.com/office/drawing/2014/main" id="{C1A71EEF-C467-2EA7-7D46-C8F56BD64A8A}"/>
+                </a:ext>
+              </a:extLst>
+            </p:cNvPr>
+            <p:cNvCxnSpPr>
+              <a:cxnSpLocks/>
+            </p:cNvCxnSpPr>
+            <p:nvPr/>
+          </p:nvCxnSpPr>
+          <p:spPr>
+            <a:xfrm>
+              <a:off x="5634812" y="4219787"/>
+              <a:ext cx="1188000" cy="0"/>
+            </a:xfrm>
+            <a:prstGeom prst="straightConnector1">
+              <a:avLst/>
+            </a:prstGeom>
+            <a:ln w="25400">
+              <a:solidFill>
+                <a:schemeClr val="tx1"/>
+              </a:solidFill>
+              <a:tailEnd type="triangle"/>
+            </a:ln>
+          </p:spPr>
+          <p:style>
+            <a:lnRef idx="1">
+              <a:schemeClr val="accent1"/>
+            </a:lnRef>
+            <a:fillRef idx="0">
+              <a:schemeClr val="accent1"/>
+            </a:fillRef>
+            <a:effectRef idx="0">
+              <a:schemeClr val="accent1"/>
+            </a:effectRef>
+            <a:fontRef idx="minor">
+              <a:schemeClr val="tx1"/>
+            </a:fontRef>
+          </p:style>
+        </p:cxnSp>
+        <p:sp>
+          <p:nvSpPr>
+            <p:cNvPr id="13" name="Textfeld 12">
+              <a:extLst>
+                <a:ext uri="{FF2B5EF4-FFF2-40B4-BE49-F238E27FC236}">
+                  <a16:creationId xmlns:a16="http://schemas.microsoft.com/office/drawing/2014/main" id="{ABB1C764-12F7-C192-946E-A2B09A749510}"/>
+                </a:ext>
+              </a:extLst>
+            </p:cNvPr>
+            <p:cNvSpPr txBox="1"/>
+            <p:nvPr/>
+          </p:nvSpPr>
+          <p:spPr>
+            <a:xfrm>
+              <a:off x="5390072" y="3707945"/>
+              <a:ext cx="1733819" cy="461665"/>
+            </a:xfrm>
+            <a:prstGeom prst="rect">
+              <a:avLst/>
+            </a:prstGeom>
+            <a:noFill/>
+          </p:spPr>
+          <p:txBody>
+            <a:bodyPr wrap="square" rtlCol="0">
+              <a:spAutoFit/>
+            </a:bodyPr>
+            <a:lstStyle/>
+            <a:p>
+              <a:pPr algn="ctr"/>
+              <a:r>
+                <a:rPr lang="de-DE" sz="1200" dirty="0"/>
+                <a:t>Befehl aus Befehlssatz des Arduino über HTTP</a:t>
+              </a:r>
+            </a:p>
+          </p:txBody>
+        </p:sp>
+        <p:pic>
+          <p:nvPicPr>
+            <p:cNvPr id="14" name="Grafik 13" descr="Pfeil mit einer Linie: Nach rechts drehen mit einfarbiger Füllung">
+              <a:extLst>
+                <a:ext uri="{FF2B5EF4-FFF2-40B4-BE49-F238E27FC236}">
+                  <a16:creationId xmlns:a16="http://schemas.microsoft.com/office/drawing/2014/main" id="{0B39A55C-B874-8A47-2B2A-6007DE8D078C}"/>
+                </a:ext>
+              </a:extLst>
+            </p:cNvPr>
+            <p:cNvPicPr>
+              <a:picLocks noChangeAspect="1"/>
+            </p:cNvPicPr>
+            <p:nvPr/>
+          </p:nvPicPr>
+          <p:blipFill>
+            <a:blip r:embed="rId9">
+              <a:extLst>
+                <a:ext uri="{28A0092B-C50C-407E-A947-70E740481C1C}">
+                  <a14:useLocalDpi xmlns:a14="http://schemas.microsoft.com/office/drawing/2010/main" val="0"/>
+                </a:ext>
+                <a:ext uri="{96DAC541-7B7A-43D3-8B79-37D633B846F1}">
+                  <asvg:svgBlip xmlns:asvg="http://schemas.microsoft.com/office/drawing/2016/SVG/main" r:embed="rId10"/>
+                </a:ext>
+              </a:extLst>
+            </a:blip>
+            <a:stretch>
+              <a:fillRect/>
+            </a:stretch>
+          </p:blipFill>
+          <p:spPr>
+            <a:xfrm rot="5400000">
+              <a:off x="9033702" y="3944007"/>
+              <a:ext cx="517703" cy="517703"/>
+            </a:xfrm>
+            <a:prstGeom prst="rect">
+              <a:avLst/>
+            </a:prstGeom>
+          </p:spPr>
+        </p:pic>
+        <p:sp>
+          <p:nvSpPr>
+            <p:cNvPr id="15" name="Textfeld 14">
+              <a:extLst>
+                <a:ext uri="{FF2B5EF4-FFF2-40B4-BE49-F238E27FC236}">
+                  <a16:creationId xmlns:a16="http://schemas.microsoft.com/office/drawing/2014/main" id="{7FB4C3D2-09CA-DBA0-9FD3-48CD82871F64}"/>
+                </a:ext>
+              </a:extLst>
+            </p:cNvPr>
+            <p:cNvSpPr txBox="1"/>
+            <p:nvPr/>
+          </p:nvSpPr>
+          <p:spPr>
+            <a:xfrm>
+              <a:off x="9551405" y="3938777"/>
+              <a:ext cx="939800" cy="461665"/>
+            </a:xfrm>
+            <a:prstGeom prst="rect">
+              <a:avLst/>
+            </a:prstGeom>
+            <a:noFill/>
+          </p:spPr>
+          <p:txBody>
+            <a:bodyPr wrap="square" rtlCol="0">
+              <a:spAutoFit/>
+            </a:bodyPr>
+            <a:lstStyle/>
+            <a:p>
+              <a:r>
+                <a:rPr lang="de-DE" sz="1200" dirty="0"/>
+                <a:t>Führt Aktion aus</a:t>
+              </a:r>
+            </a:p>
+          </p:txBody>
+        </p:sp>
+        <p:pic>
+          <p:nvPicPr>
+            <p:cNvPr id="16" name="Grafik 15" descr="Internet der Dinge mit einfarbiger Füllung">
+              <a:extLst>
+                <a:ext uri="{FF2B5EF4-FFF2-40B4-BE49-F238E27FC236}">
+                  <a16:creationId xmlns:a16="http://schemas.microsoft.com/office/drawing/2014/main" id="{922C2278-5124-0252-446B-5ACB8CB1E8F1}"/>
+                </a:ext>
+              </a:extLst>
+            </p:cNvPr>
+            <p:cNvPicPr>
+              <a:picLocks noChangeAspect="1"/>
+            </p:cNvPicPr>
+            <p:nvPr/>
+          </p:nvPicPr>
+          <p:blipFill>
+            <a:blip r:embed="rId11">
+              <a:extLst>
+                <a:ext uri="{28A0092B-C50C-407E-A947-70E740481C1C}">
+                  <a14:useLocalDpi xmlns:a14="http://schemas.microsoft.com/office/drawing/2010/main" val="0"/>
+                </a:ext>
+                <a:ext uri="{96DAC541-7B7A-43D3-8B79-37D633B846F1}">
+                  <asvg:svgBlip xmlns:asvg="http://schemas.microsoft.com/office/drawing/2016/SVG/main" r:embed="rId12"/>
+                </a:ext>
+              </a:extLst>
+            </a:blip>
+            <a:stretch>
+              <a:fillRect/>
+            </a:stretch>
+          </p:blipFill>
+          <p:spPr>
+            <a:xfrm>
+              <a:off x="4628881" y="556323"/>
+              <a:ext cx="914400" cy="914400"/>
+            </a:xfrm>
+            <a:prstGeom prst="rect">
+              <a:avLst/>
+            </a:prstGeom>
+          </p:spPr>
+        </p:pic>
+        <p:sp>
+          <p:nvSpPr>
+            <p:cNvPr id="17" name="Textfeld 16">
+              <a:extLst>
+                <a:ext uri="{FF2B5EF4-FFF2-40B4-BE49-F238E27FC236}">
+                  <a16:creationId xmlns:a16="http://schemas.microsoft.com/office/drawing/2014/main" id="{A16F08F9-5985-6981-BF70-8C20C8054404}"/>
+                </a:ext>
+              </a:extLst>
+            </p:cNvPr>
+            <p:cNvSpPr txBox="1"/>
+            <p:nvPr/>
+          </p:nvSpPr>
+          <p:spPr>
+            <a:xfrm>
+              <a:off x="4185804" y="301632"/>
+              <a:ext cx="1800553" cy="276999"/>
+            </a:xfrm>
+            <a:prstGeom prst="rect">
+              <a:avLst/>
+            </a:prstGeom>
+            <a:noFill/>
+          </p:spPr>
+          <p:txBody>
+            <a:bodyPr wrap="square" rtlCol="0">
+              <a:spAutoFit/>
+            </a:bodyPr>
+            <a:lstStyle/>
+            <a:p>
+              <a:pPr algn="ctr"/>
+              <a:r>
+                <a:rPr lang="de-DE" sz="1200" dirty="0"/>
+                <a:t>Spracherkennungssystem</a:t>
+              </a:r>
+            </a:p>
+          </p:txBody>
+        </p:sp>
+        <p:grpSp>
+          <p:nvGrpSpPr>
+            <p:cNvPr id="18" name="Gruppieren 17">
+              <a:extLst>
+                <a:ext uri="{FF2B5EF4-FFF2-40B4-BE49-F238E27FC236}">
+                  <a16:creationId xmlns:a16="http://schemas.microsoft.com/office/drawing/2014/main" id="{8BCA8B7B-EF70-B4C1-B829-593ADF2DC241}"/>
+                </a:ext>
+              </a:extLst>
+            </p:cNvPr>
+            <p:cNvGrpSpPr/>
+            <p:nvPr/>
+          </p:nvGrpSpPr>
+          <p:grpSpPr>
+            <a:xfrm rot="16200000">
+              <a:off x="4034881" y="2068749"/>
+              <a:ext cx="1188000" cy="376548"/>
+              <a:chOff x="2880053" y="2195689"/>
+              <a:chExt cx="1188000" cy="376548"/>
+            </a:xfrm>
+          </p:grpSpPr>
+          <p:cxnSp>
+            <p:nvCxnSpPr>
+              <p:cNvPr id="22" name="Gerade Verbindung mit Pfeil 21">
+                <a:extLst>
+                  <a:ext uri="{FF2B5EF4-FFF2-40B4-BE49-F238E27FC236}">
+                    <a16:creationId xmlns:a16="http://schemas.microsoft.com/office/drawing/2014/main" id="{40A37462-CD3A-6DAE-99E7-FAB17499CC7A}"/>
+                  </a:ext>
+                </a:extLst>
+              </p:cNvPr>
+              <p:cNvCxnSpPr>
+                <a:cxnSpLocks/>
+              </p:cNvCxnSpPr>
+              <p:nvPr/>
+            </p:nvCxnSpPr>
+            <p:spPr>
+              <a:xfrm>
+                <a:off x="2880053" y="2572237"/>
+                <a:ext cx="1188000" cy="0"/>
+              </a:xfrm>
+              <a:prstGeom prst="straightConnector1">
+                <a:avLst/>
+              </a:prstGeom>
+              <a:ln w="25400">
+                <a:solidFill>
+                  <a:schemeClr val="tx1"/>
+                </a:solidFill>
+                <a:tailEnd type="triangle"/>
+              </a:ln>
+            </p:spPr>
+            <p:style>
+              <a:lnRef idx="1">
+                <a:schemeClr val="accent1"/>
+              </a:lnRef>
+              <a:fillRef idx="0">
+                <a:schemeClr val="accent1"/>
+              </a:fillRef>
+              <a:effectRef idx="0">
+                <a:schemeClr val="accent1"/>
+              </a:effectRef>
+              <a:fontRef idx="minor">
+                <a:schemeClr val="tx1"/>
+              </a:fontRef>
+            </p:style>
+          </p:cxnSp>
+          <p:sp>
+            <p:nvSpPr>
+              <p:cNvPr id="23" name="Textfeld 22">
+                <a:extLst>
+                  <a:ext uri="{FF2B5EF4-FFF2-40B4-BE49-F238E27FC236}">
+                    <a16:creationId xmlns:a16="http://schemas.microsoft.com/office/drawing/2014/main" id="{6B680194-A658-BA0A-321F-2B2B81A386B8}"/>
+                  </a:ext>
+                </a:extLst>
+              </p:cNvPr>
+              <p:cNvSpPr txBox="1"/>
+              <p:nvPr/>
+            </p:nvSpPr>
+            <p:spPr>
+              <a:xfrm>
+                <a:off x="2924845" y="2195689"/>
+                <a:ext cx="1028700" cy="276999"/>
+              </a:xfrm>
+              <a:prstGeom prst="rect">
+                <a:avLst/>
+              </a:prstGeom>
+              <a:noFill/>
+            </p:spPr>
+            <p:txBody>
+              <a:bodyPr wrap="square" rtlCol="0">
+                <a:spAutoFit/>
+              </a:bodyPr>
+              <a:lstStyle/>
+              <a:p>
+                <a:pPr algn="ctr"/>
+                <a:r>
+                  <a:rPr lang="de-DE" sz="1200" dirty="0"/>
+                  <a:t>Sprachbefehl</a:t>
+                </a:r>
+              </a:p>
+            </p:txBody>
+          </p:sp>
+        </p:grpSp>
+        <p:grpSp>
+          <p:nvGrpSpPr>
+            <p:cNvPr id="19" name="Gruppieren 18">
+              <a:extLst>
+                <a:ext uri="{FF2B5EF4-FFF2-40B4-BE49-F238E27FC236}">
+                  <a16:creationId xmlns:a16="http://schemas.microsoft.com/office/drawing/2014/main" id="{EC3A8728-EF93-E18C-EDE0-060FA12FE800}"/>
+                </a:ext>
+              </a:extLst>
+            </p:cNvPr>
+            <p:cNvGrpSpPr/>
+            <p:nvPr/>
+          </p:nvGrpSpPr>
+          <p:grpSpPr>
+            <a:xfrm rot="5400000">
+              <a:off x="4902759" y="2057440"/>
+              <a:ext cx="1188000" cy="468881"/>
+              <a:chOff x="5191453" y="2024177"/>
+              <a:chExt cx="1188000" cy="468881"/>
+            </a:xfrm>
+          </p:grpSpPr>
+          <p:cxnSp>
+            <p:nvCxnSpPr>
+              <p:cNvPr id="20" name="Gerade Verbindung mit Pfeil 19">
+                <a:extLst>
+                  <a:ext uri="{FF2B5EF4-FFF2-40B4-BE49-F238E27FC236}">
+                    <a16:creationId xmlns:a16="http://schemas.microsoft.com/office/drawing/2014/main" id="{902CE141-B01E-08FA-C1DE-4BEE5EB0B9E6}"/>
+                  </a:ext>
+                </a:extLst>
+              </p:cNvPr>
+              <p:cNvCxnSpPr>
+                <a:cxnSpLocks/>
+              </p:cNvCxnSpPr>
+              <p:nvPr/>
+            </p:nvCxnSpPr>
+            <p:spPr>
+              <a:xfrm>
+                <a:off x="5191453" y="2493058"/>
+                <a:ext cx="1188000" cy="0"/>
+              </a:xfrm>
+              <a:prstGeom prst="straightConnector1">
+                <a:avLst/>
+              </a:prstGeom>
+              <a:ln w="25400">
+                <a:solidFill>
+                  <a:schemeClr val="tx1"/>
+                </a:solidFill>
+                <a:tailEnd type="triangle"/>
+              </a:ln>
+            </p:spPr>
+            <p:style>
+              <a:lnRef idx="1">
+                <a:schemeClr val="accent1"/>
+              </a:lnRef>
+              <a:fillRef idx="0">
+                <a:schemeClr val="accent1"/>
+              </a:fillRef>
+              <a:effectRef idx="0">
+                <a:schemeClr val="accent1"/>
+              </a:effectRef>
+              <a:fontRef idx="minor">
+                <a:schemeClr val="tx1"/>
+              </a:fontRef>
+            </p:style>
+          </p:cxnSp>
+          <p:sp>
+            <p:nvSpPr>
+              <p:cNvPr id="21" name="Textfeld 20">
+                <a:extLst>
+                  <a:ext uri="{FF2B5EF4-FFF2-40B4-BE49-F238E27FC236}">
+                    <a16:creationId xmlns:a16="http://schemas.microsoft.com/office/drawing/2014/main" id="{7A91938F-772D-A3E1-7FE7-5556C8FA7D29}"/>
+                  </a:ext>
+                </a:extLst>
+              </p:cNvPr>
+              <p:cNvSpPr txBox="1"/>
+              <p:nvPr/>
+            </p:nvSpPr>
+            <p:spPr>
+              <a:xfrm>
+                <a:off x="5236246" y="2024177"/>
+                <a:ext cx="1028700" cy="461665"/>
+              </a:xfrm>
+              <a:prstGeom prst="rect">
+                <a:avLst/>
+              </a:prstGeom>
+              <a:noFill/>
+            </p:spPr>
+            <p:txBody>
+              <a:bodyPr wrap="square" rtlCol="0">
+                <a:spAutoFit/>
+              </a:bodyPr>
+              <a:lstStyle/>
+              <a:p>
+                <a:pPr algn="ctr"/>
+                <a:r>
+                  <a:rPr lang="de-DE" sz="1200" dirty="0"/>
+                  <a:t>Arduino-Befehl</a:t>
+                </a:r>
+              </a:p>
+            </p:txBody>
+          </p:sp>
+        </p:grpSp>
+      </p:grpSp>
+    </p:spTree>
+    <p:extLst>
+      <p:ext uri="{BB962C8B-B14F-4D97-AF65-F5344CB8AC3E}">
+        <p14:creationId xmlns:p14="http://schemas.microsoft.com/office/powerpoint/2010/main" val="158093668"/>
+      </p:ext>
+    </p:extLst>
+  </p:cSld>
+  <p:clrMapOvr>
+    <a:masterClrMapping/>
+  </p:clrMapOvr>
+</p:sld>
+</file>
+
+<file path=ppt/slides/slide3.xml><?xml version="1.0" encoding="utf-8"?>
+<p:sld xmlns:a="http://schemas.openxmlformats.org/drawingml/2006/main" xmlns:r="http://schemas.openxmlformats.org/officeDocument/2006/relationships" xmlns:p="http://schemas.openxmlformats.org/presentationml/2006/main">
+  <p:cSld>
+    <p:spTree>
+      <p:nvGrpSpPr>
+        <p:cNvPr id="1" name=""/>
+        <p:cNvGrpSpPr/>
+        <p:nvPr/>
+      </p:nvGrpSpPr>
+      <p:grpSpPr>
+        <a:xfrm>
+          <a:off x="0" y="0"/>
+          <a:ext cx="0" cy="0"/>
+          <a:chOff x="0" y="0"/>
+          <a:chExt cx="0" cy="0"/>
+        </a:xfrm>
+      </p:grpSpPr>
       <p:sp>
         <p:nvSpPr>
           <p:cNvPr id="4" name="Textfeld 3">
@@ -6137,7 +7537,791 @@
 </p:sld>
 </file>
 
-<file path=ppt/slides/slide3.xml><?xml version="1.0" encoding="utf-8"?>
+<file path=ppt/slides/slide4.xml><?xml version="1.0" encoding="utf-8"?>
+<p:sld xmlns:a="http://schemas.openxmlformats.org/drawingml/2006/main" xmlns:r="http://schemas.openxmlformats.org/officeDocument/2006/relationships" xmlns:p="http://schemas.openxmlformats.org/presentationml/2006/main">
+  <p:cSld>
+    <p:spTree>
+      <p:nvGrpSpPr>
+        <p:cNvPr id="1" name=""/>
+        <p:cNvGrpSpPr/>
+        <p:nvPr/>
+      </p:nvGrpSpPr>
+      <p:grpSpPr>
+        <a:xfrm>
+          <a:off x="0" y="0"/>
+          <a:ext cx="0" cy="0"/>
+          <a:chOff x="0" y="0"/>
+          <a:chExt cx="0" cy="0"/>
+        </a:xfrm>
+      </p:grpSpPr>
+      <p:grpSp>
+        <p:nvGrpSpPr>
+          <p:cNvPr id="4" name="Gruppieren 3">
+            <a:extLst>
+              <a:ext uri="{FF2B5EF4-FFF2-40B4-BE49-F238E27FC236}">
+                <a16:creationId xmlns:a16="http://schemas.microsoft.com/office/drawing/2014/main" id="{1006BB4F-8B4C-A09A-A36A-9F473CA27420}"/>
+              </a:ext>
+            </a:extLst>
+          </p:cNvPr>
+          <p:cNvGrpSpPr/>
+          <p:nvPr/>
+        </p:nvGrpSpPr>
+        <p:grpSpPr>
+          <a:xfrm>
+            <a:off x="3049964" y="1126106"/>
+            <a:ext cx="6092072" cy="4605787"/>
+            <a:chOff x="2458242" y="1394465"/>
+            <a:chExt cx="6092072" cy="4605787"/>
+          </a:xfrm>
+        </p:grpSpPr>
+        <p:grpSp>
+          <p:nvGrpSpPr>
+            <p:cNvPr id="5" name="Gruppieren 4">
+              <a:extLst>
+                <a:ext uri="{FF2B5EF4-FFF2-40B4-BE49-F238E27FC236}">
+                  <a16:creationId xmlns:a16="http://schemas.microsoft.com/office/drawing/2014/main" id="{11C3D27A-31B4-B4D2-DDD1-B30F32BB0C75}"/>
+                </a:ext>
+              </a:extLst>
+            </p:cNvPr>
+            <p:cNvGrpSpPr/>
+            <p:nvPr/>
+          </p:nvGrpSpPr>
+          <p:grpSpPr>
+            <a:xfrm>
+              <a:off x="2458242" y="4394236"/>
+              <a:ext cx="1248429" cy="1299454"/>
+              <a:chOff x="899137" y="4079009"/>
+              <a:chExt cx="1248429" cy="1299454"/>
+            </a:xfrm>
+          </p:grpSpPr>
+          <p:pic>
+            <p:nvPicPr>
+              <p:cNvPr id="23" name="Grafik 22" descr="Mann mit einfarbiger Füllung">
+                <a:extLst>
+                  <a:ext uri="{FF2B5EF4-FFF2-40B4-BE49-F238E27FC236}">
+                    <a16:creationId xmlns:a16="http://schemas.microsoft.com/office/drawing/2014/main" id="{E05192E8-43F3-E7F4-2928-0A2526EB3A1C}"/>
+                  </a:ext>
+                </a:extLst>
+              </p:cNvPr>
+              <p:cNvPicPr>
+                <a:picLocks noChangeAspect="1"/>
+              </p:cNvPicPr>
+              <p:nvPr/>
+            </p:nvPicPr>
+            <p:blipFill>
+              <a:blip r:embed="rId2">
+                <a:extLst>
+                  <a:ext uri="{28A0092B-C50C-407E-A947-70E740481C1C}">
+                    <a14:useLocalDpi xmlns:a14="http://schemas.microsoft.com/office/drawing/2010/main" val="0"/>
+                  </a:ext>
+                  <a:ext uri="{96DAC541-7B7A-43D3-8B79-37D633B846F1}">
+                    <asvg:svgBlip xmlns:asvg="http://schemas.microsoft.com/office/drawing/2016/SVG/main" r:embed="rId3"/>
+                  </a:ext>
+                </a:extLst>
+              </a:blip>
+              <a:stretch>
+                <a:fillRect/>
+              </a:stretch>
+            </p:blipFill>
+            <p:spPr>
+              <a:xfrm>
+                <a:off x="899137" y="4464063"/>
+                <a:ext cx="914400" cy="914400"/>
+              </a:xfrm>
+              <a:prstGeom prst="rect">
+                <a:avLst/>
+              </a:prstGeom>
+            </p:spPr>
+          </p:pic>
+          <p:pic>
+            <p:nvPicPr>
+              <p:cNvPr id="24" name="Grafik 23" descr="Megafon1 mit einfarbiger Füllung">
+                <a:extLst>
+                  <a:ext uri="{FF2B5EF4-FFF2-40B4-BE49-F238E27FC236}">
+                    <a16:creationId xmlns:a16="http://schemas.microsoft.com/office/drawing/2014/main" id="{5A8BEC4E-0B2D-95F1-42D2-4B02C931DA5C}"/>
+                  </a:ext>
+                </a:extLst>
+              </p:cNvPr>
+              <p:cNvPicPr>
+                <a:picLocks noChangeAspect="1"/>
+              </p:cNvPicPr>
+              <p:nvPr/>
+            </p:nvPicPr>
+            <p:blipFill>
+              <a:blip r:embed="rId4">
+                <a:extLst>
+                  <a:ext uri="{28A0092B-C50C-407E-A947-70E740481C1C}">
+                    <a14:useLocalDpi xmlns:a14="http://schemas.microsoft.com/office/drawing/2010/main" val="0"/>
+                  </a:ext>
+                  <a:ext uri="{96DAC541-7B7A-43D3-8B79-37D633B846F1}">
+                    <asvg:svgBlip xmlns:asvg="http://schemas.microsoft.com/office/drawing/2016/SVG/main" r:embed="rId5"/>
+                  </a:ext>
+                </a:extLst>
+              </a:blip>
+              <a:stretch>
+                <a:fillRect/>
+              </a:stretch>
+            </p:blipFill>
+            <p:spPr>
+              <a:xfrm rot="1715347">
+                <a:off x="1479505" y="4206233"/>
+                <a:ext cx="668061" cy="668061"/>
+              </a:xfrm>
+              <a:prstGeom prst="rect">
+                <a:avLst/>
+              </a:prstGeom>
+            </p:spPr>
+          </p:pic>
+          <p:sp>
+            <p:nvSpPr>
+              <p:cNvPr id="25" name="Textfeld 24">
+                <a:extLst>
+                  <a:ext uri="{FF2B5EF4-FFF2-40B4-BE49-F238E27FC236}">
+                    <a16:creationId xmlns:a16="http://schemas.microsoft.com/office/drawing/2014/main" id="{0221C428-6396-A7AB-C369-FFDAF53D67EF}"/>
+                  </a:ext>
+                </a:extLst>
+              </p:cNvPr>
+              <p:cNvSpPr txBox="1"/>
+              <p:nvPr/>
+            </p:nvSpPr>
+            <p:spPr>
+              <a:xfrm>
+                <a:off x="930887" y="4079009"/>
+                <a:ext cx="850900" cy="276999"/>
+              </a:xfrm>
+              <a:prstGeom prst="rect">
+                <a:avLst/>
+              </a:prstGeom>
+              <a:noFill/>
+            </p:spPr>
+            <p:txBody>
+              <a:bodyPr wrap="square" rtlCol="0">
+                <a:spAutoFit/>
+              </a:bodyPr>
+              <a:lstStyle/>
+              <a:p>
+                <a:pPr algn="ctr"/>
+                <a:r>
+                  <a:rPr lang="de-DE" sz="1200" dirty="0"/>
+                  <a:t>Benutzer</a:t>
+                </a:r>
+              </a:p>
+            </p:txBody>
+          </p:sp>
+        </p:grpSp>
+        <p:grpSp>
+          <p:nvGrpSpPr>
+            <p:cNvPr id="6" name="Gruppieren 5">
+              <a:extLst>
+                <a:ext uri="{FF2B5EF4-FFF2-40B4-BE49-F238E27FC236}">
+                  <a16:creationId xmlns:a16="http://schemas.microsoft.com/office/drawing/2014/main" id="{4F25E25F-8410-B7F4-3386-7FA20AEBCDC8}"/>
+                </a:ext>
+              </a:extLst>
+            </p:cNvPr>
+            <p:cNvGrpSpPr/>
+            <p:nvPr/>
+          </p:nvGrpSpPr>
+          <p:grpSpPr>
+            <a:xfrm>
+              <a:off x="5347027" y="4139215"/>
+              <a:ext cx="1840609" cy="1861037"/>
+              <a:chOff x="3968257" y="1565694"/>
+              <a:chExt cx="1840609" cy="1861037"/>
+            </a:xfrm>
+          </p:grpSpPr>
+          <p:pic>
+            <p:nvPicPr>
+              <p:cNvPr id="21" name="Grafik 20">
+                <a:extLst>
+                  <a:ext uri="{FF2B5EF4-FFF2-40B4-BE49-F238E27FC236}">
+                    <a16:creationId xmlns:a16="http://schemas.microsoft.com/office/drawing/2014/main" id="{02DBBF83-CFC2-69B1-5EB2-DD86ECBFD0BF}"/>
+                  </a:ext>
+                </a:extLst>
+              </p:cNvPr>
+              <p:cNvPicPr>
+                <a:picLocks noChangeAspect="1"/>
+              </p:cNvPicPr>
+              <p:nvPr/>
+            </p:nvPicPr>
+            <p:blipFill>
+              <a:blip r:embed="rId6"/>
+              <a:stretch>
+                <a:fillRect/>
+              </a:stretch>
+            </p:blipFill>
+            <p:spPr>
+              <a:xfrm>
+                <a:off x="3968257" y="2080531"/>
+                <a:ext cx="1840609" cy="1346200"/>
+              </a:xfrm>
+              <a:prstGeom prst="rect">
+                <a:avLst/>
+              </a:prstGeom>
+            </p:spPr>
+          </p:pic>
+          <p:sp>
+            <p:nvSpPr>
+              <p:cNvPr id="22" name="Textfeld 21">
+                <a:extLst>
+                  <a:ext uri="{FF2B5EF4-FFF2-40B4-BE49-F238E27FC236}">
+                    <a16:creationId xmlns:a16="http://schemas.microsoft.com/office/drawing/2014/main" id="{49CB7039-50AE-3469-CF98-F41C76EDBF94}"/>
+                  </a:ext>
+                </a:extLst>
+              </p:cNvPr>
+              <p:cNvSpPr txBox="1"/>
+              <p:nvPr/>
+            </p:nvSpPr>
+            <p:spPr>
+              <a:xfrm>
+                <a:off x="4348811" y="1565694"/>
+                <a:ext cx="1079500" cy="461665"/>
+              </a:xfrm>
+              <a:prstGeom prst="rect">
+                <a:avLst/>
+              </a:prstGeom>
+              <a:noFill/>
+            </p:spPr>
+            <p:txBody>
+              <a:bodyPr wrap="square" rtlCol="0">
+                <a:spAutoFit/>
+              </a:bodyPr>
+              <a:lstStyle/>
+              <a:p>
+                <a:pPr algn="ctr"/>
+                <a:r>
+                  <a:rPr lang="de-DE" sz="1200" dirty="0"/>
+                  <a:t>Arduino mit Sprach-Modul</a:t>
+                </a:r>
+              </a:p>
+            </p:txBody>
+          </p:sp>
+        </p:grpSp>
+        <p:cxnSp>
+          <p:nvCxnSpPr>
+            <p:cNvPr id="7" name="Gerade Verbindung mit Pfeil 6">
+              <a:extLst>
+                <a:ext uri="{FF2B5EF4-FFF2-40B4-BE49-F238E27FC236}">
+                  <a16:creationId xmlns:a16="http://schemas.microsoft.com/office/drawing/2014/main" id="{B1C063EC-998F-5A93-8A57-7E8265391B79}"/>
+                </a:ext>
+              </a:extLst>
+            </p:cNvPr>
+            <p:cNvCxnSpPr>
+              <a:cxnSpLocks/>
+            </p:cNvCxnSpPr>
+            <p:nvPr/>
+          </p:nvCxnSpPr>
+          <p:spPr>
+            <a:xfrm>
+              <a:off x="3895501" y="5109490"/>
+              <a:ext cx="1188000" cy="0"/>
+            </a:xfrm>
+            <a:prstGeom prst="straightConnector1">
+              <a:avLst/>
+            </a:prstGeom>
+            <a:ln w="25400">
+              <a:solidFill>
+                <a:schemeClr val="tx1"/>
+              </a:solidFill>
+              <a:tailEnd type="triangle"/>
+            </a:ln>
+          </p:spPr>
+          <p:style>
+            <a:lnRef idx="1">
+              <a:schemeClr val="accent1"/>
+            </a:lnRef>
+            <a:fillRef idx="0">
+              <a:schemeClr val="accent1"/>
+            </a:fillRef>
+            <a:effectRef idx="0">
+              <a:schemeClr val="accent1"/>
+            </a:effectRef>
+            <a:fontRef idx="minor">
+              <a:schemeClr val="tx1"/>
+            </a:fontRef>
+          </p:style>
+        </p:cxnSp>
+        <p:cxnSp>
+          <p:nvCxnSpPr>
+            <p:cNvPr id="8" name="Gerade Verbindung mit Pfeil 7">
+              <a:extLst>
+                <a:ext uri="{FF2B5EF4-FFF2-40B4-BE49-F238E27FC236}">
+                  <a16:creationId xmlns:a16="http://schemas.microsoft.com/office/drawing/2014/main" id="{ADA21AB6-5BB7-C520-0746-1E95A71DDAC6}"/>
+                </a:ext>
+              </a:extLst>
+            </p:cNvPr>
+            <p:cNvCxnSpPr>
+              <a:cxnSpLocks/>
+            </p:cNvCxnSpPr>
+            <p:nvPr/>
+          </p:nvCxnSpPr>
+          <p:spPr>
+            <a:xfrm flipH="1">
+              <a:off x="3895501" y="5401590"/>
+              <a:ext cx="1188000" cy="0"/>
+            </a:xfrm>
+            <a:prstGeom prst="straightConnector1">
+              <a:avLst/>
+            </a:prstGeom>
+            <a:ln w="25400">
+              <a:solidFill>
+                <a:schemeClr val="tx1"/>
+              </a:solidFill>
+              <a:tailEnd type="triangle"/>
+            </a:ln>
+          </p:spPr>
+          <p:style>
+            <a:lnRef idx="1">
+              <a:schemeClr val="accent1"/>
+            </a:lnRef>
+            <a:fillRef idx="0">
+              <a:schemeClr val="accent1"/>
+            </a:fillRef>
+            <a:effectRef idx="0">
+              <a:schemeClr val="accent1"/>
+            </a:effectRef>
+            <a:fontRef idx="minor">
+              <a:schemeClr val="tx1"/>
+            </a:fontRef>
+          </p:style>
+        </p:cxnSp>
+        <p:sp>
+          <p:nvSpPr>
+            <p:cNvPr id="9" name="Textfeld 8">
+              <a:extLst>
+                <a:ext uri="{FF2B5EF4-FFF2-40B4-BE49-F238E27FC236}">
+                  <a16:creationId xmlns:a16="http://schemas.microsoft.com/office/drawing/2014/main" id="{216D5236-1637-37AD-EBBD-CB3136F794CC}"/>
+                </a:ext>
+              </a:extLst>
+            </p:cNvPr>
+            <p:cNvSpPr txBox="1"/>
+            <p:nvPr/>
+          </p:nvSpPr>
+          <p:spPr>
+            <a:xfrm>
+              <a:off x="3940293" y="4732942"/>
+              <a:ext cx="1028700" cy="276999"/>
+            </a:xfrm>
+            <a:prstGeom prst="rect">
+              <a:avLst/>
+            </a:prstGeom>
+            <a:noFill/>
+          </p:spPr>
+          <p:txBody>
+            <a:bodyPr wrap="square" rtlCol="0">
+              <a:spAutoFit/>
+            </a:bodyPr>
+            <a:lstStyle/>
+            <a:p>
+              <a:pPr algn="ctr"/>
+              <a:r>
+                <a:rPr lang="de-DE" sz="1200" dirty="0"/>
+                <a:t>Sprachbefehl</a:t>
+              </a:r>
+            </a:p>
+          </p:txBody>
+        </p:sp>
+        <p:sp>
+          <p:nvSpPr>
+            <p:cNvPr id="10" name="Textfeld 9">
+              <a:extLst>
+                <a:ext uri="{FF2B5EF4-FFF2-40B4-BE49-F238E27FC236}">
+                  <a16:creationId xmlns:a16="http://schemas.microsoft.com/office/drawing/2014/main" id="{FFD704B3-295B-15C2-EBCC-EAE0A477EC61}"/>
+                </a:ext>
+              </a:extLst>
+            </p:cNvPr>
+            <p:cNvSpPr txBox="1"/>
+            <p:nvPr/>
+          </p:nvSpPr>
+          <p:spPr>
+            <a:xfrm>
+              <a:off x="3911698" y="5511394"/>
+              <a:ext cx="1143207" cy="276999"/>
+            </a:xfrm>
+            <a:prstGeom prst="rect">
+              <a:avLst/>
+            </a:prstGeom>
+            <a:noFill/>
+          </p:spPr>
+          <p:txBody>
+            <a:bodyPr wrap="square" rtlCol="0">
+              <a:spAutoFit/>
+            </a:bodyPr>
+            <a:lstStyle/>
+            <a:p>
+              <a:pPr algn="ctr"/>
+              <a:r>
+                <a:rPr lang="de-DE" sz="1200" dirty="0"/>
+                <a:t>Sprachantwort</a:t>
+              </a:r>
+            </a:p>
+          </p:txBody>
+        </p:sp>
+        <p:pic>
+          <p:nvPicPr>
+            <p:cNvPr id="11" name="Grafik 10" descr="Pfeil mit einer Linie: Nach rechts drehen mit einfarbiger Füllung">
+              <a:extLst>
+                <a:ext uri="{FF2B5EF4-FFF2-40B4-BE49-F238E27FC236}">
+                  <a16:creationId xmlns:a16="http://schemas.microsoft.com/office/drawing/2014/main" id="{561E0AB9-C8ED-821E-B1EF-93D8962DC15E}"/>
+                </a:ext>
+              </a:extLst>
+            </p:cNvPr>
+            <p:cNvPicPr>
+              <a:picLocks noChangeAspect="1"/>
+            </p:cNvPicPr>
+            <p:nvPr/>
+          </p:nvPicPr>
+          <p:blipFill>
+            <a:blip r:embed="rId7">
+              <a:extLst>
+                <a:ext uri="{28A0092B-C50C-407E-A947-70E740481C1C}">
+                  <a14:useLocalDpi xmlns:a14="http://schemas.microsoft.com/office/drawing/2010/main" val="0"/>
+                </a:ext>
+                <a:ext uri="{96DAC541-7B7A-43D3-8B79-37D633B846F1}">
+                  <asvg:svgBlip xmlns:asvg="http://schemas.microsoft.com/office/drawing/2016/SVG/main" r:embed="rId8"/>
+                </a:ext>
+              </a:extLst>
+            </a:blip>
+            <a:stretch>
+              <a:fillRect/>
+            </a:stretch>
+          </p:blipFill>
+          <p:spPr>
+            <a:xfrm rot="5400000">
+              <a:off x="7092811" y="5136231"/>
+              <a:ext cx="517703" cy="517703"/>
+            </a:xfrm>
+            <a:prstGeom prst="rect">
+              <a:avLst/>
+            </a:prstGeom>
+          </p:spPr>
+        </p:pic>
+        <p:sp>
+          <p:nvSpPr>
+            <p:cNvPr id="12" name="Textfeld 11">
+              <a:extLst>
+                <a:ext uri="{FF2B5EF4-FFF2-40B4-BE49-F238E27FC236}">
+                  <a16:creationId xmlns:a16="http://schemas.microsoft.com/office/drawing/2014/main" id="{05AD9881-CF75-2D59-9B82-6FE068B35A46}"/>
+                </a:ext>
+              </a:extLst>
+            </p:cNvPr>
+            <p:cNvSpPr txBox="1"/>
+            <p:nvPr/>
+          </p:nvSpPr>
+          <p:spPr>
+            <a:xfrm>
+              <a:off x="7610514" y="5131001"/>
+              <a:ext cx="939800" cy="461665"/>
+            </a:xfrm>
+            <a:prstGeom prst="rect">
+              <a:avLst/>
+            </a:prstGeom>
+            <a:noFill/>
+          </p:spPr>
+          <p:txBody>
+            <a:bodyPr wrap="square" rtlCol="0">
+              <a:spAutoFit/>
+            </a:bodyPr>
+            <a:lstStyle/>
+            <a:p>
+              <a:r>
+                <a:rPr lang="de-DE" sz="1200" dirty="0"/>
+                <a:t>Führt Aktion aus</a:t>
+              </a:r>
+            </a:p>
+          </p:txBody>
+        </p:sp>
+        <p:pic>
+          <p:nvPicPr>
+            <p:cNvPr id="13" name="Grafik 12" descr="Internet der Dinge mit einfarbiger Füllung">
+              <a:extLst>
+                <a:ext uri="{FF2B5EF4-FFF2-40B4-BE49-F238E27FC236}">
+                  <a16:creationId xmlns:a16="http://schemas.microsoft.com/office/drawing/2014/main" id="{FA73789C-4BBF-6B7B-5671-66C1802F8EAF}"/>
+                </a:ext>
+              </a:extLst>
+            </p:cNvPr>
+            <p:cNvPicPr>
+              <a:picLocks noChangeAspect="1"/>
+            </p:cNvPicPr>
+            <p:nvPr/>
+          </p:nvPicPr>
+          <p:blipFill>
+            <a:blip r:embed="rId9">
+              <a:extLst>
+                <a:ext uri="{28A0092B-C50C-407E-A947-70E740481C1C}">
+                  <a14:useLocalDpi xmlns:a14="http://schemas.microsoft.com/office/drawing/2010/main" val="0"/>
+                </a:ext>
+                <a:ext uri="{96DAC541-7B7A-43D3-8B79-37D633B846F1}">
+                  <asvg:svgBlip xmlns:asvg="http://schemas.microsoft.com/office/drawing/2016/SVG/main" r:embed="rId10"/>
+                </a:ext>
+              </a:extLst>
+            </a:blip>
+            <a:stretch>
+              <a:fillRect/>
+            </a:stretch>
+          </p:blipFill>
+          <p:spPr>
+            <a:xfrm>
+              <a:off x="5790105" y="1644691"/>
+              <a:ext cx="914400" cy="914400"/>
+            </a:xfrm>
+            <a:prstGeom prst="rect">
+              <a:avLst/>
+            </a:prstGeom>
+          </p:spPr>
+        </p:pic>
+        <p:sp>
+          <p:nvSpPr>
+            <p:cNvPr id="14" name="Textfeld 13">
+              <a:extLst>
+                <a:ext uri="{FF2B5EF4-FFF2-40B4-BE49-F238E27FC236}">
+                  <a16:creationId xmlns:a16="http://schemas.microsoft.com/office/drawing/2014/main" id="{3B3435DA-3C09-C3CA-0F1F-7733D1B584E2}"/>
+                </a:ext>
+              </a:extLst>
+            </p:cNvPr>
+            <p:cNvSpPr txBox="1"/>
+            <p:nvPr/>
+          </p:nvSpPr>
+          <p:spPr>
+            <a:xfrm>
+              <a:off x="5347027" y="1394465"/>
+              <a:ext cx="1800553" cy="276999"/>
+            </a:xfrm>
+            <a:prstGeom prst="rect">
+              <a:avLst/>
+            </a:prstGeom>
+            <a:noFill/>
+          </p:spPr>
+          <p:txBody>
+            <a:bodyPr wrap="square" rtlCol="0">
+              <a:spAutoFit/>
+            </a:bodyPr>
+            <a:lstStyle/>
+            <a:p>
+              <a:pPr algn="ctr"/>
+              <a:r>
+                <a:rPr lang="de-DE" sz="1200" dirty="0"/>
+                <a:t>Spracherkennungssystem</a:t>
+              </a:r>
+            </a:p>
+          </p:txBody>
+        </p:sp>
+        <p:grpSp>
+          <p:nvGrpSpPr>
+            <p:cNvPr id="15" name="Gruppieren 14">
+              <a:extLst>
+                <a:ext uri="{FF2B5EF4-FFF2-40B4-BE49-F238E27FC236}">
+                  <a16:creationId xmlns:a16="http://schemas.microsoft.com/office/drawing/2014/main" id="{E0080489-3902-7830-69B0-8F7170C00B75}"/>
+                </a:ext>
+              </a:extLst>
+            </p:cNvPr>
+            <p:cNvGrpSpPr/>
+            <p:nvPr/>
+          </p:nvGrpSpPr>
+          <p:grpSpPr>
+            <a:xfrm rot="16200000">
+              <a:off x="5196104" y="3161582"/>
+              <a:ext cx="1188000" cy="376548"/>
+              <a:chOff x="2880053" y="2195689"/>
+              <a:chExt cx="1188000" cy="376548"/>
+            </a:xfrm>
+          </p:grpSpPr>
+          <p:cxnSp>
+            <p:nvCxnSpPr>
+              <p:cNvPr id="19" name="Gerade Verbindung mit Pfeil 18">
+                <a:extLst>
+                  <a:ext uri="{FF2B5EF4-FFF2-40B4-BE49-F238E27FC236}">
+                    <a16:creationId xmlns:a16="http://schemas.microsoft.com/office/drawing/2014/main" id="{6F4987C5-AA83-57CE-372A-73B4B2DA41FC}"/>
+                  </a:ext>
+                </a:extLst>
+              </p:cNvPr>
+              <p:cNvCxnSpPr>
+                <a:cxnSpLocks/>
+              </p:cNvCxnSpPr>
+              <p:nvPr/>
+            </p:nvCxnSpPr>
+            <p:spPr>
+              <a:xfrm>
+                <a:off x="2880053" y="2572237"/>
+                <a:ext cx="1188000" cy="0"/>
+              </a:xfrm>
+              <a:prstGeom prst="straightConnector1">
+                <a:avLst/>
+              </a:prstGeom>
+              <a:ln w="25400">
+                <a:solidFill>
+                  <a:schemeClr val="tx1"/>
+                </a:solidFill>
+                <a:tailEnd type="triangle"/>
+              </a:ln>
+            </p:spPr>
+            <p:style>
+              <a:lnRef idx="1">
+                <a:schemeClr val="accent1"/>
+              </a:lnRef>
+              <a:fillRef idx="0">
+                <a:schemeClr val="accent1"/>
+              </a:fillRef>
+              <a:effectRef idx="0">
+                <a:schemeClr val="accent1"/>
+              </a:effectRef>
+              <a:fontRef idx="minor">
+                <a:schemeClr val="tx1"/>
+              </a:fontRef>
+            </p:style>
+          </p:cxnSp>
+          <p:sp>
+            <p:nvSpPr>
+              <p:cNvPr id="20" name="Textfeld 19">
+                <a:extLst>
+                  <a:ext uri="{FF2B5EF4-FFF2-40B4-BE49-F238E27FC236}">
+                    <a16:creationId xmlns:a16="http://schemas.microsoft.com/office/drawing/2014/main" id="{8B2E280D-94D7-E4C3-EEF4-0EAB00E3D45C}"/>
+                  </a:ext>
+                </a:extLst>
+              </p:cNvPr>
+              <p:cNvSpPr txBox="1"/>
+              <p:nvPr/>
+            </p:nvSpPr>
+            <p:spPr>
+              <a:xfrm>
+                <a:off x="2924845" y="2195689"/>
+                <a:ext cx="1028700" cy="276999"/>
+              </a:xfrm>
+              <a:prstGeom prst="rect">
+                <a:avLst/>
+              </a:prstGeom>
+              <a:noFill/>
+            </p:spPr>
+            <p:txBody>
+              <a:bodyPr wrap="square" rtlCol="0">
+                <a:spAutoFit/>
+              </a:bodyPr>
+              <a:lstStyle/>
+              <a:p>
+                <a:pPr algn="ctr"/>
+                <a:r>
+                  <a:rPr lang="de-DE" sz="1200" dirty="0"/>
+                  <a:t>Sprachbefehl</a:t>
+                </a:r>
+              </a:p>
+            </p:txBody>
+          </p:sp>
+        </p:grpSp>
+        <p:grpSp>
+          <p:nvGrpSpPr>
+            <p:cNvPr id="16" name="Gruppieren 15">
+              <a:extLst>
+                <a:ext uri="{FF2B5EF4-FFF2-40B4-BE49-F238E27FC236}">
+                  <a16:creationId xmlns:a16="http://schemas.microsoft.com/office/drawing/2014/main" id="{B1C75005-B2D4-4254-8FB9-BBB7654FF558}"/>
+                </a:ext>
+              </a:extLst>
+            </p:cNvPr>
+            <p:cNvGrpSpPr/>
+            <p:nvPr/>
+          </p:nvGrpSpPr>
+          <p:grpSpPr>
+            <a:xfrm rot="5400000">
+              <a:off x="6063982" y="3150273"/>
+              <a:ext cx="1188000" cy="468881"/>
+              <a:chOff x="5191453" y="2024177"/>
+              <a:chExt cx="1188000" cy="468881"/>
+            </a:xfrm>
+          </p:grpSpPr>
+          <p:cxnSp>
+            <p:nvCxnSpPr>
+              <p:cNvPr id="17" name="Gerade Verbindung mit Pfeil 16">
+                <a:extLst>
+                  <a:ext uri="{FF2B5EF4-FFF2-40B4-BE49-F238E27FC236}">
+                    <a16:creationId xmlns:a16="http://schemas.microsoft.com/office/drawing/2014/main" id="{B82620B8-A8C6-70E5-48A5-15F1A63E9F31}"/>
+                  </a:ext>
+                </a:extLst>
+              </p:cNvPr>
+              <p:cNvCxnSpPr>
+                <a:cxnSpLocks/>
+              </p:cNvCxnSpPr>
+              <p:nvPr/>
+            </p:nvCxnSpPr>
+            <p:spPr>
+              <a:xfrm>
+                <a:off x="5191453" y="2493058"/>
+                <a:ext cx="1188000" cy="0"/>
+              </a:xfrm>
+              <a:prstGeom prst="straightConnector1">
+                <a:avLst/>
+              </a:prstGeom>
+              <a:ln w="25400">
+                <a:solidFill>
+                  <a:schemeClr val="tx1"/>
+                </a:solidFill>
+                <a:tailEnd type="triangle"/>
+              </a:ln>
+            </p:spPr>
+            <p:style>
+              <a:lnRef idx="1">
+                <a:schemeClr val="accent1"/>
+              </a:lnRef>
+              <a:fillRef idx="0">
+                <a:schemeClr val="accent1"/>
+              </a:fillRef>
+              <a:effectRef idx="0">
+                <a:schemeClr val="accent1"/>
+              </a:effectRef>
+              <a:fontRef idx="minor">
+                <a:schemeClr val="tx1"/>
+              </a:fontRef>
+            </p:style>
+          </p:cxnSp>
+          <p:sp>
+            <p:nvSpPr>
+              <p:cNvPr id="18" name="Textfeld 17">
+                <a:extLst>
+                  <a:ext uri="{FF2B5EF4-FFF2-40B4-BE49-F238E27FC236}">
+                    <a16:creationId xmlns:a16="http://schemas.microsoft.com/office/drawing/2014/main" id="{7D30009B-68A3-B976-83A3-7DCA1B7CAE1E}"/>
+                  </a:ext>
+                </a:extLst>
+              </p:cNvPr>
+              <p:cNvSpPr txBox="1"/>
+              <p:nvPr/>
+            </p:nvSpPr>
+            <p:spPr>
+              <a:xfrm>
+                <a:off x="5236246" y="2024177"/>
+                <a:ext cx="1028700" cy="461665"/>
+              </a:xfrm>
+              <a:prstGeom prst="rect">
+                <a:avLst/>
+              </a:prstGeom>
+              <a:noFill/>
+            </p:spPr>
+            <p:txBody>
+              <a:bodyPr wrap="square" rtlCol="0">
+                <a:spAutoFit/>
+              </a:bodyPr>
+              <a:lstStyle/>
+              <a:p>
+                <a:pPr algn="ctr"/>
+                <a:r>
+                  <a:rPr lang="de-DE" sz="1200" dirty="0"/>
+                  <a:t>Arduino-Befehl</a:t>
+                </a:r>
+              </a:p>
+            </p:txBody>
+          </p:sp>
+        </p:grpSp>
+      </p:grpSp>
+    </p:spTree>
+    <p:extLst>
+      <p:ext uri="{BB962C8B-B14F-4D97-AF65-F5344CB8AC3E}">
+        <p14:creationId xmlns:p14="http://schemas.microsoft.com/office/powerpoint/2010/main" val="4116696478"/>
+      </p:ext>
+    </p:extLst>
+  </p:cSld>
+  <p:clrMapOvr>
+    <a:masterClrMapping/>
+  </p:clrMapOvr>
+</p:sld>
+</file>
+
+<file path=ppt/slides/slide5.xml><?xml version="1.0" encoding="utf-8"?>
 <p:sld xmlns:a="http://schemas.openxmlformats.org/drawingml/2006/main" xmlns:r="http://schemas.openxmlformats.org/officeDocument/2006/relationships" xmlns:p="http://schemas.openxmlformats.org/presentationml/2006/main">
   <p:cSld>
     <p:spTree>

</xml_diff>

<commit_message>
Fixed including graphic - do not use JPEG!
</commit_message>
<xml_diff>
--- a/Konzept_Diagramme/Diagramme.pptx
+++ b/Konzept_Diagramme/Diagramme.pptx
@@ -140,7 +140,7 @@
   <pc:docChgLst>
     <pc:chgData name="Felix Gervasi" userId="af4e32ee5822202e" providerId="LiveId" clId="{10BBE1F0-7463-48C6-86DF-5387D97B13FC}"/>
     <pc:docChg chg="undo custSel addSld modSld">
-      <pc:chgData name="Felix Gervasi" userId="af4e32ee5822202e" providerId="LiveId" clId="{10BBE1F0-7463-48C6-86DF-5387D97B13FC}" dt="2022-11-11T14:02:21.306" v="2266" actId="1076"/>
+      <pc:chgData name="Felix Gervasi" userId="af4e32ee5822202e" providerId="LiveId" clId="{10BBE1F0-7463-48C6-86DF-5387D97B13FC}" dt="2022-11-12T14:33:38.502" v="2293" actId="113"/>
       <pc:docMkLst>
         <pc:docMk/>
       </pc:docMkLst>
@@ -1117,7 +1117,7 @@
         </pc:cxnChg>
       </pc:sldChg>
       <pc:sldChg chg="addSp delSp modSp new mod">
-        <pc:chgData name="Felix Gervasi" userId="af4e32ee5822202e" providerId="LiveId" clId="{10BBE1F0-7463-48C6-86DF-5387D97B13FC}" dt="2022-11-11T14:02:21.306" v="2266" actId="1076"/>
+        <pc:chgData name="Felix Gervasi" userId="af4e32ee5822202e" providerId="LiveId" clId="{10BBE1F0-7463-48C6-86DF-5387D97B13FC}" dt="2022-11-12T14:33:38.502" v="2293" actId="113"/>
         <pc:sldMkLst>
           <pc:docMk/>
           <pc:sldMk cId="4116696478" sldId="260"/>
@@ -1139,7 +1139,7 @@
           </ac:spMkLst>
         </pc:spChg>
         <pc:spChg chg="mod">
-          <ac:chgData name="Felix Gervasi" userId="af4e32ee5822202e" providerId="LiveId" clId="{10BBE1F0-7463-48C6-86DF-5387D97B13FC}" dt="2022-11-11T14:01:54.833" v="2265"/>
+          <ac:chgData name="Felix Gervasi" userId="af4e32ee5822202e" providerId="LiveId" clId="{10BBE1F0-7463-48C6-86DF-5387D97B13FC}" dt="2022-11-12T14:33:13.003" v="2287" actId="113"/>
           <ac:spMkLst>
             <pc:docMk/>
             <pc:sldMk cId="4116696478" sldId="260"/>
@@ -1147,7 +1147,7 @@
           </ac:spMkLst>
         </pc:spChg>
         <pc:spChg chg="mod">
-          <ac:chgData name="Felix Gervasi" userId="af4e32ee5822202e" providerId="LiveId" clId="{10BBE1F0-7463-48C6-86DF-5387D97B13FC}" dt="2022-11-11T14:01:54.833" v="2265"/>
+          <ac:chgData name="Felix Gervasi" userId="af4e32ee5822202e" providerId="LiveId" clId="{10BBE1F0-7463-48C6-86DF-5387D97B13FC}" dt="2022-11-12T14:33:38.502" v="2293" actId="113"/>
           <ac:spMkLst>
             <pc:docMk/>
             <pc:sldMk cId="4116696478" sldId="260"/>
@@ -1155,7 +1155,7 @@
           </ac:spMkLst>
         </pc:spChg>
         <pc:spChg chg="mod">
-          <ac:chgData name="Felix Gervasi" userId="af4e32ee5822202e" providerId="LiveId" clId="{10BBE1F0-7463-48C6-86DF-5387D97B13FC}" dt="2022-11-11T14:01:54.833" v="2265"/>
+          <ac:chgData name="Felix Gervasi" userId="af4e32ee5822202e" providerId="LiveId" clId="{10BBE1F0-7463-48C6-86DF-5387D97B13FC}" dt="2022-11-12T14:33:20.969" v="2289" actId="113"/>
           <ac:spMkLst>
             <pc:docMk/>
             <pc:sldMk cId="4116696478" sldId="260"/>
@@ -1163,7 +1163,7 @@
           </ac:spMkLst>
         </pc:spChg>
         <pc:spChg chg="mod">
-          <ac:chgData name="Felix Gervasi" userId="af4e32ee5822202e" providerId="LiveId" clId="{10BBE1F0-7463-48C6-86DF-5387D97B13FC}" dt="2022-11-11T14:01:54.833" v="2265"/>
+          <ac:chgData name="Felix Gervasi" userId="af4e32ee5822202e" providerId="LiveId" clId="{10BBE1F0-7463-48C6-86DF-5387D97B13FC}" dt="2022-11-12T14:33:06.924" v="2286" actId="113"/>
           <ac:spMkLst>
             <pc:docMk/>
             <pc:sldMk cId="4116696478" sldId="260"/>
@@ -1171,7 +1171,7 @@
           </ac:spMkLst>
         </pc:spChg>
         <pc:spChg chg="mod">
-          <ac:chgData name="Felix Gervasi" userId="af4e32ee5822202e" providerId="LiveId" clId="{10BBE1F0-7463-48C6-86DF-5387D97B13FC}" dt="2022-11-11T14:01:54.833" v="2265"/>
+          <ac:chgData name="Felix Gervasi" userId="af4e32ee5822202e" providerId="LiveId" clId="{10BBE1F0-7463-48C6-86DF-5387D97B13FC}" dt="2022-11-12T14:33:30.748" v="2292" actId="113"/>
           <ac:spMkLst>
             <pc:docMk/>
             <pc:sldMk cId="4116696478" sldId="260"/>
@@ -1179,7 +1179,7 @@
           </ac:spMkLst>
         </pc:spChg>
         <pc:spChg chg="mod">
-          <ac:chgData name="Felix Gervasi" userId="af4e32ee5822202e" providerId="LiveId" clId="{10BBE1F0-7463-48C6-86DF-5387D97B13FC}" dt="2022-11-11T14:01:54.833" v="2265"/>
+          <ac:chgData name="Felix Gervasi" userId="af4e32ee5822202e" providerId="LiveId" clId="{10BBE1F0-7463-48C6-86DF-5387D97B13FC}" dt="2022-11-12T14:33:28.411" v="2291" actId="113"/>
           <ac:spMkLst>
             <pc:docMk/>
             <pc:sldMk cId="4116696478" sldId="260"/>
@@ -1187,7 +1187,7 @@
           </ac:spMkLst>
         </pc:spChg>
         <pc:spChg chg="mod">
-          <ac:chgData name="Felix Gervasi" userId="af4e32ee5822202e" providerId="LiveId" clId="{10BBE1F0-7463-48C6-86DF-5387D97B13FC}" dt="2022-11-11T14:01:54.833" v="2265"/>
+          <ac:chgData name="Felix Gervasi" userId="af4e32ee5822202e" providerId="LiveId" clId="{10BBE1F0-7463-48C6-86DF-5387D97B13FC}" dt="2022-11-12T14:33:25.687" v="2290" actId="113"/>
           <ac:spMkLst>
             <pc:docMk/>
             <pc:sldMk cId="4116696478" sldId="260"/>
@@ -1195,7 +1195,7 @@
           </ac:spMkLst>
         </pc:spChg>
         <pc:spChg chg="mod">
-          <ac:chgData name="Felix Gervasi" userId="af4e32ee5822202e" providerId="LiveId" clId="{10BBE1F0-7463-48C6-86DF-5387D97B13FC}" dt="2022-11-11T14:01:54.833" v="2265"/>
+          <ac:chgData name="Felix Gervasi" userId="af4e32ee5822202e" providerId="LiveId" clId="{10BBE1F0-7463-48C6-86DF-5387D97B13FC}" dt="2022-11-12T14:33:15.569" v="2288" actId="113"/>
           <ac:spMkLst>
             <pc:docMk/>
             <pc:sldMk cId="4116696478" sldId="260"/>
@@ -1203,7 +1203,7 @@
           </ac:spMkLst>
         </pc:spChg>
         <pc:grpChg chg="add mod">
-          <ac:chgData name="Felix Gervasi" userId="af4e32ee5822202e" providerId="LiveId" clId="{10BBE1F0-7463-48C6-86DF-5387D97B13FC}" dt="2022-11-11T14:02:21.306" v="2266" actId="1076"/>
+          <ac:chgData name="Felix Gervasi" userId="af4e32ee5822202e" providerId="LiveId" clId="{10BBE1F0-7463-48C6-86DF-5387D97B13FC}" dt="2022-11-12T14:31:46.160" v="2285" actId="1076"/>
           <ac:grpSpMkLst>
             <pc:docMk/>
             <pc:sldMk cId="4116696478" sldId="260"/>
@@ -1467,7 +1467,7 @@
           <a:p>
             <a:fld id="{DED31D0E-D858-474B-B44B-3BC714FC9DF3}" type="datetimeFigureOut">
               <a:rPr lang="de-DE" smtClean="0"/>
-              <a:t>11.11.2022</a:t>
+              <a:t>12.11.2022</a:t>
             </a:fld>
             <a:endParaRPr lang="de-DE"/>
           </a:p>
@@ -1665,7 +1665,7 @@
           <a:p>
             <a:fld id="{DED31D0E-D858-474B-B44B-3BC714FC9DF3}" type="datetimeFigureOut">
               <a:rPr lang="de-DE" smtClean="0"/>
-              <a:t>11.11.2022</a:t>
+              <a:t>12.11.2022</a:t>
             </a:fld>
             <a:endParaRPr lang="de-DE"/>
           </a:p>
@@ -1873,7 +1873,7 @@
           <a:p>
             <a:fld id="{DED31D0E-D858-474B-B44B-3BC714FC9DF3}" type="datetimeFigureOut">
               <a:rPr lang="de-DE" smtClean="0"/>
-              <a:t>11.11.2022</a:t>
+              <a:t>12.11.2022</a:t>
             </a:fld>
             <a:endParaRPr lang="de-DE"/>
           </a:p>
@@ -2071,7 +2071,7 @@
           <a:p>
             <a:fld id="{DED31D0E-D858-474B-B44B-3BC714FC9DF3}" type="datetimeFigureOut">
               <a:rPr lang="de-DE" smtClean="0"/>
-              <a:t>11.11.2022</a:t>
+              <a:t>12.11.2022</a:t>
             </a:fld>
             <a:endParaRPr lang="de-DE"/>
           </a:p>
@@ -2346,7 +2346,7 @@
           <a:p>
             <a:fld id="{DED31D0E-D858-474B-B44B-3BC714FC9DF3}" type="datetimeFigureOut">
               <a:rPr lang="de-DE" smtClean="0"/>
-              <a:t>11.11.2022</a:t>
+              <a:t>12.11.2022</a:t>
             </a:fld>
             <a:endParaRPr lang="de-DE"/>
           </a:p>
@@ -2611,7 +2611,7 @@
           <a:p>
             <a:fld id="{DED31D0E-D858-474B-B44B-3BC714FC9DF3}" type="datetimeFigureOut">
               <a:rPr lang="de-DE" smtClean="0"/>
-              <a:t>11.11.2022</a:t>
+              <a:t>12.11.2022</a:t>
             </a:fld>
             <a:endParaRPr lang="de-DE"/>
           </a:p>
@@ -3023,7 +3023,7 @@
           <a:p>
             <a:fld id="{DED31D0E-D858-474B-B44B-3BC714FC9DF3}" type="datetimeFigureOut">
               <a:rPr lang="de-DE" smtClean="0"/>
-              <a:t>11.11.2022</a:t>
+              <a:t>12.11.2022</a:t>
             </a:fld>
             <a:endParaRPr lang="de-DE"/>
           </a:p>
@@ -3164,7 +3164,7 @@
           <a:p>
             <a:fld id="{DED31D0E-D858-474B-B44B-3BC714FC9DF3}" type="datetimeFigureOut">
               <a:rPr lang="de-DE" smtClean="0"/>
-              <a:t>11.11.2022</a:t>
+              <a:t>12.11.2022</a:t>
             </a:fld>
             <a:endParaRPr lang="de-DE"/>
           </a:p>
@@ -3277,7 +3277,7 @@
           <a:p>
             <a:fld id="{DED31D0E-D858-474B-B44B-3BC714FC9DF3}" type="datetimeFigureOut">
               <a:rPr lang="de-DE" smtClean="0"/>
-              <a:t>11.11.2022</a:t>
+              <a:t>12.11.2022</a:t>
             </a:fld>
             <a:endParaRPr lang="de-DE"/>
           </a:p>
@@ -3588,7 +3588,7 @@
           <a:p>
             <a:fld id="{DED31D0E-D858-474B-B44B-3BC714FC9DF3}" type="datetimeFigureOut">
               <a:rPr lang="de-DE" smtClean="0"/>
-              <a:t>11.11.2022</a:t>
+              <a:t>12.11.2022</a:t>
             </a:fld>
             <a:endParaRPr lang="de-DE"/>
           </a:p>
@@ -3876,7 +3876,7 @@
           <a:p>
             <a:fld id="{DED31D0E-D858-474B-B44B-3BC714FC9DF3}" type="datetimeFigureOut">
               <a:rPr lang="de-DE" smtClean="0"/>
-              <a:t>11.11.2022</a:t>
+              <a:t>12.11.2022</a:t>
             </a:fld>
             <a:endParaRPr lang="de-DE"/>
           </a:p>
@@ -4117,7 +4117,7 @@
           <a:p>
             <a:fld id="{DED31D0E-D858-474B-B44B-3BC714FC9DF3}" type="datetimeFigureOut">
               <a:rPr lang="de-DE" smtClean="0"/>
-              <a:t>11.11.2022</a:t>
+              <a:t>12.11.2022</a:t>
             </a:fld>
             <a:endParaRPr lang="de-DE"/>
           </a:p>
@@ -7568,8 +7568,8 @@
         </p:nvGrpSpPr>
         <p:grpSpPr>
           <a:xfrm>
-            <a:off x="3049964" y="1126106"/>
-            <a:ext cx="6092072" cy="4605787"/>
+            <a:off x="2243912" y="389118"/>
+            <a:ext cx="7704176" cy="6079764"/>
             <a:chOff x="2458242" y="1394465"/>
             <a:chExt cx="6092072" cy="4605787"/>
           </a:xfrm>
@@ -7687,7 +7687,7 @@
             <p:spPr>
               <a:xfrm>
                 <a:off x="930887" y="4079009"/>
-                <a:ext cx="850900" cy="276999"/>
+                <a:ext cx="850900" cy="256475"/>
               </a:xfrm>
               <a:prstGeom prst="rect">
                 <a:avLst/>
@@ -7702,7 +7702,7 @@
               <a:p>
                 <a:pPr algn="ctr"/>
                 <a:r>
-                  <a:rPr lang="de-DE" sz="1200" dirty="0"/>
+                  <a:rPr lang="de-DE" sz="1600" b="1" dirty="0"/>
                   <a:t>Benutzer</a:t>
                 </a:r>
               </a:p>
@@ -7773,8 +7773,8 @@
             </p:nvSpPr>
             <p:spPr>
               <a:xfrm>
-                <a:off x="4348811" y="1565694"/>
-                <a:ext cx="1079500" cy="461665"/>
+                <a:off x="4348810" y="1565694"/>
+                <a:ext cx="1215795" cy="443002"/>
               </a:xfrm>
               <a:prstGeom prst="rect">
                 <a:avLst/>
@@ -7789,7 +7789,7 @@
               <a:p>
                 <a:pPr algn="ctr"/>
                 <a:r>
-                  <a:rPr lang="de-DE" sz="1200" dirty="0"/>
+                  <a:rPr lang="de-DE" sz="1600" b="1" dirty="0"/>
                   <a:t>Arduino mit Sprach-Modul</a:t>
                 </a:r>
               </a:p>
@@ -7898,8 +7898,8 @@
           </p:nvSpPr>
           <p:spPr>
             <a:xfrm>
-              <a:off x="3940293" y="4732942"/>
-              <a:ext cx="1028700" cy="276999"/>
+              <a:off x="3940292" y="4732942"/>
+              <a:ext cx="1114613" cy="256475"/>
             </a:xfrm>
             <a:prstGeom prst="rect">
               <a:avLst/>
@@ -7914,7 +7914,7 @@
             <a:p>
               <a:pPr algn="ctr"/>
               <a:r>
-                <a:rPr lang="de-DE" sz="1200" dirty="0"/>
+                <a:rPr lang="de-DE" sz="1600" b="1" dirty="0"/>
                 <a:t>Sprachbefehl</a:t>
               </a:r>
             </a:p>
@@ -7935,7 +7935,7 @@
           <p:spPr>
             <a:xfrm>
               <a:off x="3911698" y="5511394"/>
-              <a:ext cx="1143207" cy="276999"/>
+              <a:ext cx="1206727" cy="256475"/>
             </a:xfrm>
             <a:prstGeom prst="rect">
               <a:avLst/>
@@ -7950,7 +7950,7 @@
             <a:p>
               <a:pPr algn="ctr"/>
               <a:r>
-                <a:rPr lang="de-DE" sz="1200" dirty="0"/>
+                <a:rPr lang="de-DE" sz="1600" b="1" dirty="0"/>
                 <a:t>Sprachantwort</a:t>
               </a:r>
             </a:p>
@@ -8010,7 +8010,7 @@
           <p:spPr>
             <a:xfrm>
               <a:off x="7610514" y="5131001"/>
-              <a:ext cx="939800" cy="461665"/>
+              <a:ext cx="939800" cy="443002"/>
             </a:xfrm>
             <a:prstGeom prst="rect">
               <a:avLst/>
@@ -8024,8 +8024,24 @@
             <a:lstStyle/>
             <a:p>
               <a:r>
-                <a:rPr lang="de-DE" sz="1200" dirty="0"/>
-                <a:t>Führt Aktion aus</a:t>
+                <a:rPr lang="de-DE" sz="1600" b="1" dirty="0"/>
+                <a:t>Führt</a:t>
+              </a:r>
+              <a:r>
+                <a:rPr lang="de-DE" sz="1200" b="1" dirty="0"/>
+                <a:t> </a:t>
+              </a:r>
+              <a:r>
+                <a:rPr lang="de-DE" sz="1600" b="1" dirty="0"/>
+                <a:t>Aktion</a:t>
+              </a:r>
+              <a:r>
+                <a:rPr lang="de-DE" sz="1200" b="1" dirty="0"/>
+                <a:t> </a:t>
+              </a:r>
+              <a:r>
+                <a:rPr lang="de-DE" sz="1600" b="1" dirty="0"/>
+                <a:t>aus</a:t>
               </a:r>
             </a:p>
           </p:txBody>
@@ -8084,7 +8100,7 @@
           <p:spPr>
             <a:xfrm>
               <a:off x="5347027" y="1394465"/>
-              <a:ext cx="1800553" cy="276999"/>
+              <a:ext cx="2025204" cy="256475"/>
             </a:xfrm>
             <a:prstGeom prst="rect">
               <a:avLst/>
@@ -8099,7 +8115,7 @@
             <a:p>
               <a:pPr algn="ctr"/>
               <a:r>
-                <a:rPr lang="de-DE" sz="1200" dirty="0"/>
+                <a:rPr lang="de-DE" sz="1600" b="1" dirty="0"/>
                 <a:t>Spracherkennungssystem</a:t>
               </a:r>
             </a:p>
@@ -8119,10 +8135,10 @@
           </p:nvGrpSpPr>
           <p:grpSpPr>
             <a:xfrm rot="16200000">
-              <a:off x="5196104" y="3161582"/>
-              <a:ext cx="1188000" cy="376548"/>
-              <a:chOff x="2880053" y="2195689"/>
-              <a:chExt cx="1188000" cy="376548"/>
+              <a:off x="5198426" y="3163904"/>
+              <a:ext cx="1188000" cy="371905"/>
+              <a:chOff x="2880053" y="2200332"/>
+              <a:chExt cx="1188000" cy="371905"/>
             </a:xfrm>
           </p:grpSpPr>
           <p:cxnSp>
@@ -8183,8 +8199,8 @@
             </p:nvSpPr>
             <p:spPr>
               <a:xfrm>
-                <a:off x="2924845" y="2195689"/>
-                <a:ext cx="1028700" cy="276999"/>
+                <a:off x="2924845" y="2200332"/>
+                <a:ext cx="1108352" cy="267711"/>
               </a:xfrm>
               <a:prstGeom prst="rect">
                 <a:avLst/>
@@ -8199,7 +8215,7 @@
               <a:p>
                 <a:pPr algn="ctr"/>
                 <a:r>
-                  <a:rPr lang="de-DE" sz="1200" dirty="0"/>
+                  <a:rPr lang="de-DE" sz="1600" b="1" dirty="0"/>
                   <a:t>Sprachbefehl</a:t>
                 </a:r>
               </a:p>
@@ -8220,10 +8236,10 @@
           </p:nvGrpSpPr>
           <p:grpSpPr>
             <a:xfrm rot="5400000">
-              <a:off x="6063982" y="3150273"/>
-              <a:ext cx="1188000" cy="468881"/>
-              <a:chOff x="5191453" y="2024177"/>
-              <a:chExt cx="1188000" cy="468881"/>
+              <a:off x="6064169" y="3150087"/>
+              <a:ext cx="1188000" cy="469254"/>
+              <a:chOff x="5191453" y="2023804"/>
+              <a:chExt cx="1188000" cy="469254"/>
             </a:xfrm>
           </p:grpSpPr>
           <p:cxnSp>
@@ -8284,8 +8300,8 @@
             </p:nvSpPr>
             <p:spPr>
               <a:xfrm>
-                <a:off x="5236246" y="2024177"/>
-                <a:ext cx="1028700" cy="461665"/>
+                <a:off x="5236246" y="2023804"/>
+                <a:ext cx="1028700" cy="462411"/>
               </a:xfrm>
               <a:prstGeom prst="rect">
                 <a:avLst/>
@@ -8300,7 +8316,7 @@
               <a:p>
                 <a:pPr algn="ctr"/>
                 <a:r>
-                  <a:rPr lang="de-DE" sz="1200" dirty="0"/>
+                  <a:rPr lang="de-DE" sz="1600" b="1" dirty="0"/>
                   <a:t>Arduino-Befehl</a:t>
                 </a:r>
               </a:p>

</xml_diff>

<commit_message>
Continued working on chapter 'Konzept'
</commit_message>
<xml_diff>
--- a/Konzept_Diagramme/Diagramme.pptx
+++ b/Konzept_Diagramme/Diagramme.pptx
@@ -7,9 +7,10 @@
   <p:sldIdLst>
     <p:sldId id="256" r:id="rId2"/>
     <p:sldId id="259" r:id="rId3"/>
-    <p:sldId id="257" r:id="rId4"/>
-    <p:sldId id="260" r:id="rId5"/>
-    <p:sldId id="258" r:id="rId6"/>
+    <p:sldId id="261" r:id="rId4"/>
+    <p:sldId id="257" r:id="rId5"/>
+    <p:sldId id="260" r:id="rId6"/>
+    <p:sldId id="258" r:id="rId7"/>
   </p:sldIdLst>
   <p:sldSz cx="12192000" cy="6858000"/>
   <p:notesSz cx="6858000" cy="9144000"/>
@@ -139,8 +140,8 @@
 <pc:chgInfo xmlns:a="http://schemas.openxmlformats.org/drawingml/2006/main" xmlns:r="http://schemas.openxmlformats.org/officeDocument/2006/relationships" xmlns:ac="http://schemas.microsoft.com/office/drawing/2013/main/command" xmlns:pc="http://schemas.microsoft.com/office/powerpoint/2013/main/command">
   <pc:docChgLst>
     <pc:chgData name="Felix Gervasi" userId="af4e32ee5822202e" providerId="LiveId" clId="{10BBE1F0-7463-48C6-86DF-5387D97B13FC}"/>
-    <pc:docChg chg="undo custSel addSld modSld">
-      <pc:chgData name="Felix Gervasi" userId="af4e32ee5822202e" providerId="LiveId" clId="{10BBE1F0-7463-48C6-86DF-5387D97B13FC}" dt="2022-11-12T14:33:38.502" v="2293" actId="113"/>
+    <pc:docChg chg="undo custSel addSld delSld modSld">
+      <pc:chgData name="Felix Gervasi" userId="af4e32ee5822202e" providerId="LiveId" clId="{10BBE1F0-7463-48C6-86DF-5387D97B13FC}" dt="2022-11-13T13:43:04.589" v="2335" actId="1076"/>
       <pc:docMkLst>
         <pc:docMk/>
       </pc:docMkLst>
@@ -1314,6 +1315,108 @@
             <ac:cxnSpMk id="19" creationId="{6F4987C5-AA83-57CE-372A-73B4B2DA41FC}"/>
           </ac:cxnSpMkLst>
         </pc:cxnChg>
+      </pc:sldChg>
+      <pc:sldChg chg="modSp add mod">
+        <pc:chgData name="Felix Gervasi" userId="af4e32ee5822202e" providerId="LiveId" clId="{10BBE1F0-7463-48C6-86DF-5387D97B13FC}" dt="2022-11-13T13:43:04.589" v="2335" actId="1076"/>
+        <pc:sldMkLst>
+          <pc:docMk/>
+          <pc:sldMk cId="3186026469" sldId="261"/>
+        </pc:sldMkLst>
+        <pc:spChg chg="mod">
+          <ac:chgData name="Felix Gervasi" userId="af4e32ee5822202e" providerId="LiveId" clId="{10BBE1F0-7463-48C6-86DF-5387D97B13FC}" dt="2022-11-13T13:39:56.126" v="2304" actId="14100"/>
+          <ac:spMkLst>
+            <pc:docMk/>
+            <pc:sldMk cId="3186026469" sldId="261"/>
+            <ac:spMk id="10" creationId="{DBA1125D-FA2C-C589-3C7A-CE1D90A0F107}"/>
+          </ac:spMkLst>
+        </pc:spChg>
+        <pc:spChg chg="mod">
+          <ac:chgData name="Felix Gervasi" userId="af4e32ee5822202e" providerId="LiveId" clId="{10BBE1F0-7463-48C6-86DF-5387D97B13FC}" dt="2022-11-13T13:40:14.145" v="2308" actId="1076"/>
+          <ac:spMkLst>
+            <pc:docMk/>
+            <pc:sldMk cId="3186026469" sldId="261"/>
+            <ac:spMk id="11" creationId="{F4661640-A5BF-3639-5A79-78DC02DEC2B9}"/>
+          </ac:spMkLst>
+        </pc:spChg>
+        <pc:spChg chg="mod">
+          <ac:chgData name="Felix Gervasi" userId="af4e32ee5822202e" providerId="LiveId" clId="{10BBE1F0-7463-48C6-86DF-5387D97B13FC}" dt="2022-11-13T13:42:50.155" v="2334" actId="1076"/>
+          <ac:spMkLst>
+            <pc:docMk/>
+            <pc:sldMk cId="3186026469" sldId="261"/>
+            <ac:spMk id="13" creationId="{ABB1C764-12F7-C192-946E-A2B09A749510}"/>
+          </ac:spMkLst>
+        </pc:spChg>
+        <pc:spChg chg="mod">
+          <ac:chgData name="Felix Gervasi" userId="af4e32ee5822202e" providerId="LiveId" clId="{10BBE1F0-7463-48C6-86DF-5387D97B13FC}" dt="2022-11-13T13:41:03.614" v="2317" actId="1076"/>
+          <ac:spMkLst>
+            <pc:docMk/>
+            <pc:sldMk cId="3186026469" sldId="261"/>
+            <ac:spMk id="15" creationId="{7FB4C3D2-09CA-DBA0-9FD3-48CD82871F64}"/>
+          </ac:spMkLst>
+        </pc:spChg>
+        <pc:spChg chg="mod">
+          <ac:chgData name="Felix Gervasi" userId="af4e32ee5822202e" providerId="LiveId" clId="{10BBE1F0-7463-48C6-86DF-5387D97B13FC}" dt="2022-11-13T13:42:14.959" v="2330" actId="1076"/>
+          <ac:spMkLst>
+            <pc:docMk/>
+            <pc:sldMk cId="3186026469" sldId="261"/>
+            <ac:spMk id="17" creationId="{A16F08F9-5985-6981-BF70-8C20C8054404}"/>
+          </ac:spMkLst>
+        </pc:spChg>
+        <pc:spChg chg="mod">
+          <ac:chgData name="Felix Gervasi" userId="af4e32ee5822202e" providerId="LiveId" clId="{10BBE1F0-7463-48C6-86DF-5387D97B13FC}" dt="2022-11-13T13:41:49.290" v="2327" actId="255"/>
+          <ac:spMkLst>
+            <pc:docMk/>
+            <pc:sldMk cId="3186026469" sldId="261"/>
+            <ac:spMk id="21" creationId="{7A91938F-772D-A3E1-7FE7-5556C8FA7D29}"/>
+          </ac:spMkLst>
+        </pc:spChg>
+        <pc:spChg chg="mod">
+          <ac:chgData name="Felix Gervasi" userId="af4e32ee5822202e" providerId="LiveId" clId="{10BBE1F0-7463-48C6-86DF-5387D97B13FC}" dt="2022-11-13T13:41:36.403" v="2325" actId="1076"/>
+          <ac:spMkLst>
+            <pc:docMk/>
+            <pc:sldMk cId="3186026469" sldId="261"/>
+            <ac:spMk id="23" creationId="{6B680194-A658-BA0A-321F-2B2B81A386B8}"/>
+          </ac:spMkLst>
+        </pc:spChg>
+        <pc:spChg chg="mod">
+          <ac:chgData name="Felix Gervasi" userId="af4e32ee5822202e" providerId="LiveId" clId="{10BBE1F0-7463-48C6-86DF-5387D97B13FC}" dt="2022-11-13T13:40:49.098" v="2314" actId="113"/>
+          <ac:spMkLst>
+            <pc:docMk/>
+            <pc:sldMk cId="3186026469" sldId="261"/>
+            <ac:spMk id="25" creationId="{21607E5F-3CB1-0738-038A-0C387A115A0E}"/>
+          </ac:spMkLst>
+        </pc:spChg>
+        <pc:spChg chg="mod">
+          <ac:chgData name="Felix Gervasi" userId="af4e32ee5822202e" providerId="LiveId" clId="{10BBE1F0-7463-48C6-86DF-5387D97B13FC}" dt="2022-11-13T13:40:23.016" v="2311" actId="14100"/>
+          <ac:spMkLst>
+            <pc:docMk/>
+            <pc:sldMk cId="3186026469" sldId="261"/>
+            <ac:spMk id="28" creationId="{6A1D04C4-E2CD-E7BF-BAA0-9CCD9B0C747F}"/>
+          </ac:spMkLst>
+        </pc:spChg>
+        <pc:spChg chg="mod">
+          <ac:chgData name="Felix Gervasi" userId="af4e32ee5822202e" providerId="LiveId" clId="{10BBE1F0-7463-48C6-86DF-5387D97B13FC}" dt="2022-11-13T13:41:20.818" v="2321" actId="1076"/>
+          <ac:spMkLst>
+            <pc:docMk/>
+            <pc:sldMk cId="3186026469" sldId="261"/>
+            <ac:spMk id="30" creationId="{792585DF-67F3-B601-F4DF-C6D55E6520C6}"/>
+          </ac:spMkLst>
+        </pc:spChg>
+        <pc:grpChg chg="mod">
+          <ac:chgData name="Felix Gervasi" userId="af4e32ee5822202e" providerId="LiveId" clId="{10BBE1F0-7463-48C6-86DF-5387D97B13FC}" dt="2022-11-13T13:43:04.589" v="2335" actId="1076"/>
+          <ac:grpSpMkLst>
+            <pc:docMk/>
+            <pc:sldMk cId="3186026469" sldId="261"/>
+            <ac:grpSpMk id="4" creationId="{DA8A29E3-205C-DE07-156F-248BD26E544F}"/>
+          </ac:grpSpMkLst>
+        </pc:grpChg>
+      </pc:sldChg>
+      <pc:sldChg chg="new del">
+        <pc:chgData name="Felix Gervasi" userId="af4e32ee5822202e" providerId="LiveId" clId="{10BBE1F0-7463-48C6-86DF-5387D97B13FC}" dt="2022-11-13T13:39:09.990" v="2295" actId="47"/>
+        <pc:sldMkLst>
+          <pc:docMk/>
+          <pc:sldMk cId="3877197518" sldId="261"/>
+        </pc:sldMkLst>
       </pc:sldChg>
     </pc:docChg>
   </pc:docChgLst>
@@ -1467,7 +1570,7 @@
           <a:p>
             <a:fld id="{DED31D0E-D858-474B-B44B-3BC714FC9DF3}" type="datetimeFigureOut">
               <a:rPr lang="de-DE" smtClean="0"/>
-              <a:t>12.11.2022</a:t>
+              <a:t>13.11.2022</a:t>
             </a:fld>
             <a:endParaRPr lang="de-DE"/>
           </a:p>
@@ -1665,7 +1768,7 @@
           <a:p>
             <a:fld id="{DED31D0E-D858-474B-B44B-3BC714FC9DF3}" type="datetimeFigureOut">
               <a:rPr lang="de-DE" smtClean="0"/>
-              <a:t>12.11.2022</a:t>
+              <a:t>13.11.2022</a:t>
             </a:fld>
             <a:endParaRPr lang="de-DE"/>
           </a:p>
@@ -1873,7 +1976,7 @@
           <a:p>
             <a:fld id="{DED31D0E-D858-474B-B44B-3BC714FC9DF3}" type="datetimeFigureOut">
               <a:rPr lang="de-DE" smtClean="0"/>
-              <a:t>12.11.2022</a:t>
+              <a:t>13.11.2022</a:t>
             </a:fld>
             <a:endParaRPr lang="de-DE"/>
           </a:p>
@@ -2071,7 +2174,7 @@
           <a:p>
             <a:fld id="{DED31D0E-D858-474B-B44B-3BC714FC9DF3}" type="datetimeFigureOut">
               <a:rPr lang="de-DE" smtClean="0"/>
-              <a:t>12.11.2022</a:t>
+              <a:t>13.11.2022</a:t>
             </a:fld>
             <a:endParaRPr lang="de-DE"/>
           </a:p>
@@ -2346,7 +2449,7 @@
           <a:p>
             <a:fld id="{DED31D0E-D858-474B-B44B-3BC714FC9DF3}" type="datetimeFigureOut">
               <a:rPr lang="de-DE" smtClean="0"/>
-              <a:t>12.11.2022</a:t>
+              <a:t>13.11.2022</a:t>
             </a:fld>
             <a:endParaRPr lang="de-DE"/>
           </a:p>
@@ -2611,7 +2714,7 @@
           <a:p>
             <a:fld id="{DED31D0E-D858-474B-B44B-3BC714FC9DF3}" type="datetimeFigureOut">
               <a:rPr lang="de-DE" smtClean="0"/>
-              <a:t>12.11.2022</a:t>
+              <a:t>13.11.2022</a:t>
             </a:fld>
             <a:endParaRPr lang="de-DE"/>
           </a:p>
@@ -3023,7 +3126,7 @@
           <a:p>
             <a:fld id="{DED31D0E-D858-474B-B44B-3BC714FC9DF3}" type="datetimeFigureOut">
               <a:rPr lang="de-DE" smtClean="0"/>
-              <a:t>12.11.2022</a:t>
+              <a:t>13.11.2022</a:t>
             </a:fld>
             <a:endParaRPr lang="de-DE"/>
           </a:p>
@@ -3164,7 +3267,7 @@
           <a:p>
             <a:fld id="{DED31D0E-D858-474B-B44B-3BC714FC9DF3}" type="datetimeFigureOut">
               <a:rPr lang="de-DE" smtClean="0"/>
-              <a:t>12.11.2022</a:t>
+              <a:t>13.11.2022</a:t>
             </a:fld>
             <a:endParaRPr lang="de-DE"/>
           </a:p>
@@ -3277,7 +3380,7 @@
           <a:p>
             <a:fld id="{DED31D0E-D858-474B-B44B-3BC714FC9DF3}" type="datetimeFigureOut">
               <a:rPr lang="de-DE" smtClean="0"/>
-              <a:t>12.11.2022</a:t>
+              <a:t>13.11.2022</a:t>
             </a:fld>
             <a:endParaRPr lang="de-DE"/>
           </a:p>
@@ -3588,7 +3691,7 @@
           <a:p>
             <a:fld id="{DED31D0E-D858-474B-B44B-3BC714FC9DF3}" type="datetimeFigureOut">
               <a:rPr lang="de-DE" smtClean="0"/>
-              <a:t>12.11.2022</a:t>
+              <a:t>13.11.2022</a:t>
             </a:fld>
             <a:endParaRPr lang="de-DE"/>
           </a:p>
@@ -3876,7 +3979,7 @@
           <a:p>
             <a:fld id="{DED31D0E-D858-474B-B44B-3BC714FC9DF3}" type="datetimeFigureOut">
               <a:rPr lang="de-DE" smtClean="0"/>
-              <a:t>12.11.2022</a:t>
+              <a:t>13.11.2022</a:t>
             </a:fld>
             <a:endParaRPr lang="de-DE"/>
           </a:p>
@@ -4117,7 +4220,7 @@
           <a:p>
             <a:fld id="{DED31D0E-D858-474B-B44B-3BC714FC9DF3}" type="datetimeFigureOut">
               <a:rPr lang="de-DE" smtClean="0"/>
-              <a:t>12.11.2022</a:t>
+              <a:t>13.11.2022</a:t>
             </a:fld>
             <a:endParaRPr lang="de-DE"/>
           </a:p>
@@ -6588,6 +6691,966 @@
           <a:chExt cx="0" cy="0"/>
         </a:xfrm>
       </p:grpSpPr>
+      <p:grpSp>
+        <p:nvGrpSpPr>
+          <p:cNvPr id="4" name="Gruppieren 3">
+            <a:extLst>
+              <a:ext uri="{FF2B5EF4-FFF2-40B4-BE49-F238E27FC236}">
+                <a16:creationId xmlns:a16="http://schemas.microsoft.com/office/drawing/2014/main" id="{DA8A29E3-205C-DE07-156F-248BD26E544F}"/>
+              </a:ext>
+            </a:extLst>
+          </p:cNvPr>
+          <p:cNvGrpSpPr/>
+          <p:nvPr/>
+        </p:nvGrpSpPr>
+        <p:grpSpPr>
+          <a:xfrm>
+            <a:off x="1801484" y="1168711"/>
+            <a:ext cx="8589031" cy="4520577"/>
+            <a:chOff x="1874594" y="287451"/>
+            <a:chExt cx="8589031" cy="4520577"/>
+          </a:xfrm>
+        </p:grpSpPr>
+        <p:grpSp>
+          <p:nvGrpSpPr>
+            <p:cNvPr id="5" name="Gruppieren 4">
+              <a:extLst>
+                <a:ext uri="{FF2B5EF4-FFF2-40B4-BE49-F238E27FC236}">
+                  <a16:creationId xmlns:a16="http://schemas.microsoft.com/office/drawing/2014/main" id="{B23C19DB-DDCB-F124-A8A1-73824DA07CD8}"/>
+                </a:ext>
+              </a:extLst>
+            </p:cNvPr>
+            <p:cNvGrpSpPr/>
+            <p:nvPr/>
+          </p:nvGrpSpPr>
+          <p:grpSpPr>
+            <a:xfrm>
+              <a:off x="4333333" y="3000648"/>
+              <a:ext cx="1489099" cy="1461062"/>
+              <a:chOff x="1963024" y="1618701"/>
+              <a:chExt cx="1489099" cy="1461062"/>
+            </a:xfrm>
+          </p:grpSpPr>
+          <p:pic>
+            <p:nvPicPr>
+              <p:cNvPr id="29" name="Grafik 28" descr="Smartphone mit einfarbiger Füllung">
+                <a:extLst>
+                  <a:ext uri="{FF2B5EF4-FFF2-40B4-BE49-F238E27FC236}">
+                    <a16:creationId xmlns:a16="http://schemas.microsoft.com/office/drawing/2014/main" id="{0B9AAB74-4762-1A34-E297-DC26F1B8EF06}"/>
+                  </a:ext>
+                </a:extLst>
+              </p:cNvPr>
+              <p:cNvPicPr>
+                <a:picLocks noChangeAspect="1"/>
+              </p:cNvPicPr>
+              <p:nvPr/>
+            </p:nvPicPr>
+            <p:blipFill>
+              <a:blip r:embed="rId2">
+                <a:extLst>
+                  <a:ext uri="{28A0092B-C50C-407E-A947-70E740481C1C}">
+                    <a14:useLocalDpi xmlns:a14="http://schemas.microsoft.com/office/drawing/2010/main" val="0"/>
+                  </a:ext>
+                  <a:ext uri="{96DAC541-7B7A-43D3-8B79-37D633B846F1}">
+                    <asvg:svgBlip xmlns:asvg="http://schemas.microsoft.com/office/drawing/2016/SVG/main" r:embed="rId3"/>
+                  </a:ext>
+                </a:extLst>
+              </a:blip>
+              <a:stretch>
+                <a:fillRect/>
+              </a:stretch>
+            </p:blipFill>
+            <p:spPr>
+              <a:xfrm>
+                <a:off x="2258572" y="2165363"/>
+                <a:ext cx="914400" cy="914400"/>
+              </a:xfrm>
+              <a:prstGeom prst="rect">
+                <a:avLst/>
+              </a:prstGeom>
+            </p:spPr>
+          </p:pic>
+          <p:sp>
+            <p:nvSpPr>
+              <p:cNvPr id="30" name="Textfeld 29">
+                <a:extLst>
+                  <a:ext uri="{FF2B5EF4-FFF2-40B4-BE49-F238E27FC236}">
+                    <a16:creationId xmlns:a16="http://schemas.microsoft.com/office/drawing/2014/main" id="{792585DF-67F3-B601-F4DF-C6D55E6520C6}"/>
+                  </a:ext>
+                </a:extLst>
+              </p:cNvPr>
+              <p:cNvSpPr txBox="1"/>
+              <p:nvPr/>
+            </p:nvSpPr>
+            <p:spPr>
+              <a:xfrm>
+                <a:off x="1963024" y="1618701"/>
+                <a:ext cx="1489099" cy="584775"/>
+              </a:xfrm>
+              <a:prstGeom prst="rect">
+                <a:avLst/>
+              </a:prstGeom>
+              <a:noFill/>
+            </p:spPr>
+            <p:txBody>
+              <a:bodyPr wrap="square" rtlCol="0">
+                <a:spAutoFit/>
+              </a:bodyPr>
+              <a:lstStyle/>
+              <a:p>
+                <a:pPr algn="ctr"/>
+                <a:r>
+                  <a:rPr lang="de-DE" sz="1600" b="1" dirty="0"/>
+                  <a:t>Mischmaschine-App</a:t>
+                </a:r>
+              </a:p>
+            </p:txBody>
+          </p:sp>
+        </p:grpSp>
+        <p:grpSp>
+          <p:nvGrpSpPr>
+            <p:cNvPr id="6" name="Gruppieren 5">
+              <a:extLst>
+                <a:ext uri="{FF2B5EF4-FFF2-40B4-BE49-F238E27FC236}">
+                  <a16:creationId xmlns:a16="http://schemas.microsoft.com/office/drawing/2014/main" id="{E9C3A834-D3D6-4C6C-A871-21CB19300590}"/>
+                </a:ext>
+              </a:extLst>
+            </p:cNvPr>
+            <p:cNvGrpSpPr/>
+            <p:nvPr/>
+          </p:nvGrpSpPr>
+          <p:grpSpPr>
+            <a:xfrm>
+              <a:off x="1874594" y="3162256"/>
+              <a:ext cx="1248429" cy="1299454"/>
+              <a:chOff x="899137" y="4079009"/>
+              <a:chExt cx="1248429" cy="1299454"/>
+            </a:xfrm>
+          </p:grpSpPr>
+          <p:pic>
+            <p:nvPicPr>
+              <p:cNvPr id="26" name="Grafik 25" descr="Mann mit einfarbiger Füllung">
+                <a:extLst>
+                  <a:ext uri="{FF2B5EF4-FFF2-40B4-BE49-F238E27FC236}">
+                    <a16:creationId xmlns:a16="http://schemas.microsoft.com/office/drawing/2014/main" id="{B2FD4635-CF40-83C1-5B5F-CFCDC02776A9}"/>
+                  </a:ext>
+                </a:extLst>
+              </p:cNvPr>
+              <p:cNvPicPr>
+                <a:picLocks noChangeAspect="1"/>
+              </p:cNvPicPr>
+              <p:nvPr/>
+            </p:nvPicPr>
+            <p:blipFill>
+              <a:blip r:embed="rId4">
+                <a:extLst>
+                  <a:ext uri="{28A0092B-C50C-407E-A947-70E740481C1C}">
+                    <a14:useLocalDpi xmlns:a14="http://schemas.microsoft.com/office/drawing/2010/main" val="0"/>
+                  </a:ext>
+                  <a:ext uri="{96DAC541-7B7A-43D3-8B79-37D633B846F1}">
+                    <asvg:svgBlip xmlns:asvg="http://schemas.microsoft.com/office/drawing/2016/SVG/main" r:embed="rId5"/>
+                  </a:ext>
+                </a:extLst>
+              </a:blip>
+              <a:stretch>
+                <a:fillRect/>
+              </a:stretch>
+            </p:blipFill>
+            <p:spPr>
+              <a:xfrm>
+                <a:off x="899137" y="4464063"/>
+                <a:ext cx="914400" cy="914400"/>
+              </a:xfrm>
+              <a:prstGeom prst="rect">
+                <a:avLst/>
+              </a:prstGeom>
+            </p:spPr>
+          </p:pic>
+          <p:pic>
+            <p:nvPicPr>
+              <p:cNvPr id="27" name="Grafik 26" descr="Megafon1 mit einfarbiger Füllung">
+                <a:extLst>
+                  <a:ext uri="{FF2B5EF4-FFF2-40B4-BE49-F238E27FC236}">
+                    <a16:creationId xmlns:a16="http://schemas.microsoft.com/office/drawing/2014/main" id="{41F971F7-10DE-F0CD-CE01-535E2804C188}"/>
+                  </a:ext>
+                </a:extLst>
+              </p:cNvPr>
+              <p:cNvPicPr>
+                <a:picLocks noChangeAspect="1"/>
+              </p:cNvPicPr>
+              <p:nvPr/>
+            </p:nvPicPr>
+            <p:blipFill>
+              <a:blip r:embed="rId6">
+                <a:extLst>
+                  <a:ext uri="{28A0092B-C50C-407E-A947-70E740481C1C}">
+                    <a14:useLocalDpi xmlns:a14="http://schemas.microsoft.com/office/drawing/2010/main" val="0"/>
+                  </a:ext>
+                  <a:ext uri="{96DAC541-7B7A-43D3-8B79-37D633B846F1}">
+                    <asvg:svgBlip xmlns:asvg="http://schemas.microsoft.com/office/drawing/2016/SVG/main" r:embed="rId7"/>
+                  </a:ext>
+                </a:extLst>
+              </a:blip>
+              <a:stretch>
+                <a:fillRect/>
+              </a:stretch>
+            </p:blipFill>
+            <p:spPr>
+              <a:xfrm rot="1715347">
+                <a:off x="1479505" y="4206233"/>
+                <a:ext cx="668061" cy="668061"/>
+              </a:xfrm>
+              <a:prstGeom prst="rect">
+                <a:avLst/>
+              </a:prstGeom>
+            </p:spPr>
+          </p:pic>
+          <p:sp>
+            <p:nvSpPr>
+              <p:cNvPr id="28" name="Textfeld 27">
+                <a:extLst>
+                  <a:ext uri="{FF2B5EF4-FFF2-40B4-BE49-F238E27FC236}">
+                    <a16:creationId xmlns:a16="http://schemas.microsoft.com/office/drawing/2014/main" id="{6A1D04C4-E2CD-E7BF-BAA0-9CCD9B0C747F}"/>
+                  </a:ext>
+                </a:extLst>
+              </p:cNvPr>
+              <p:cNvSpPr txBox="1"/>
+              <p:nvPr/>
+            </p:nvSpPr>
+            <p:spPr>
+              <a:xfrm>
+                <a:off x="930887" y="4079009"/>
+                <a:ext cx="977900" cy="338554"/>
+              </a:xfrm>
+              <a:prstGeom prst="rect">
+                <a:avLst/>
+              </a:prstGeom>
+              <a:noFill/>
+            </p:spPr>
+            <p:txBody>
+              <a:bodyPr wrap="square" rtlCol="0">
+                <a:spAutoFit/>
+              </a:bodyPr>
+              <a:lstStyle/>
+              <a:p>
+                <a:pPr algn="ctr"/>
+                <a:r>
+                  <a:rPr lang="de-DE" sz="1600" b="1" dirty="0"/>
+                  <a:t>Benutzer</a:t>
+                </a:r>
+              </a:p>
+            </p:txBody>
+          </p:sp>
+        </p:grpSp>
+        <p:grpSp>
+          <p:nvGrpSpPr>
+            <p:cNvPr id="7" name="Gruppieren 6">
+              <a:extLst>
+                <a:ext uri="{FF2B5EF4-FFF2-40B4-BE49-F238E27FC236}">
+                  <a16:creationId xmlns:a16="http://schemas.microsoft.com/office/drawing/2014/main" id="{983ECC27-F410-C99F-C339-E10F62547358}"/>
+                </a:ext>
+              </a:extLst>
+            </p:cNvPr>
+            <p:cNvGrpSpPr/>
+            <p:nvPr/>
+          </p:nvGrpSpPr>
+          <p:grpSpPr>
+            <a:xfrm>
+              <a:off x="7287918" y="2946991"/>
+              <a:ext cx="1840609" cy="1861037"/>
+              <a:chOff x="3968257" y="1565694"/>
+              <a:chExt cx="1840609" cy="1861037"/>
+            </a:xfrm>
+          </p:grpSpPr>
+          <p:pic>
+            <p:nvPicPr>
+              <p:cNvPr id="24" name="Grafik 23">
+                <a:extLst>
+                  <a:ext uri="{FF2B5EF4-FFF2-40B4-BE49-F238E27FC236}">
+                    <a16:creationId xmlns:a16="http://schemas.microsoft.com/office/drawing/2014/main" id="{9661906E-9AC6-2DDF-FE4C-37476F31B83B}"/>
+                  </a:ext>
+                </a:extLst>
+              </p:cNvPr>
+              <p:cNvPicPr>
+                <a:picLocks noChangeAspect="1"/>
+              </p:cNvPicPr>
+              <p:nvPr/>
+            </p:nvPicPr>
+            <p:blipFill>
+              <a:blip r:embed="rId8"/>
+              <a:stretch>
+                <a:fillRect/>
+              </a:stretch>
+            </p:blipFill>
+            <p:spPr>
+              <a:xfrm>
+                <a:off x="3968257" y="2080531"/>
+                <a:ext cx="1840609" cy="1346200"/>
+              </a:xfrm>
+              <a:prstGeom prst="rect">
+                <a:avLst/>
+              </a:prstGeom>
+            </p:spPr>
+          </p:pic>
+          <p:sp>
+            <p:nvSpPr>
+              <p:cNvPr id="25" name="Textfeld 24">
+                <a:extLst>
+                  <a:ext uri="{FF2B5EF4-FFF2-40B4-BE49-F238E27FC236}">
+                    <a16:creationId xmlns:a16="http://schemas.microsoft.com/office/drawing/2014/main" id="{21607E5F-3CB1-0738-038A-0C387A115A0E}"/>
+                  </a:ext>
+                </a:extLst>
+              </p:cNvPr>
+              <p:cNvSpPr txBox="1"/>
+              <p:nvPr/>
+            </p:nvSpPr>
+            <p:spPr>
+              <a:xfrm>
+                <a:off x="4348811" y="1565694"/>
+                <a:ext cx="1365230" cy="584775"/>
+              </a:xfrm>
+              <a:prstGeom prst="rect">
+                <a:avLst/>
+              </a:prstGeom>
+              <a:noFill/>
+            </p:spPr>
+            <p:txBody>
+              <a:bodyPr wrap="square" rtlCol="0">
+                <a:spAutoFit/>
+              </a:bodyPr>
+              <a:lstStyle/>
+              <a:p>
+                <a:pPr algn="ctr"/>
+                <a:r>
+                  <a:rPr lang="de-DE" sz="1600" b="1" dirty="0"/>
+                  <a:t>Arduino mit WLAN-Modul</a:t>
+                </a:r>
+              </a:p>
+            </p:txBody>
+          </p:sp>
+        </p:grpSp>
+        <p:cxnSp>
+          <p:nvCxnSpPr>
+            <p:cNvPr id="8" name="Gerade Verbindung mit Pfeil 7">
+              <a:extLst>
+                <a:ext uri="{FF2B5EF4-FFF2-40B4-BE49-F238E27FC236}">
+                  <a16:creationId xmlns:a16="http://schemas.microsoft.com/office/drawing/2014/main" id="{A094279F-516F-48CA-B540-4471106A7F9E}"/>
+                </a:ext>
+              </a:extLst>
+            </p:cNvPr>
+            <p:cNvCxnSpPr>
+              <a:cxnSpLocks/>
+            </p:cNvCxnSpPr>
+            <p:nvPr/>
+          </p:nvCxnSpPr>
+          <p:spPr>
+            <a:xfrm>
+              <a:off x="3311853" y="3877510"/>
+              <a:ext cx="1188000" cy="0"/>
+            </a:xfrm>
+            <a:prstGeom prst="straightConnector1">
+              <a:avLst/>
+            </a:prstGeom>
+            <a:ln w="25400">
+              <a:solidFill>
+                <a:schemeClr val="tx1"/>
+              </a:solidFill>
+              <a:tailEnd type="triangle"/>
+            </a:ln>
+          </p:spPr>
+          <p:style>
+            <a:lnRef idx="1">
+              <a:schemeClr val="accent1"/>
+            </a:lnRef>
+            <a:fillRef idx="0">
+              <a:schemeClr val="accent1"/>
+            </a:fillRef>
+            <a:effectRef idx="0">
+              <a:schemeClr val="accent1"/>
+            </a:effectRef>
+            <a:fontRef idx="minor">
+              <a:schemeClr val="tx1"/>
+            </a:fontRef>
+          </p:style>
+        </p:cxnSp>
+        <p:cxnSp>
+          <p:nvCxnSpPr>
+            <p:cNvPr id="9" name="Gerade Verbindung mit Pfeil 8">
+              <a:extLst>
+                <a:ext uri="{FF2B5EF4-FFF2-40B4-BE49-F238E27FC236}">
+                  <a16:creationId xmlns:a16="http://schemas.microsoft.com/office/drawing/2014/main" id="{72F07A30-F564-C953-7560-0CA08627029B}"/>
+                </a:ext>
+              </a:extLst>
+            </p:cNvPr>
+            <p:cNvCxnSpPr>
+              <a:cxnSpLocks/>
+            </p:cNvCxnSpPr>
+            <p:nvPr/>
+          </p:nvCxnSpPr>
+          <p:spPr>
+            <a:xfrm flipH="1">
+              <a:off x="3311853" y="4169610"/>
+              <a:ext cx="1188000" cy="0"/>
+            </a:xfrm>
+            <a:prstGeom prst="straightConnector1">
+              <a:avLst/>
+            </a:prstGeom>
+            <a:ln w="25400">
+              <a:solidFill>
+                <a:schemeClr val="tx1"/>
+              </a:solidFill>
+              <a:tailEnd type="triangle"/>
+            </a:ln>
+          </p:spPr>
+          <p:style>
+            <a:lnRef idx="1">
+              <a:schemeClr val="accent1"/>
+            </a:lnRef>
+            <a:fillRef idx="0">
+              <a:schemeClr val="accent1"/>
+            </a:fillRef>
+            <a:effectRef idx="0">
+              <a:schemeClr val="accent1"/>
+            </a:effectRef>
+            <a:fontRef idx="minor">
+              <a:schemeClr val="tx1"/>
+            </a:fontRef>
+          </p:style>
+        </p:cxnSp>
+        <p:sp>
+          <p:nvSpPr>
+            <p:cNvPr id="10" name="Textfeld 9">
+              <a:extLst>
+                <a:ext uri="{FF2B5EF4-FFF2-40B4-BE49-F238E27FC236}">
+                  <a16:creationId xmlns:a16="http://schemas.microsoft.com/office/drawing/2014/main" id="{DBA1125D-FA2C-C589-3C7A-CE1D90A0F107}"/>
+                </a:ext>
+              </a:extLst>
+            </p:cNvPr>
+            <p:cNvSpPr txBox="1"/>
+            <p:nvPr/>
+          </p:nvSpPr>
+          <p:spPr>
+            <a:xfrm>
+              <a:off x="3271831" y="3515730"/>
+              <a:ext cx="1307276" cy="338554"/>
+            </a:xfrm>
+            <a:prstGeom prst="rect">
+              <a:avLst/>
+            </a:prstGeom>
+            <a:noFill/>
+          </p:spPr>
+          <p:txBody>
+            <a:bodyPr wrap="square" rtlCol="0">
+              <a:spAutoFit/>
+            </a:bodyPr>
+            <a:lstStyle/>
+            <a:p>
+              <a:pPr algn="ctr"/>
+              <a:r>
+                <a:rPr lang="de-DE" sz="1600" b="1" dirty="0"/>
+                <a:t>Sprachbefehl</a:t>
+              </a:r>
+            </a:p>
+          </p:txBody>
+        </p:sp>
+        <p:sp>
+          <p:nvSpPr>
+            <p:cNvPr id="11" name="Textfeld 10">
+              <a:extLst>
+                <a:ext uri="{FF2B5EF4-FFF2-40B4-BE49-F238E27FC236}">
+                  <a16:creationId xmlns:a16="http://schemas.microsoft.com/office/drawing/2014/main" id="{F4661640-A5BF-3639-5A79-78DC02DEC2B9}"/>
+                </a:ext>
+              </a:extLst>
+            </p:cNvPr>
+            <p:cNvSpPr txBox="1"/>
+            <p:nvPr/>
+          </p:nvSpPr>
+          <p:spPr>
+            <a:xfrm>
+              <a:off x="3201255" y="4269206"/>
+              <a:ext cx="1489105" cy="338554"/>
+            </a:xfrm>
+            <a:prstGeom prst="rect">
+              <a:avLst/>
+            </a:prstGeom>
+            <a:noFill/>
+          </p:spPr>
+          <p:txBody>
+            <a:bodyPr wrap="square" rtlCol="0">
+              <a:spAutoFit/>
+            </a:bodyPr>
+            <a:lstStyle/>
+            <a:p>
+              <a:pPr algn="ctr"/>
+              <a:r>
+                <a:rPr lang="de-DE" sz="1600" b="1" dirty="0"/>
+                <a:t>Sprachantwort</a:t>
+              </a:r>
+            </a:p>
+          </p:txBody>
+        </p:sp>
+        <p:cxnSp>
+          <p:nvCxnSpPr>
+            <p:cNvPr id="12" name="Gerade Verbindung mit Pfeil 11">
+              <a:extLst>
+                <a:ext uri="{FF2B5EF4-FFF2-40B4-BE49-F238E27FC236}">
+                  <a16:creationId xmlns:a16="http://schemas.microsoft.com/office/drawing/2014/main" id="{C1A71EEF-C467-2EA7-7D46-C8F56BD64A8A}"/>
+                </a:ext>
+              </a:extLst>
+            </p:cNvPr>
+            <p:cNvCxnSpPr>
+              <a:cxnSpLocks/>
+            </p:cNvCxnSpPr>
+            <p:nvPr/>
+          </p:nvCxnSpPr>
+          <p:spPr>
+            <a:xfrm>
+              <a:off x="5634812" y="4219787"/>
+              <a:ext cx="1188000" cy="0"/>
+            </a:xfrm>
+            <a:prstGeom prst="straightConnector1">
+              <a:avLst/>
+            </a:prstGeom>
+            <a:ln w="25400">
+              <a:solidFill>
+                <a:schemeClr val="tx1"/>
+              </a:solidFill>
+              <a:tailEnd type="triangle"/>
+            </a:ln>
+          </p:spPr>
+          <p:style>
+            <a:lnRef idx="1">
+              <a:schemeClr val="accent1"/>
+            </a:lnRef>
+            <a:fillRef idx="0">
+              <a:schemeClr val="accent1"/>
+            </a:fillRef>
+            <a:effectRef idx="0">
+              <a:schemeClr val="accent1"/>
+            </a:effectRef>
+            <a:fontRef idx="minor">
+              <a:schemeClr val="tx1"/>
+            </a:fontRef>
+          </p:style>
+        </p:cxnSp>
+        <p:sp>
+          <p:nvSpPr>
+            <p:cNvPr id="13" name="Textfeld 12">
+              <a:extLst>
+                <a:ext uri="{FF2B5EF4-FFF2-40B4-BE49-F238E27FC236}">
+                  <a16:creationId xmlns:a16="http://schemas.microsoft.com/office/drawing/2014/main" id="{ABB1C764-12F7-C192-946E-A2B09A749510}"/>
+                </a:ext>
+              </a:extLst>
+            </p:cNvPr>
+            <p:cNvSpPr txBox="1"/>
+            <p:nvPr/>
+          </p:nvSpPr>
+          <p:spPr>
+            <a:xfrm>
+              <a:off x="5295567" y="3338613"/>
+              <a:ext cx="1897846" cy="830997"/>
+            </a:xfrm>
+            <a:prstGeom prst="rect">
+              <a:avLst/>
+            </a:prstGeom>
+            <a:noFill/>
+          </p:spPr>
+          <p:txBody>
+            <a:bodyPr wrap="square" rtlCol="0">
+              <a:spAutoFit/>
+            </a:bodyPr>
+            <a:lstStyle/>
+            <a:p>
+              <a:pPr algn="ctr"/>
+              <a:r>
+                <a:rPr lang="de-DE" sz="1600" b="1" dirty="0"/>
+                <a:t>Befehl aus Befehlssatz des Arduino über HTTP</a:t>
+              </a:r>
+            </a:p>
+          </p:txBody>
+        </p:sp>
+        <p:pic>
+          <p:nvPicPr>
+            <p:cNvPr id="14" name="Grafik 13" descr="Pfeil mit einer Linie: Nach rechts drehen mit einfarbiger Füllung">
+              <a:extLst>
+                <a:ext uri="{FF2B5EF4-FFF2-40B4-BE49-F238E27FC236}">
+                  <a16:creationId xmlns:a16="http://schemas.microsoft.com/office/drawing/2014/main" id="{0B39A55C-B874-8A47-2B2A-6007DE8D078C}"/>
+                </a:ext>
+              </a:extLst>
+            </p:cNvPr>
+            <p:cNvPicPr>
+              <a:picLocks noChangeAspect="1"/>
+            </p:cNvPicPr>
+            <p:nvPr/>
+          </p:nvPicPr>
+          <p:blipFill>
+            <a:blip r:embed="rId9">
+              <a:extLst>
+                <a:ext uri="{28A0092B-C50C-407E-A947-70E740481C1C}">
+                  <a14:useLocalDpi xmlns:a14="http://schemas.microsoft.com/office/drawing/2010/main" val="0"/>
+                </a:ext>
+                <a:ext uri="{96DAC541-7B7A-43D3-8B79-37D633B846F1}">
+                  <asvg:svgBlip xmlns:asvg="http://schemas.microsoft.com/office/drawing/2016/SVG/main" r:embed="rId10"/>
+                </a:ext>
+              </a:extLst>
+            </a:blip>
+            <a:stretch>
+              <a:fillRect/>
+            </a:stretch>
+          </p:blipFill>
+          <p:spPr>
+            <a:xfrm rot="5400000">
+              <a:off x="9033702" y="3944007"/>
+              <a:ext cx="517703" cy="517703"/>
+            </a:xfrm>
+            <a:prstGeom prst="rect">
+              <a:avLst/>
+            </a:prstGeom>
+          </p:spPr>
+        </p:pic>
+        <p:sp>
+          <p:nvSpPr>
+            <p:cNvPr id="15" name="Textfeld 14">
+              <a:extLst>
+                <a:ext uri="{FF2B5EF4-FFF2-40B4-BE49-F238E27FC236}">
+                  <a16:creationId xmlns:a16="http://schemas.microsoft.com/office/drawing/2014/main" id="{7FB4C3D2-09CA-DBA0-9FD3-48CD82871F64}"/>
+                </a:ext>
+              </a:extLst>
+            </p:cNvPr>
+            <p:cNvSpPr txBox="1"/>
+            <p:nvPr/>
+          </p:nvSpPr>
+          <p:spPr>
+            <a:xfrm>
+              <a:off x="9523825" y="3804288"/>
+              <a:ext cx="939800" cy="830997"/>
+            </a:xfrm>
+            <a:prstGeom prst="rect">
+              <a:avLst/>
+            </a:prstGeom>
+            <a:noFill/>
+          </p:spPr>
+          <p:txBody>
+            <a:bodyPr wrap="square" rtlCol="0">
+              <a:spAutoFit/>
+            </a:bodyPr>
+            <a:lstStyle/>
+            <a:p>
+              <a:r>
+                <a:rPr lang="de-DE" sz="1600" b="1" dirty="0"/>
+                <a:t>Führt Aktion aus</a:t>
+              </a:r>
+            </a:p>
+          </p:txBody>
+        </p:sp>
+        <p:pic>
+          <p:nvPicPr>
+            <p:cNvPr id="16" name="Grafik 15" descr="Internet der Dinge mit einfarbiger Füllung">
+              <a:extLst>
+                <a:ext uri="{FF2B5EF4-FFF2-40B4-BE49-F238E27FC236}">
+                  <a16:creationId xmlns:a16="http://schemas.microsoft.com/office/drawing/2014/main" id="{922C2278-5124-0252-446B-5ACB8CB1E8F1}"/>
+                </a:ext>
+              </a:extLst>
+            </p:cNvPr>
+            <p:cNvPicPr>
+              <a:picLocks noChangeAspect="1"/>
+            </p:cNvPicPr>
+            <p:nvPr/>
+          </p:nvPicPr>
+          <p:blipFill>
+            <a:blip r:embed="rId11">
+              <a:extLst>
+                <a:ext uri="{28A0092B-C50C-407E-A947-70E740481C1C}">
+                  <a14:useLocalDpi xmlns:a14="http://schemas.microsoft.com/office/drawing/2010/main" val="0"/>
+                </a:ext>
+                <a:ext uri="{96DAC541-7B7A-43D3-8B79-37D633B846F1}">
+                  <asvg:svgBlip xmlns:asvg="http://schemas.microsoft.com/office/drawing/2016/SVG/main" r:embed="rId12"/>
+                </a:ext>
+              </a:extLst>
+            </a:blip>
+            <a:stretch>
+              <a:fillRect/>
+            </a:stretch>
+          </p:blipFill>
+          <p:spPr>
+            <a:xfrm>
+              <a:off x="4628881" y="556323"/>
+              <a:ext cx="914400" cy="914400"/>
+            </a:xfrm>
+            <a:prstGeom prst="rect">
+              <a:avLst/>
+            </a:prstGeom>
+          </p:spPr>
+        </p:pic>
+        <p:sp>
+          <p:nvSpPr>
+            <p:cNvPr id="17" name="Textfeld 16">
+              <a:extLst>
+                <a:ext uri="{FF2B5EF4-FFF2-40B4-BE49-F238E27FC236}">
+                  <a16:creationId xmlns:a16="http://schemas.microsoft.com/office/drawing/2014/main" id="{A16F08F9-5985-6981-BF70-8C20C8054404}"/>
+                </a:ext>
+              </a:extLst>
+            </p:cNvPr>
+            <p:cNvSpPr txBox="1"/>
+            <p:nvPr/>
+          </p:nvSpPr>
+          <p:spPr>
+            <a:xfrm>
+              <a:off x="3905853" y="287451"/>
+              <a:ext cx="2364092" cy="338554"/>
+            </a:xfrm>
+            <a:prstGeom prst="rect">
+              <a:avLst/>
+            </a:prstGeom>
+            <a:noFill/>
+          </p:spPr>
+          <p:txBody>
+            <a:bodyPr wrap="square" rtlCol="0">
+              <a:spAutoFit/>
+            </a:bodyPr>
+            <a:lstStyle/>
+            <a:p>
+              <a:pPr algn="ctr"/>
+              <a:r>
+                <a:rPr lang="de-DE" sz="1600" b="1" dirty="0"/>
+                <a:t>Spracherkennungssystem</a:t>
+              </a:r>
+            </a:p>
+          </p:txBody>
+        </p:sp>
+        <p:grpSp>
+          <p:nvGrpSpPr>
+            <p:cNvPr id="18" name="Gruppieren 17">
+              <a:extLst>
+                <a:ext uri="{FF2B5EF4-FFF2-40B4-BE49-F238E27FC236}">
+                  <a16:creationId xmlns:a16="http://schemas.microsoft.com/office/drawing/2014/main" id="{8BCA8B7B-EF70-B4C1-B829-593ADF2DC241}"/>
+                </a:ext>
+              </a:extLst>
+            </p:cNvPr>
+            <p:cNvGrpSpPr/>
+            <p:nvPr/>
+          </p:nvGrpSpPr>
+          <p:grpSpPr>
+            <a:xfrm rot="16200000">
+              <a:off x="3941530" y="2045373"/>
+              <a:ext cx="1335509" cy="415744"/>
+              <a:chOff x="2810078" y="2156493"/>
+              <a:chExt cx="1335509" cy="415744"/>
+            </a:xfrm>
+          </p:grpSpPr>
+          <p:cxnSp>
+            <p:nvCxnSpPr>
+              <p:cNvPr id="22" name="Gerade Verbindung mit Pfeil 21">
+                <a:extLst>
+                  <a:ext uri="{FF2B5EF4-FFF2-40B4-BE49-F238E27FC236}">
+                    <a16:creationId xmlns:a16="http://schemas.microsoft.com/office/drawing/2014/main" id="{40A37462-CD3A-6DAE-99E7-FAB17499CC7A}"/>
+                  </a:ext>
+                </a:extLst>
+              </p:cNvPr>
+              <p:cNvCxnSpPr>
+                <a:cxnSpLocks/>
+              </p:cNvCxnSpPr>
+              <p:nvPr/>
+            </p:nvCxnSpPr>
+            <p:spPr>
+              <a:xfrm>
+                <a:off x="2880053" y="2572237"/>
+                <a:ext cx="1188000" cy="0"/>
+              </a:xfrm>
+              <a:prstGeom prst="straightConnector1">
+                <a:avLst/>
+              </a:prstGeom>
+              <a:ln w="25400">
+                <a:solidFill>
+                  <a:schemeClr val="tx1"/>
+                </a:solidFill>
+                <a:tailEnd type="triangle"/>
+              </a:ln>
+            </p:spPr>
+            <p:style>
+              <a:lnRef idx="1">
+                <a:schemeClr val="accent1"/>
+              </a:lnRef>
+              <a:fillRef idx="0">
+                <a:schemeClr val="accent1"/>
+              </a:fillRef>
+              <a:effectRef idx="0">
+                <a:schemeClr val="accent1"/>
+              </a:effectRef>
+              <a:fontRef idx="minor">
+                <a:schemeClr val="tx1"/>
+              </a:fontRef>
+            </p:style>
+          </p:cxnSp>
+          <p:sp>
+            <p:nvSpPr>
+              <p:cNvPr id="23" name="Textfeld 22">
+                <a:extLst>
+                  <a:ext uri="{FF2B5EF4-FFF2-40B4-BE49-F238E27FC236}">
+                    <a16:creationId xmlns:a16="http://schemas.microsoft.com/office/drawing/2014/main" id="{6B680194-A658-BA0A-321F-2B2B81A386B8}"/>
+                  </a:ext>
+                </a:extLst>
+              </p:cNvPr>
+              <p:cNvSpPr txBox="1"/>
+              <p:nvPr/>
+            </p:nvSpPr>
+            <p:spPr>
+              <a:xfrm>
+                <a:off x="2810078" y="2156493"/>
+                <a:ext cx="1335509" cy="338554"/>
+              </a:xfrm>
+              <a:prstGeom prst="rect">
+                <a:avLst/>
+              </a:prstGeom>
+              <a:noFill/>
+            </p:spPr>
+            <p:txBody>
+              <a:bodyPr wrap="square" rtlCol="0">
+                <a:spAutoFit/>
+              </a:bodyPr>
+              <a:lstStyle/>
+              <a:p>
+                <a:pPr algn="ctr"/>
+                <a:r>
+                  <a:rPr lang="de-DE" sz="1600" b="1" dirty="0"/>
+                  <a:t>Sprachbefehl</a:t>
+                </a:r>
+              </a:p>
+            </p:txBody>
+          </p:sp>
+        </p:grpSp>
+        <p:grpSp>
+          <p:nvGrpSpPr>
+            <p:cNvPr id="19" name="Gruppieren 18">
+              <a:extLst>
+                <a:ext uri="{FF2B5EF4-FFF2-40B4-BE49-F238E27FC236}">
+                  <a16:creationId xmlns:a16="http://schemas.microsoft.com/office/drawing/2014/main" id="{EC3A8728-EF93-E18C-EDE0-060FA12FE800}"/>
+                </a:ext>
+              </a:extLst>
+            </p:cNvPr>
+            <p:cNvGrpSpPr/>
+            <p:nvPr/>
+          </p:nvGrpSpPr>
+          <p:grpSpPr>
+            <a:xfrm rot="5400000">
+              <a:off x="4906367" y="1999493"/>
+              <a:ext cx="1188000" cy="584775"/>
+              <a:chOff x="5191453" y="1962622"/>
+              <a:chExt cx="1188000" cy="584775"/>
+            </a:xfrm>
+          </p:grpSpPr>
+          <p:cxnSp>
+            <p:nvCxnSpPr>
+              <p:cNvPr id="20" name="Gerade Verbindung mit Pfeil 19">
+                <a:extLst>
+                  <a:ext uri="{FF2B5EF4-FFF2-40B4-BE49-F238E27FC236}">
+                    <a16:creationId xmlns:a16="http://schemas.microsoft.com/office/drawing/2014/main" id="{902CE141-B01E-08FA-C1DE-4BEE5EB0B9E6}"/>
+                  </a:ext>
+                </a:extLst>
+              </p:cNvPr>
+              <p:cNvCxnSpPr>
+                <a:cxnSpLocks/>
+              </p:cNvCxnSpPr>
+              <p:nvPr/>
+            </p:nvCxnSpPr>
+            <p:spPr>
+              <a:xfrm>
+                <a:off x="5191453" y="2493058"/>
+                <a:ext cx="1188000" cy="0"/>
+              </a:xfrm>
+              <a:prstGeom prst="straightConnector1">
+                <a:avLst/>
+              </a:prstGeom>
+              <a:ln w="25400">
+                <a:solidFill>
+                  <a:schemeClr val="tx1"/>
+                </a:solidFill>
+                <a:tailEnd type="triangle"/>
+              </a:ln>
+            </p:spPr>
+            <p:style>
+              <a:lnRef idx="1">
+                <a:schemeClr val="accent1"/>
+              </a:lnRef>
+              <a:fillRef idx="0">
+                <a:schemeClr val="accent1"/>
+              </a:fillRef>
+              <a:effectRef idx="0">
+                <a:schemeClr val="accent1"/>
+              </a:effectRef>
+              <a:fontRef idx="minor">
+                <a:schemeClr val="tx1"/>
+              </a:fontRef>
+            </p:style>
+          </p:cxnSp>
+          <p:sp>
+            <p:nvSpPr>
+              <p:cNvPr id="21" name="Textfeld 20">
+                <a:extLst>
+                  <a:ext uri="{FF2B5EF4-FFF2-40B4-BE49-F238E27FC236}">
+                    <a16:creationId xmlns:a16="http://schemas.microsoft.com/office/drawing/2014/main" id="{7A91938F-772D-A3E1-7FE7-5556C8FA7D29}"/>
+                  </a:ext>
+                </a:extLst>
+              </p:cNvPr>
+              <p:cNvSpPr txBox="1"/>
+              <p:nvPr/>
+            </p:nvSpPr>
+            <p:spPr>
+              <a:xfrm>
+                <a:off x="5236246" y="1962622"/>
+                <a:ext cx="1028700" cy="584775"/>
+              </a:xfrm>
+              <a:prstGeom prst="rect">
+                <a:avLst/>
+              </a:prstGeom>
+              <a:noFill/>
+            </p:spPr>
+            <p:txBody>
+              <a:bodyPr wrap="square" rtlCol="0">
+                <a:spAutoFit/>
+              </a:bodyPr>
+              <a:lstStyle/>
+              <a:p>
+                <a:pPr algn="ctr"/>
+                <a:r>
+                  <a:rPr lang="de-DE" sz="1600" b="1" dirty="0"/>
+                  <a:t>Arduino-Befehl</a:t>
+                </a:r>
+              </a:p>
+            </p:txBody>
+          </p:sp>
+        </p:grpSp>
+      </p:grpSp>
+    </p:spTree>
+    <p:extLst>
+      <p:ext uri="{BB962C8B-B14F-4D97-AF65-F5344CB8AC3E}">
+        <p14:creationId xmlns:p14="http://schemas.microsoft.com/office/powerpoint/2010/main" val="3186026469"/>
+      </p:ext>
+    </p:extLst>
+  </p:cSld>
+  <p:clrMapOvr>
+    <a:masterClrMapping/>
+  </p:clrMapOvr>
+</p:sld>
+</file>
+
+<file path=ppt/slides/slide4.xml><?xml version="1.0" encoding="utf-8"?>
+<p:sld xmlns:a="http://schemas.openxmlformats.org/drawingml/2006/main" xmlns:r="http://schemas.openxmlformats.org/officeDocument/2006/relationships" xmlns:p="http://schemas.openxmlformats.org/presentationml/2006/main">
+  <p:cSld>
+    <p:spTree>
+      <p:nvGrpSpPr>
+        <p:cNvPr id="1" name=""/>
+        <p:cNvGrpSpPr/>
+        <p:nvPr/>
+      </p:nvGrpSpPr>
+      <p:grpSpPr>
+        <a:xfrm>
+          <a:off x="0" y="0"/>
+          <a:ext cx="0" cy="0"/>
+          <a:chOff x="0" y="0"/>
+          <a:chExt cx="0" cy="0"/>
+        </a:xfrm>
+      </p:grpSpPr>
       <p:sp>
         <p:nvSpPr>
           <p:cNvPr id="4" name="Textfeld 3">
@@ -7537,7 +8600,7 @@
 </p:sld>
 </file>
 
-<file path=ppt/slides/slide4.xml><?xml version="1.0" encoding="utf-8"?>
+<file path=ppt/slides/slide5.xml><?xml version="1.0" encoding="utf-8"?>
 <p:sld xmlns:a="http://schemas.openxmlformats.org/drawingml/2006/main" xmlns:r="http://schemas.openxmlformats.org/officeDocument/2006/relationships" xmlns:p="http://schemas.openxmlformats.org/presentationml/2006/main">
   <p:cSld>
     <p:spTree>
@@ -8337,7 +9400,7 @@
 </p:sld>
 </file>
 
-<file path=ppt/slides/slide5.xml><?xml version="1.0" encoding="utf-8"?>
+<file path=ppt/slides/slide6.xml><?xml version="1.0" encoding="utf-8"?>
 <p:sld xmlns:a="http://schemas.openxmlformats.org/drawingml/2006/main" xmlns:r="http://schemas.openxmlformats.org/officeDocument/2006/relationships" xmlns:p="http://schemas.openxmlformats.org/presentationml/2006/main">
   <p:cSld>
     <p:spTree>

</xml_diff>